<commit_message>
Triangle of Death SO CLOSE TO RUNNING!
</commit_message>
<xml_diff>
--- a/Day2Day/Day_01/S1_Note.pptx
+++ b/Day2Day/Day_01/S1_Note.pptx
@@ -3564,7 +3564,7 @@
         </p:nvSpPr>
         <p:spPr>
           <a:xfrm>
-            <a:off x="3333963" y="4304872"/>
+            <a:off x="3444030" y="4271006"/>
             <a:ext cx="3883632" cy="1520575"/>
           </a:xfrm>
           <a:prstGeom prst="leftRightArrow">
@@ -3664,7 +3664,7 @@
         </p:nvSpPr>
         <p:spPr>
           <a:xfrm>
-            <a:off x="3118207" y="914400"/>
+            <a:off x="3149030" y="914400"/>
             <a:ext cx="1397285" cy="2013735"/>
           </a:xfrm>
           <a:prstGeom prst="roundRect">

</xml_diff>

<commit_message>
As it was at the end of class
</commit_message>
<xml_diff>
--- a/Day2Day/Day_01/S1_Note.pptx
+++ b/Day2Day/Day_01/S1_Note.pptx
@@ -262,7 +262,7 @@
           <a:p>
             <a:fld id="{41FBF7B5-8CD3-4D87-8075-6B63450ED684}" type="datetimeFigureOut">
               <a:rPr lang="en-CA" smtClean="0"/>
-              <a:t>2021-05-05</a:t>
+              <a:t>2021-05-07</a:t>
             </a:fld>
             <a:endParaRPr lang="en-CA"/>
           </a:p>
@@ -462,7 +462,7 @@
           <a:p>
             <a:fld id="{41FBF7B5-8CD3-4D87-8075-6B63450ED684}" type="datetimeFigureOut">
               <a:rPr lang="en-CA" smtClean="0"/>
-              <a:t>2021-05-05</a:t>
+              <a:t>2021-05-07</a:t>
             </a:fld>
             <a:endParaRPr lang="en-CA"/>
           </a:p>
@@ -672,7 +672,7 @@
           <a:p>
             <a:fld id="{41FBF7B5-8CD3-4D87-8075-6B63450ED684}" type="datetimeFigureOut">
               <a:rPr lang="en-CA" smtClean="0"/>
-              <a:t>2021-05-05</a:t>
+              <a:t>2021-05-07</a:t>
             </a:fld>
             <a:endParaRPr lang="en-CA"/>
           </a:p>
@@ -872,7 +872,7 @@
           <a:p>
             <a:fld id="{41FBF7B5-8CD3-4D87-8075-6B63450ED684}" type="datetimeFigureOut">
               <a:rPr lang="en-CA" smtClean="0"/>
-              <a:t>2021-05-05</a:t>
+              <a:t>2021-05-07</a:t>
             </a:fld>
             <a:endParaRPr lang="en-CA"/>
           </a:p>
@@ -1148,7 +1148,7 @@
           <a:p>
             <a:fld id="{41FBF7B5-8CD3-4D87-8075-6B63450ED684}" type="datetimeFigureOut">
               <a:rPr lang="en-CA" smtClean="0"/>
-              <a:t>2021-05-05</a:t>
+              <a:t>2021-05-07</a:t>
             </a:fld>
             <a:endParaRPr lang="en-CA"/>
           </a:p>
@@ -1416,7 +1416,7 @@
           <a:p>
             <a:fld id="{41FBF7B5-8CD3-4D87-8075-6B63450ED684}" type="datetimeFigureOut">
               <a:rPr lang="en-CA" smtClean="0"/>
-              <a:t>2021-05-05</a:t>
+              <a:t>2021-05-07</a:t>
             </a:fld>
             <a:endParaRPr lang="en-CA"/>
           </a:p>
@@ -1831,7 +1831,7 @@
           <a:p>
             <a:fld id="{41FBF7B5-8CD3-4D87-8075-6B63450ED684}" type="datetimeFigureOut">
               <a:rPr lang="en-CA" smtClean="0"/>
-              <a:t>2021-05-05</a:t>
+              <a:t>2021-05-07</a:t>
             </a:fld>
             <a:endParaRPr lang="en-CA"/>
           </a:p>
@@ -1973,7 +1973,7 @@
           <a:p>
             <a:fld id="{41FBF7B5-8CD3-4D87-8075-6B63450ED684}" type="datetimeFigureOut">
               <a:rPr lang="en-CA" smtClean="0"/>
-              <a:t>2021-05-05</a:t>
+              <a:t>2021-05-07</a:t>
             </a:fld>
             <a:endParaRPr lang="en-CA"/>
           </a:p>
@@ -2086,7 +2086,7 @@
           <a:p>
             <a:fld id="{41FBF7B5-8CD3-4D87-8075-6B63450ED684}" type="datetimeFigureOut">
               <a:rPr lang="en-CA" smtClean="0"/>
-              <a:t>2021-05-05</a:t>
+              <a:t>2021-05-07</a:t>
             </a:fld>
             <a:endParaRPr lang="en-CA"/>
           </a:p>
@@ -2399,7 +2399,7 @@
           <a:p>
             <a:fld id="{41FBF7B5-8CD3-4D87-8075-6B63450ED684}" type="datetimeFigureOut">
               <a:rPr lang="en-CA" smtClean="0"/>
-              <a:t>2021-05-05</a:t>
+              <a:t>2021-05-07</a:t>
             </a:fld>
             <a:endParaRPr lang="en-CA"/>
           </a:p>
@@ -2688,7 +2688,7 @@
           <a:p>
             <a:fld id="{41FBF7B5-8CD3-4D87-8075-6B63450ED684}" type="datetimeFigureOut">
               <a:rPr lang="en-CA" smtClean="0"/>
-              <a:t>2021-05-05</a:t>
+              <a:t>2021-05-07</a:t>
             </a:fld>
             <a:endParaRPr lang="en-CA"/>
           </a:p>
@@ -2931,7 +2931,7 @@
           <a:p>
             <a:fld id="{41FBF7B5-8CD3-4D87-8075-6B63450ED684}" type="datetimeFigureOut">
               <a:rPr lang="en-CA" smtClean="0"/>
-              <a:t>2021-05-05</a:t>
+              <a:t>2021-05-07</a:t>
             </a:fld>
             <a:endParaRPr lang="en-CA"/>
           </a:p>
@@ -3512,7 +3512,7 @@
         </p:nvSpPr>
         <p:spPr>
           <a:xfrm>
-            <a:off x="9154274" y="914400"/>
+            <a:off x="8725708" y="934948"/>
             <a:ext cx="2517169" cy="3184989"/>
           </a:xfrm>
           <a:prstGeom prst="roundRect">
@@ -3615,8 +3615,8 @@
         </p:nvSpPr>
         <p:spPr>
           <a:xfrm>
-            <a:off x="10094360" y="1078786"/>
-            <a:ext cx="1397285" cy="2013735"/>
+            <a:off x="9683584" y="1078785"/>
+            <a:ext cx="1397285" cy="1448657"/>
           </a:xfrm>
           <a:prstGeom prst="roundRect">
             <a:avLst/>
@@ -3664,8 +3664,8 @@
         </p:nvSpPr>
         <p:spPr>
           <a:xfrm>
-            <a:off x="3149030" y="914400"/>
-            <a:ext cx="1397285" cy="2013735"/>
+            <a:off x="3149031" y="914400"/>
+            <a:ext cx="1645578" cy="2015067"/>
           </a:xfrm>
           <a:prstGeom prst="roundRect">
             <a:avLst/>

</xml_diff>

<commit_message>
Commit before start of class
</commit_message>
<xml_diff>
--- a/Day2Day/Day_01/S1_Note.pptx
+++ b/Day2Day/Day_01/S1_Note.pptx
@@ -7,6 +7,8 @@
   <p:sldIdLst>
     <p:sldId id="256" r:id="rId2"/>
     <p:sldId id="257" r:id="rId3"/>
+    <p:sldId id="258" r:id="rId4"/>
+    <p:sldId id="259" r:id="rId5"/>
   </p:sldIdLst>
   <p:sldSz cx="12192000" cy="6858000"/>
   <p:notesSz cx="6858000" cy="9144000"/>
@@ -262,7 +264,7 @@
           <a:p>
             <a:fld id="{41FBF7B5-8CD3-4D87-8075-6B63450ED684}" type="datetimeFigureOut">
               <a:rPr lang="en-CA" smtClean="0"/>
-              <a:t>2021-05-07</a:t>
+              <a:t>2021-05-11</a:t>
             </a:fld>
             <a:endParaRPr lang="en-CA"/>
           </a:p>
@@ -462,7 +464,7 @@
           <a:p>
             <a:fld id="{41FBF7B5-8CD3-4D87-8075-6B63450ED684}" type="datetimeFigureOut">
               <a:rPr lang="en-CA" smtClean="0"/>
-              <a:t>2021-05-07</a:t>
+              <a:t>2021-05-11</a:t>
             </a:fld>
             <a:endParaRPr lang="en-CA"/>
           </a:p>
@@ -672,7 +674,7 @@
           <a:p>
             <a:fld id="{41FBF7B5-8CD3-4D87-8075-6B63450ED684}" type="datetimeFigureOut">
               <a:rPr lang="en-CA" smtClean="0"/>
-              <a:t>2021-05-07</a:t>
+              <a:t>2021-05-11</a:t>
             </a:fld>
             <a:endParaRPr lang="en-CA"/>
           </a:p>
@@ -872,7 +874,7 @@
           <a:p>
             <a:fld id="{41FBF7B5-8CD3-4D87-8075-6B63450ED684}" type="datetimeFigureOut">
               <a:rPr lang="en-CA" smtClean="0"/>
-              <a:t>2021-05-07</a:t>
+              <a:t>2021-05-11</a:t>
             </a:fld>
             <a:endParaRPr lang="en-CA"/>
           </a:p>
@@ -1148,7 +1150,7 @@
           <a:p>
             <a:fld id="{41FBF7B5-8CD3-4D87-8075-6B63450ED684}" type="datetimeFigureOut">
               <a:rPr lang="en-CA" smtClean="0"/>
-              <a:t>2021-05-07</a:t>
+              <a:t>2021-05-11</a:t>
             </a:fld>
             <a:endParaRPr lang="en-CA"/>
           </a:p>
@@ -1416,7 +1418,7 @@
           <a:p>
             <a:fld id="{41FBF7B5-8CD3-4D87-8075-6B63450ED684}" type="datetimeFigureOut">
               <a:rPr lang="en-CA" smtClean="0"/>
-              <a:t>2021-05-07</a:t>
+              <a:t>2021-05-11</a:t>
             </a:fld>
             <a:endParaRPr lang="en-CA"/>
           </a:p>
@@ -1831,7 +1833,7 @@
           <a:p>
             <a:fld id="{41FBF7B5-8CD3-4D87-8075-6B63450ED684}" type="datetimeFigureOut">
               <a:rPr lang="en-CA" smtClean="0"/>
-              <a:t>2021-05-07</a:t>
+              <a:t>2021-05-11</a:t>
             </a:fld>
             <a:endParaRPr lang="en-CA"/>
           </a:p>
@@ -1973,7 +1975,7 @@
           <a:p>
             <a:fld id="{41FBF7B5-8CD3-4D87-8075-6B63450ED684}" type="datetimeFigureOut">
               <a:rPr lang="en-CA" smtClean="0"/>
-              <a:t>2021-05-07</a:t>
+              <a:t>2021-05-11</a:t>
             </a:fld>
             <a:endParaRPr lang="en-CA"/>
           </a:p>
@@ -2086,7 +2088,7 @@
           <a:p>
             <a:fld id="{41FBF7B5-8CD3-4D87-8075-6B63450ED684}" type="datetimeFigureOut">
               <a:rPr lang="en-CA" smtClean="0"/>
-              <a:t>2021-05-07</a:t>
+              <a:t>2021-05-11</a:t>
             </a:fld>
             <a:endParaRPr lang="en-CA"/>
           </a:p>
@@ -2399,7 +2401,7 @@
           <a:p>
             <a:fld id="{41FBF7B5-8CD3-4D87-8075-6B63450ED684}" type="datetimeFigureOut">
               <a:rPr lang="en-CA" smtClean="0"/>
-              <a:t>2021-05-07</a:t>
+              <a:t>2021-05-11</a:t>
             </a:fld>
             <a:endParaRPr lang="en-CA"/>
           </a:p>
@@ -2688,7 +2690,7 @@
           <a:p>
             <a:fld id="{41FBF7B5-8CD3-4D87-8075-6B63450ED684}" type="datetimeFigureOut">
               <a:rPr lang="en-CA" smtClean="0"/>
-              <a:t>2021-05-07</a:t>
+              <a:t>2021-05-11</a:t>
             </a:fld>
             <a:endParaRPr lang="en-CA"/>
           </a:p>
@@ -2931,7 +2933,7 @@
           <a:p>
             <a:fld id="{41FBF7B5-8CD3-4D87-8075-6B63450ED684}" type="datetimeFigureOut">
               <a:rPr lang="en-CA" smtClean="0"/>
-              <a:t>2021-05-07</a:t>
+              <a:t>2021-05-11</a:t>
             </a:fld>
             <a:endParaRPr lang="en-CA"/>
           </a:p>
@@ -3615,8 +3617,8 @@
         </p:nvSpPr>
         <p:spPr>
           <a:xfrm>
-            <a:off x="9683584" y="1078785"/>
-            <a:ext cx="1397285" cy="1448657"/>
+            <a:off x="9683126" y="937168"/>
+            <a:ext cx="1619820" cy="1590274"/>
           </a:xfrm>
           <a:prstGeom prst="roundRect">
             <a:avLst/>
@@ -3664,8 +3666,8 @@
         </p:nvSpPr>
         <p:spPr>
           <a:xfrm>
-            <a:off x="3149031" y="914400"/>
-            <a:ext cx="1645578" cy="2015067"/>
+            <a:off x="3294634" y="934948"/>
+            <a:ext cx="1381767" cy="1593394"/>
           </a:xfrm>
           <a:prstGeom prst="roundRect">
             <a:avLst/>
@@ -3979,6 +3981,540 @@
     <p:extLst>
       <p:ext uri="{BB962C8B-B14F-4D97-AF65-F5344CB8AC3E}">
         <p14:creationId xmlns:p14="http://schemas.microsoft.com/office/powerpoint/2010/main" val="2578822424"/>
+      </p:ext>
+    </p:extLst>
+  </p:cSld>
+  <p:clrMapOvr>
+    <a:masterClrMapping/>
+  </p:clrMapOvr>
+</p:sld>
+</file>
+
+<file path=ppt/slides/slide3.xml><?xml version="1.0" encoding="utf-8"?>
+<p:sld xmlns:a="http://schemas.openxmlformats.org/drawingml/2006/main" xmlns:r="http://schemas.openxmlformats.org/officeDocument/2006/relationships" xmlns:p="http://schemas.openxmlformats.org/presentationml/2006/main">
+  <p:cSld>
+    <p:spTree>
+      <p:nvGrpSpPr>
+        <p:cNvPr id="1" name=""/>
+        <p:cNvGrpSpPr/>
+        <p:nvPr/>
+      </p:nvGrpSpPr>
+      <p:grpSpPr>
+        <a:xfrm>
+          <a:off x="0" y="0"/>
+          <a:ext cx="0" cy="0"/>
+          <a:chOff x="0" y="0"/>
+          <a:chExt cx="0" cy="0"/>
+        </a:xfrm>
+      </p:grpSpPr>
+      <p:sp>
+        <p:nvSpPr>
+          <p:cNvPr id="4" name="Oval 3">
+            <a:extLst>
+              <a:ext uri="{FF2B5EF4-FFF2-40B4-BE49-F238E27FC236}">
+                <a16:creationId xmlns:a16="http://schemas.microsoft.com/office/drawing/2014/main" id="{08BC129B-D7B1-42C4-955A-BA79312F83A8}"/>
+              </a:ext>
+            </a:extLst>
+          </p:cNvPr>
+          <p:cNvSpPr/>
+          <p:nvPr/>
+        </p:nvSpPr>
+        <p:spPr>
+          <a:xfrm>
+            <a:off x="2611393" y="405713"/>
+            <a:ext cx="6186617" cy="6186617"/>
+          </a:xfrm>
+          <a:prstGeom prst="ellipse">
+            <a:avLst/>
+          </a:prstGeom>
+        </p:spPr>
+        <p:style>
+          <a:lnRef idx="2">
+            <a:schemeClr val="accent1">
+              <a:shade val="50000"/>
+            </a:schemeClr>
+          </a:lnRef>
+          <a:fillRef idx="1">
+            <a:schemeClr val="accent1"/>
+          </a:fillRef>
+          <a:effectRef idx="0">
+            <a:schemeClr val="accent1"/>
+          </a:effectRef>
+          <a:fontRef idx="minor">
+            <a:schemeClr val="lt1"/>
+          </a:fontRef>
+        </p:style>
+        <p:txBody>
+          <a:bodyPr rtlCol="0" anchor="ctr"/>
+          <a:lstStyle/>
+          <a:p>
+            <a:pPr algn="ctr"/>
+            <a:endParaRPr lang="en-CA"/>
+          </a:p>
+        </p:txBody>
+      </p:sp>
+      <p:sp>
+        <p:nvSpPr>
+          <p:cNvPr id="5" name="Oval 4">
+            <a:extLst>
+              <a:ext uri="{FF2B5EF4-FFF2-40B4-BE49-F238E27FC236}">
+                <a16:creationId xmlns:a16="http://schemas.microsoft.com/office/drawing/2014/main" id="{9674128D-ACE3-48C8-AA46-9BA086972AB6}"/>
+              </a:ext>
+            </a:extLst>
+          </p:cNvPr>
+          <p:cNvSpPr/>
+          <p:nvPr/>
+        </p:nvSpPr>
+        <p:spPr>
+          <a:xfrm>
+            <a:off x="5301229" y="3011490"/>
+            <a:ext cx="857383" cy="857383"/>
+          </a:xfrm>
+          <a:prstGeom prst="ellipse">
+            <a:avLst/>
+          </a:prstGeom>
+          <a:solidFill>
+            <a:srgbClr val="7030A0"/>
+          </a:solidFill>
+        </p:spPr>
+        <p:style>
+          <a:lnRef idx="2">
+            <a:schemeClr val="accent1">
+              <a:shade val="50000"/>
+            </a:schemeClr>
+          </a:lnRef>
+          <a:fillRef idx="1">
+            <a:schemeClr val="accent1"/>
+          </a:fillRef>
+          <a:effectRef idx="0">
+            <a:schemeClr val="accent1"/>
+          </a:effectRef>
+          <a:fontRef idx="minor">
+            <a:schemeClr val="lt1"/>
+          </a:fontRef>
+        </p:style>
+        <p:txBody>
+          <a:bodyPr rtlCol="0" anchor="ctr"/>
+          <a:lstStyle/>
+          <a:p>
+            <a:pPr algn="ctr"/>
+            <a:endParaRPr lang="en-CA"/>
+          </a:p>
+        </p:txBody>
+      </p:sp>
+      <p:cxnSp>
+        <p:nvCxnSpPr>
+          <p:cNvPr id="7" name="Straight Arrow Connector 6">
+            <a:extLst>
+              <a:ext uri="{FF2B5EF4-FFF2-40B4-BE49-F238E27FC236}">
+                <a16:creationId xmlns:a16="http://schemas.microsoft.com/office/drawing/2014/main" id="{851E35A8-477F-47AE-9386-4DE3436876AB}"/>
+              </a:ext>
+            </a:extLst>
+          </p:cNvPr>
+          <p:cNvCxnSpPr>
+            <a:cxnSpLocks/>
+            <a:stCxn id="5" idx="7"/>
+            <a:endCxn id="18" idx="3"/>
+          </p:cNvCxnSpPr>
+          <p:nvPr/>
+        </p:nvCxnSpPr>
+        <p:spPr>
+          <a:xfrm flipV="1">
+            <a:off x="6033051" y="1562108"/>
+            <a:ext cx="1650936" cy="1574943"/>
+          </a:xfrm>
+          <a:prstGeom prst="straightConnector1">
+            <a:avLst/>
+          </a:prstGeom>
+          <a:ln>
+            <a:tailEnd type="triangle"/>
+          </a:ln>
+        </p:spPr>
+        <p:style>
+          <a:lnRef idx="3">
+            <a:schemeClr val="dk1"/>
+          </a:lnRef>
+          <a:fillRef idx="0">
+            <a:schemeClr val="dk1"/>
+          </a:fillRef>
+          <a:effectRef idx="2">
+            <a:schemeClr val="dk1"/>
+          </a:effectRef>
+          <a:fontRef idx="minor">
+            <a:schemeClr val="tx1"/>
+          </a:fontRef>
+        </p:style>
+      </p:cxnSp>
+      <p:sp>
+        <p:nvSpPr>
+          <p:cNvPr id="11" name="Isosceles Triangle 10">
+            <a:extLst>
+              <a:ext uri="{FF2B5EF4-FFF2-40B4-BE49-F238E27FC236}">
+                <a16:creationId xmlns:a16="http://schemas.microsoft.com/office/drawing/2014/main" id="{FC400139-BA5C-4C1E-AA64-48FDCFF328C9}"/>
+              </a:ext>
+            </a:extLst>
+          </p:cNvPr>
+          <p:cNvSpPr/>
+          <p:nvPr/>
+        </p:nvSpPr>
+        <p:spPr>
+          <a:xfrm>
+            <a:off x="5755136" y="2305410"/>
+            <a:ext cx="2773891" cy="1187434"/>
+          </a:xfrm>
+          <a:prstGeom prst="triangle">
+            <a:avLst>
+              <a:gd name="adj" fmla="val 100000"/>
+            </a:avLst>
+          </a:prstGeom>
+          <a:solidFill>
+            <a:srgbClr val="FFFF00"/>
+          </a:solidFill>
+        </p:spPr>
+        <p:style>
+          <a:lnRef idx="2">
+            <a:schemeClr val="accent1">
+              <a:shade val="50000"/>
+            </a:schemeClr>
+          </a:lnRef>
+          <a:fillRef idx="1">
+            <a:schemeClr val="accent1"/>
+          </a:fillRef>
+          <a:effectRef idx="0">
+            <a:schemeClr val="accent1"/>
+          </a:effectRef>
+          <a:fontRef idx="minor">
+            <a:schemeClr val="lt1"/>
+          </a:fontRef>
+        </p:style>
+        <p:txBody>
+          <a:bodyPr rtlCol="0" anchor="ctr"/>
+          <a:lstStyle/>
+          <a:p>
+            <a:pPr algn="ctr"/>
+            <a:endParaRPr lang="en-CA"/>
+          </a:p>
+        </p:txBody>
+      </p:sp>
+      <p:sp>
+        <p:nvSpPr>
+          <p:cNvPr id="15" name="TextBox 14">
+            <a:extLst>
+              <a:ext uri="{FF2B5EF4-FFF2-40B4-BE49-F238E27FC236}">
+                <a16:creationId xmlns:a16="http://schemas.microsoft.com/office/drawing/2014/main" id="{630060EF-A803-481B-8718-EC9AD03E7E9B}"/>
+              </a:ext>
+            </a:extLst>
+          </p:cNvPr>
+          <p:cNvSpPr txBox="1"/>
+          <p:nvPr/>
+        </p:nvSpPr>
+        <p:spPr>
+          <a:xfrm>
+            <a:off x="642551" y="4720281"/>
+            <a:ext cx="5346357" cy="369332"/>
+          </a:xfrm>
+          <a:prstGeom prst="rect">
+            <a:avLst/>
+          </a:prstGeom>
+          <a:noFill/>
+        </p:spPr>
+        <p:txBody>
+          <a:bodyPr wrap="square" rtlCol="0">
+            <a:spAutoFit/>
+          </a:bodyPr>
+          <a:lstStyle/>
+          <a:p>
+            <a:r>
+              <a:rPr lang="en-CA" dirty="0"/>
+              <a:t>sqrt(X^2  + y^2)</a:t>
+            </a:r>
+          </a:p>
+        </p:txBody>
+      </p:sp>
+      <p:sp>
+        <p:nvSpPr>
+          <p:cNvPr id="18" name="Oval 17">
+            <a:extLst>
+              <a:ext uri="{FF2B5EF4-FFF2-40B4-BE49-F238E27FC236}">
+                <a16:creationId xmlns:a16="http://schemas.microsoft.com/office/drawing/2014/main" id="{53956B53-07DD-46C2-BFC0-9F67B2A39A73}"/>
+              </a:ext>
+            </a:extLst>
+          </p:cNvPr>
+          <p:cNvSpPr/>
+          <p:nvPr/>
+        </p:nvSpPr>
+        <p:spPr>
+          <a:xfrm>
+            <a:off x="7598433" y="1063462"/>
+            <a:ext cx="584200" cy="584200"/>
+          </a:xfrm>
+          <a:prstGeom prst="ellipse">
+            <a:avLst/>
+          </a:prstGeom>
+          <a:solidFill>
+            <a:srgbClr val="FF0000"/>
+          </a:solidFill>
+        </p:spPr>
+        <p:style>
+          <a:lnRef idx="2">
+            <a:schemeClr val="accent1">
+              <a:shade val="50000"/>
+            </a:schemeClr>
+          </a:lnRef>
+          <a:fillRef idx="1">
+            <a:schemeClr val="accent1"/>
+          </a:fillRef>
+          <a:effectRef idx="0">
+            <a:schemeClr val="accent1"/>
+          </a:effectRef>
+          <a:fontRef idx="minor">
+            <a:schemeClr val="lt1"/>
+          </a:fontRef>
+        </p:style>
+        <p:txBody>
+          <a:bodyPr rtlCol="0" anchor="ctr"/>
+          <a:lstStyle/>
+          <a:p>
+            <a:pPr algn="ctr"/>
+            <a:endParaRPr lang="en-CA"/>
+          </a:p>
+        </p:txBody>
+      </p:sp>
+    </p:spTree>
+    <p:extLst>
+      <p:ext uri="{BB962C8B-B14F-4D97-AF65-F5344CB8AC3E}">
+        <p14:creationId xmlns:p14="http://schemas.microsoft.com/office/powerpoint/2010/main" val="277626192"/>
+      </p:ext>
+    </p:extLst>
+  </p:cSld>
+  <p:clrMapOvr>
+    <a:masterClrMapping/>
+  </p:clrMapOvr>
+</p:sld>
+</file>
+
+<file path=ppt/slides/slide4.xml><?xml version="1.0" encoding="utf-8"?>
+<p:sld xmlns:a="http://schemas.openxmlformats.org/drawingml/2006/main" xmlns:r="http://schemas.openxmlformats.org/officeDocument/2006/relationships" xmlns:p="http://schemas.openxmlformats.org/presentationml/2006/main">
+  <p:cSld>
+    <p:spTree>
+      <p:nvGrpSpPr>
+        <p:cNvPr id="1" name=""/>
+        <p:cNvGrpSpPr/>
+        <p:nvPr/>
+      </p:nvGrpSpPr>
+      <p:grpSpPr>
+        <a:xfrm>
+          <a:off x="0" y="0"/>
+          <a:ext cx="0" cy="0"/>
+          <a:chOff x="0" y="0"/>
+          <a:chExt cx="0" cy="0"/>
+        </a:xfrm>
+      </p:grpSpPr>
+      <p:sp>
+        <p:nvSpPr>
+          <p:cNvPr id="4" name="Rectangle: Rounded Corners 3">
+            <a:extLst>
+              <a:ext uri="{FF2B5EF4-FFF2-40B4-BE49-F238E27FC236}">
+                <a16:creationId xmlns:a16="http://schemas.microsoft.com/office/drawing/2014/main" id="{CAB96A00-084D-4209-A328-36CA0758048E}"/>
+              </a:ext>
+            </a:extLst>
+          </p:cNvPr>
+          <p:cNvSpPr/>
+          <p:nvPr/>
+        </p:nvSpPr>
+        <p:spPr>
+          <a:xfrm>
+            <a:off x="635000" y="1303866"/>
+            <a:ext cx="4859867" cy="4097867"/>
+          </a:xfrm>
+          <a:prstGeom prst="roundRect">
+            <a:avLst/>
+          </a:prstGeom>
+        </p:spPr>
+        <p:style>
+          <a:lnRef idx="2">
+            <a:schemeClr val="accent1">
+              <a:shade val="50000"/>
+            </a:schemeClr>
+          </a:lnRef>
+          <a:fillRef idx="1">
+            <a:schemeClr val="accent1"/>
+          </a:fillRef>
+          <a:effectRef idx="0">
+            <a:schemeClr val="accent1"/>
+          </a:effectRef>
+          <a:fontRef idx="minor">
+            <a:schemeClr val="lt1"/>
+          </a:fontRef>
+        </p:style>
+        <p:txBody>
+          <a:bodyPr rtlCol="0" anchor="ctr"/>
+          <a:lstStyle/>
+          <a:p>
+            <a:pPr algn="ctr"/>
+            <a:r>
+              <a:rPr lang="en-CA" dirty="0"/>
+              <a:t>Shader program : 99</a:t>
+            </a:r>
+          </a:p>
+          <a:p>
+            <a:pPr algn="ctr"/>
+            <a:endParaRPr lang="en-CA" dirty="0"/>
+          </a:p>
+          <a:p>
+            <a:pPr algn="ctr"/>
+            <a:endParaRPr lang="en-CA" dirty="0"/>
+          </a:p>
+          <a:p>
+            <a:pPr algn="ctr"/>
+            <a:endParaRPr lang="en-CA" dirty="0"/>
+          </a:p>
+          <a:p>
+            <a:pPr algn="ctr"/>
+            <a:endParaRPr lang="en-CA" dirty="0"/>
+          </a:p>
+          <a:p>
+            <a:pPr algn="ctr"/>
+            <a:endParaRPr lang="en-CA" dirty="0"/>
+          </a:p>
+          <a:p>
+            <a:pPr algn="ctr"/>
+            <a:endParaRPr lang="en-CA" dirty="0"/>
+          </a:p>
+          <a:p>
+            <a:pPr algn="ctr"/>
+            <a:endParaRPr lang="en-CA" dirty="0"/>
+          </a:p>
+          <a:p>
+            <a:pPr algn="ctr"/>
+            <a:endParaRPr lang="en-CA" dirty="0"/>
+          </a:p>
+          <a:p>
+            <a:pPr algn="ctr"/>
+            <a:endParaRPr lang="en-CA" dirty="0"/>
+          </a:p>
+          <a:p>
+            <a:pPr algn="ctr"/>
+            <a:endParaRPr lang="en-CA" dirty="0"/>
+          </a:p>
+          <a:p>
+            <a:pPr algn="ctr"/>
+            <a:endParaRPr lang="en-CA" dirty="0"/>
+          </a:p>
+          <a:p>
+            <a:pPr algn="ctr"/>
+            <a:endParaRPr lang="en-CA" dirty="0"/>
+          </a:p>
+        </p:txBody>
+      </p:sp>
+      <p:sp>
+        <p:nvSpPr>
+          <p:cNvPr id="2" name="Rectangle: Rounded Corners 1">
+            <a:extLst>
+              <a:ext uri="{FF2B5EF4-FFF2-40B4-BE49-F238E27FC236}">
+                <a16:creationId xmlns:a16="http://schemas.microsoft.com/office/drawing/2014/main" id="{7EB8981E-0106-4A50-BFBE-7098CEE5E3BE}"/>
+              </a:ext>
+            </a:extLst>
+          </p:cNvPr>
+          <p:cNvSpPr/>
+          <p:nvPr/>
+        </p:nvSpPr>
+        <p:spPr>
+          <a:xfrm>
+            <a:off x="1227667" y="2286000"/>
+            <a:ext cx="3657600" cy="1066800"/>
+          </a:xfrm>
+          <a:prstGeom prst="roundRect">
+            <a:avLst/>
+          </a:prstGeom>
+          <a:solidFill>
+            <a:srgbClr val="00B050"/>
+          </a:solidFill>
+        </p:spPr>
+        <p:style>
+          <a:lnRef idx="2">
+            <a:schemeClr val="accent1">
+              <a:shade val="50000"/>
+            </a:schemeClr>
+          </a:lnRef>
+          <a:fillRef idx="1">
+            <a:schemeClr val="accent1"/>
+          </a:fillRef>
+          <a:effectRef idx="0">
+            <a:schemeClr val="accent1"/>
+          </a:effectRef>
+          <a:fontRef idx="minor">
+            <a:schemeClr val="lt1"/>
+          </a:fontRef>
+        </p:style>
+        <p:txBody>
+          <a:bodyPr rtlCol="0" anchor="ctr"/>
+          <a:lstStyle/>
+          <a:p>
+            <a:pPr algn="ctr"/>
+            <a:r>
+              <a:rPr lang="en-CA" dirty="0"/>
+              <a:t>Vertex : 17</a:t>
+            </a:r>
+          </a:p>
+        </p:txBody>
+      </p:sp>
+      <p:sp>
+        <p:nvSpPr>
+          <p:cNvPr id="3" name="Rectangle: Rounded Corners 2">
+            <a:extLst>
+              <a:ext uri="{FF2B5EF4-FFF2-40B4-BE49-F238E27FC236}">
+                <a16:creationId xmlns:a16="http://schemas.microsoft.com/office/drawing/2014/main" id="{8E6D9BEE-A2AA-4951-BADE-0B059D63BD88}"/>
+              </a:ext>
+            </a:extLst>
+          </p:cNvPr>
+          <p:cNvSpPr/>
+          <p:nvPr/>
+        </p:nvSpPr>
+        <p:spPr>
+          <a:xfrm>
+            <a:off x="1227667" y="3488266"/>
+            <a:ext cx="3657600" cy="1066800"/>
+          </a:xfrm>
+          <a:prstGeom prst="roundRect">
+            <a:avLst/>
+          </a:prstGeom>
+          <a:solidFill>
+            <a:srgbClr val="00B050"/>
+          </a:solidFill>
+        </p:spPr>
+        <p:style>
+          <a:lnRef idx="2">
+            <a:schemeClr val="accent1">
+              <a:shade val="50000"/>
+            </a:schemeClr>
+          </a:lnRef>
+          <a:fillRef idx="1">
+            <a:schemeClr val="accent1"/>
+          </a:fillRef>
+          <a:effectRef idx="0">
+            <a:schemeClr val="accent1"/>
+          </a:effectRef>
+          <a:fontRef idx="minor">
+            <a:schemeClr val="lt1"/>
+          </a:fontRef>
+        </p:style>
+        <p:txBody>
+          <a:bodyPr rtlCol="0" anchor="ctr"/>
+          <a:lstStyle/>
+          <a:p>
+            <a:pPr algn="ctr"/>
+            <a:r>
+              <a:rPr lang="en-CA" dirty="0"/>
+              <a:t>Fragment: 19</a:t>
+            </a:r>
+          </a:p>
+        </p:txBody>
+      </p:sp>
+    </p:spTree>
+    <p:extLst>
+      <p:ext uri="{BB962C8B-B14F-4D97-AF65-F5344CB8AC3E}">
+        <p14:creationId xmlns:p14="http://schemas.microsoft.com/office/powerpoint/2010/main" val="2810135943"/>
       </p:ext>
     </p:extLst>
   </p:cSld>

</xml_diff>

<commit_message>
Start of Wednesday's class
</commit_message>
<xml_diff>
--- a/Day2Day/Day_01/S1_Note.pptx
+++ b/Day2Day/Day_01/S1_Note.pptx
@@ -5,10 +5,11 @@
     <p:sldMasterId id="2147483648" r:id="rId1"/>
   </p:sldMasterIdLst>
   <p:sldIdLst>
-    <p:sldId id="256" r:id="rId2"/>
-    <p:sldId id="257" r:id="rId3"/>
-    <p:sldId id="258" r:id="rId4"/>
-    <p:sldId id="259" r:id="rId5"/>
+    <p:sldId id="260" r:id="rId2"/>
+    <p:sldId id="256" r:id="rId3"/>
+    <p:sldId id="257" r:id="rId4"/>
+    <p:sldId id="258" r:id="rId5"/>
+    <p:sldId id="259" r:id="rId6"/>
   </p:sldIdLst>
   <p:sldSz cx="12192000" cy="6858000"/>
   <p:notesSz cx="6858000" cy="9144000"/>
@@ -264,7 +265,7 @@
           <a:p>
             <a:fld id="{41FBF7B5-8CD3-4D87-8075-6B63450ED684}" type="datetimeFigureOut">
               <a:rPr lang="en-CA" smtClean="0"/>
-              <a:t>2021-05-11</a:t>
+              <a:t>2021-05-12</a:t>
             </a:fld>
             <a:endParaRPr lang="en-CA"/>
           </a:p>
@@ -464,7 +465,7 @@
           <a:p>
             <a:fld id="{41FBF7B5-8CD3-4D87-8075-6B63450ED684}" type="datetimeFigureOut">
               <a:rPr lang="en-CA" smtClean="0"/>
-              <a:t>2021-05-11</a:t>
+              <a:t>2021-05-12</a:t>
             </a:fld>
             <a:endParaRPr lang="en-CA"/>
           </a:p>
@@ -674,7 +675,7 @@
           <a:p>
             <a:fld id="{41FBF7B5-8CD3-4D87-8075-6B63450ED684}" type="datetimeFigureOut">
               <a:rPr lang="en-CA" smtClean="0"/>
-              <a:t>2021-05-11</a:t>
+              <a:t>2021-05-12</a:t>
             </a:fld>
             <a:endParaRPr lang="en-CA"/>
           </a:p>
@@ -874,7 +875,7 @@
           <a:p>
             <a:fld id="{41FBF7B5-8CD3-4D87-8075-6B63450ED684}" type="datetimeFigureOut">
               <a:rPr lang="en-CA" smtClean="0"/>
-              <a:t>2021-05-11</a:t>
+              <a:t>2021-05-12</a:t>
             </a:fld>
             <a:endParaRPr lang="en-CA"/>
           </a:p>
@@ -1150,7 +1151,7 @@
           <a:p>
             <a:fld id="{41FBF7B5-8CD3-4D87-8075-6B63450ED684}" type="datetimeFigureOut">
               <a:rPr lang="en-CA" smtClean="0"/>
-              <a:t>2021-05-11</a:t>
+              <a:t>2021-05-12</a:t>
             </a:fld>
             <a:endParaRPr lang="en-CA"/>
           </a:p>
@@ -1418,7 +1419,7 @@
           <a:p>
             <a:fld id="{41FBF7B5-8CD3-4D87-8075-6B63450ED684}" type="datetimeFigureOut">
               <a:rPr lang="en-CA" smtClean="0"/>
-              <a:t>2021-05-11</a:t>
+              <a:t>2021-05-12</a:t>
             </a:fld>
             <a:endParaRPr lang="en-CA"/>
           </a:p>
@@ -1833,7 +1834,7 @@
           <a:p>
             <a:fld id="{41FBF7B5-8CD3-4D87-8075-6B63450ED684}" type="datetimeFigureOut">
               <a:rPr lang="en-CA" smtClean="0"/>
-              <a:t>2021-05-11</a:t>
+              <a:t>2021-05-12</a:t>
             </a:fld>
             <a:endParaRPr lang="en-CA"/>
           </a:p>
@@ -1975,7 +1976,7 @@
           <a:p>
             <a:fld id="{41FBF7B5-8CD3-4D87-8075-6B63450ED684}" type="datetimeFigureOut">
               <a:rPr lang="en-CA" smtClean="0"/>
-              <a:t>2021-05-11</a:t>
+              <a:t>2021-05-12</a:t>
             </a:fld>
             <a:endParaRPr lang="en-CA"/>
           </a:p>
@@ -2088,7 +2089,7 @@
           <a:p>
             <a:fld id="{41FBF7B5-8CD3-4D87-8075-6B63450ED684}" type="datetimeFigureOut">
               <a:rPr lang="en-CA" smtClean="0"/>
-              <a:t>2021-05-11</a:t>
+              <a:t>2021-05-12</a:t>
             </a:fld>
             <a:endParaRPr lang="en-CA"/>
           </a:p>
@@ -2401,7 +2402,7 @@
           <a:p>
             <a:fld id="{41FBF7B5-8CD3-4D87-8075-6B63450ED684}" type="datetimeFigureOut">
               <a:rPr lang="en-CA" smtClean="0"/>
-              <a:t>2021-05-11</a:t>
+              <a:t>2021-05-12</a:t>
             </a:fld>
             <a:endParaRPr lang="en-CA"/>
           </a:p>
@@ -2690,7 +2691,7 @@
           <a:p>
             <a:fld id="{41FBF7B5-8CD3-4D87-8075-6B63450ED684}" type="datetimeFigureOut">
               <a:rPr lang="en-CA" smtClean="0"/>
-              <a:t>2021-05-11</a:t>
+              <a:t>2021-05-12</a:t>
             </a:fld>
             <a:endParaRPr lang="en-CA"/>
           </a:p>
@@ -2933,7 +2934,7 @@
           <a:p>
             <a:fld id="{41FBF7B5-8CD3-4D87-8075-6B63450ED684}" type="datetimeFigureOut">
               <a:rPr lang="en-CA" smtClean="0"/>
-              <a:t>2021-05-11</a:t>
+              <a:t>2021-05-12</a:t>
             </a:fld>
             <a:endParaRPr lang="en-CA"/>
           </a:p>
@@ -3440,6 +3441,22 @@
           <a:lstStyle/>
           <a:p>
             <a:pPr algn="ctr"/>
+            <a:endParaRPr lang="en-CA" sz="4000" dirty="0">
+              <a:solidFill>
+                <a:schemeClr val="tx1"/>
+              </a:solidFill>
+            </a:endParaRPr>
+          </a:p>
+          <a:p>
+            <a:pPr algn="ctr"/>
+            <a:endParaRPr lang="en-CA" sz="4000" dirty="0">
+              <a:solidFill>
+                <a:schemeClr val="tx1"/>
+              </a:solidFill>
+            </a:endParaRPr>
+          </a:p>
+          <a:p>
+            <a:pPr algn="ctr"/>
             <a:r>
               <a:rPr lang="en-CA" sz="4000" dirty="0">
                 <a:solidFill>
@@ -3541,6 +3558,22 @@
           <a:lstStyle/>
           <a:p>
             <a:pPr algn="ctr"/>
+            <a:endParaRPr lang="en-CA" sz="4000" dirty="0">
+              <a:solidFill>
+                <a:schemeClr val="tx1"/>
+              </a:solidFill>
+            </a:endParaRPr>
+          </a:p>
+          <a:p>
+            <a:pPr algn="ctr"/>
+            <a:endParaRPr lang="en-CA" sz="4000" dirty="0">
+              <a:solidFill>
+                <a:schemeClr val="tx1"/>
+              </a:solidFill>
+            </a:endParaRPr>
+          </a:p>
+          <a:p>
+            <a:pPr algn="ctr"/>
             <a:r>
               <a:rPr lang="en-CA" sz="4000" dirty="0">
                 <a:solidFill>
@@ -3605,10 +3638,10 @@
       </p:sp>
       <p:sp>
         <p:nvSpPr>
-          <p:cNvPr id="9" name="Rectangle: Rounded Corners 8">
-            <a:extLst>
-              <a:ext uri="{FF2B5EF4-FFF2-40B4-BE49-F238E27FC236}">
-                <a16:creationId xmlns:a16="http://schemas.microsoft.com/office/drawing/2014/main" id="{E5829A41-6B91-49F0-98FA-626DEE4042F1}"/>
+          <p:cNvPr id="10" name="Rectangle: Rounded Corners 9">
+            <a:extLst>
+              <a:ext uri="{FF2B5EF4-FFF2-40B4-BE49-F238E27FC236}">
+                <a16:creationId xmlns:a16="http://schemas.microsoft.com/office/drawing/2014/main" id="{7292551B-E407-4527-8073-E5A637B132A5}"/>
               </a:ext>
             </a:extLst>
           </p:cNvPr>
@@ -3617,56 +3650,7 @@
         </p:nvSpPr>
         <p:spPr>
           <a:xfrm>
-            <a:off x="9683126" y="937168"/>
-            <a:ext cx="1619820" cy="1590274"/>
-          </a:xfrm>
-          <a:prstGeom prst="roundRect">
-            <a:avLst/>
-          </a:prstGeom>
-        </p:spPr>
-        <p:style>
-          <a:lnRef idx="2">
-            <a:schemeClr val="accent1">
-              <a:shade val="50000"/>
-            </a:schemeClr>
-          </a:lnRef>
-          <a:fillRef idx="1">
-            <a:schemeClr val="accent1"/>
-          </a:fillRef>
-          <a:effectRef idx="0">
-            <a:schemeClr val="accent1"/>
-          </a:effectRef>
-          <a:fontRef idx="minor">
-            <a:schemeClr val="lt1"/>
-          </a:fontRef>
-        </p:style>
-        <p:txBody>
-          <a:bodyPr rtlCol="0" anchor="ctr"/>
-          <a:lstStyle/>
-          <a:p>
-            <a:pPr algn="ctr"/>
-            <a:r>
-              <a:rPr lang="en-CA" dirty="0"/>
-              <a:t>Space Ship</a:t>
-            </a:r>
-          </a:p>
-        </p:txBody>
-      </p:sp>
-      <p:sp>
-        <p:nvSpPr>
-          <p:cNvPr id="10" name="Rectangle: Rounded Corners 9">
-            <a:extLst>
-              <a:ext uri="{FF2B5EF4-FFF2-40B4-BE49-F238E27FC236}">
-                <a16:creationId xmlns:a16="http://schemas.microsoft.com/office/drawing/2014/main" id="{7292551B-E407-4527-8073-E5A637B132A5}"/>
-              </a:ext>
-            </a:extLst>
-          </p:cNvPr>
-          <p:cNvSpPr/>
-          <p:nvPr/>
-        </p:nvSpPr>
-        <p:spPr>
-          <a:xfrm>
-            <a:off x="3294634" y="934948"/>
+            <a:off x="3153698" y="802197"/>
             <a:ext cx="1381767" cy="1593394"/>
           </a:xfrm>
           <a:prstGeom prst="roundRect">
@@ -3701,10 +3685,89 @@
           </a:p>
         </p:txBody>
       </p:sp>
+      <p:sp>
+        <p:nvSpPr>
+          <p:cNvPr id="11" name="Rectangle: Rounded Corners 10">
+            <a:extLst>
+              <a:ext uri="{FF2B5EF4-FFF2-40B4-BE49-F238E27FC236}">
+                <a16:creationId xmlns:a16="http://schemas.microsoft.com/office/drawing/2014/main" id="{BA201D68-537C-4E94-840A-A78E0BABFF37}"/>
+              </a:ext>
+            </a:extLst>
+          </p:cNvPr>
+          <p:cNvSpPr/>
+          <p:nvPr/>
+        </p:nvSpPr>
+        <p:spPr>
+          <a:xfrm>
+            <a:off x="9727735" y="1163548"/>
+            <a:ext cx="1381767" cy="1593394"/>
+          </a:xfrm>
+          <a:prstGeom prst="roundRect">
+            <a:avLst/>
+          </a:prstGeom>
+        </p:spPr>
+        <p:style>
+          <a:lnRef idx="2">
+            <a:schemeClr val="accent1">
+              <a:shade val="50000"/>
+            </a:schemeClr>
+          </a:lnRef>
+          <a:fillRef idx="1">
+            <a:schemeClr val="accent1"/>
+          </a:fillRef>
+          <a:effectRef idx="0">
+            <a:schemeClr val="accent1"/>
+          </a:effectRef>
+          <a:fontRef idx="minor">
+            <a:schemeClr val="lt1"/>
+          </a:fontRef>
+        </p:style>
+        <p:txBody>
+          <a:bodyPr rtlCol="0" anchor="ctr"/>
+          <a:lstStyle/>
+          <a:p>
+            <a:pPr algn="ctr"/>
+            <a:r>
+              <a:rPr lang="en-CA" dirty="0"/>
+              <a:t>Space Ship</a:t>
+            </a:r>
+          </a:p>
+        </p:txBody>
+      </p:sp>
+      <p:pic>
+        <p:nvPicPr>
+          <p:cNvPr id="3" name="Picture 2">
+            <a:extLst>
+              <a:ext uri="{FF2B5EF4-FFF2-40B4-BE49-F238E27FC236}">
+                <a16:creationId xmlns:a16="http://schemas.microsoft.com/office/drawing/2014/main" id="{C862BBB2-99A1-42C2-ADF7-D6A3FECC48AA}"/>
+              </a:ext>
+            </a:extLst>
+          </p:cNvPr>
+          <p:cNvPicPr>
+            <a:picLocks noChangeAspect="1"/>
+          </p:cNvPicPr>
+          <p:nvPr/>
+        </p:nvPicPr>
+        <p:blipFill>
+          <a:blip r:embed="rId2"/>
+          <a:stretch>
+            <a:fillRect/>
+          </a:stretch>
+        </p:blipFill>
+        <p:spPr>
+          <a:xfrm>
+            <a:off x="9350181" y="1071880"/>
+            <a:ext cx="1664095" cy="1455562"/>
+          </a:xfrm>
+          <a:prstGeom prst="rect">
+            <a:avLst/>
+          </a:prstGeom>
+        </p:spPr>
+      </p:pic>
     </p:spTree>
     <p:extLst>
       <p:ext uri="{BB962C8B-B14F-4D97-AF65-F5344CB8AC3E}">
-        <p14:creationId xmlns:p14="http://schemas.microsoft.com/office/powerpoint/2010/main" val="1133609666"/>
+        <p14:creationId xmlns:p14="http://schemas.microsoft.com/office/powerpoint/2010/main" val="1567532410"/>
       </p:ext>
     </p:extLst>
   </p:cSld>
@@ -3794,8 +3857,8 @@
         </p:nvSpPr>
         <p:spPr>
           <a:xfrm>
-            <a:off x="2167848" y="652408"/>
-            <a:ext cx="8969340" cy="3184989"/>
+            <a:off x="2270589" y="657546"/>
+            <a:ext cx="2517169" cy="3184989"/>
           </a:xfrm>
           <a:prstGeom prst="roundRect">
             <a:avLst/>
@@ -3819,6 +3882,22 @@
         <p:txBody>
           <a:bodyPr rtlCol="0" anchor="ctr"/>
           <a:lstStyle/>
+          <a:p>
+            <a:pPr algn="ctr"/>
+            <a:endParaRPr lang="en-CA" sz="4000" dirty="0">
+              <a:solidFill>
+                <a:schemeClr val="tx1"/>
+              </a:solidFill>
+            </a:endParaRPr>
+          </a:p>
+          <a:p>
+            <a:pPr algn="ctr"/>
+            <a:endParaRPr lang="en-CA" sz="4000" dirty="0">
+              <a:solidFill>
+                <a:schemeClr val="tx1"/>
+              </a:solidFill>
+            </a:endParaRPr>
+          </a:p>
           <a:p>
             <a:pPr algn="ctr"/>
             <a:r>
@@ -3883,10 +3962,10 @@
       </p:sp>
       <p:sp>
         <p:nvSpPr>
-          <p:cNvPr id="8" name="Arrow: Left-Right 7">
-            <a:extLst>
-              <a:ext uri="{FF2B5EF4-FFF2-40B4-BE49-F238E27FC236}">
-                <a16:creationId xmlns:a16="http://schemas.microsoft.com/office/drawing/2014/main" id="{E44932D0-93AA-47DD-A4E2-9A594093E7A7}"/>
+          <p:cNvPr id="7" name="Rectangle: Rounded Corners 6">
+            <a:extLst>
+              <a:ext uri="{FF2B5EF4-FFF2-40B4-BE49-F238E27FC236}">
+                <a16:creationId xmlns:a16="http://schemas.microsoft.com/office/drawing/2014/main" id="{E2FB0622-CCE2-4F9E-B49E-7C3B6E2841AA}"/>
               </a:ext>
             </a:extLst>
           </p:cNvPr>
@@ -3895,8 +3974,76 @@
         </p:nvSpPr>
         <p:spPr>
           <a:xfrm>
-            <a:off x="3215811" y="4613097"/>
-            <a:ext cx="3883632" cy="1202076"/>
+            <a:off x="8725708" y="934948"/>
+            <a:ext cx="2517169" cy="3184989"/>
+          </a:xfrm>
+          <a:prstGeom prst="roundRect">
+            <a:avLst/>
+          </a:prstGeom>
+          <a:ln/>
+        </p:spPr>
+        <p:style>
+          <a:lnRef idx="3">
+            <a:schemeClr val="lt1"/>
+          </a:lnRef>
+          <a:fillRef idx="1">
+            <a:schemeClr val="accent4"/>
+          </a:fillRef>
+          <a:effectRef idx="1">
+            <a:schemeClr val="accent4"/>
+          </a:effectRef>
+          <a:fontRef idx="minor">
+            <a:schemeClr val="lt1"/>
+          </a:fontRef>
+        </p:style>
+        <p:txBody>
+          <a:bodyPr rtlCol="0" anchor="ctr"/>
+          <a:lstStyle/>
+          <a:p>
+            <a:pPr algn="ctr"/>
+            <a:endParaRPr lang="en-CA" sz="4000" dirty="0">
+              <a:solidFill>
+                <a:schemeClr val="tx1"/>
+              </a:solidFill>
+            </a:endParaRPr>
+          </a:p>
+          <a:p>
+            <a:pPr algn="ctr"/>
+            <a:endParaRPr lang="en-CA" sz="4000" dirty="0">
+              <a:solidFill>
+                <a:schemeClr val="tx1"/>
+              </a:solidFill>
+            </a:endParaRPr>
+          </a:p>
+          <a:p>
+            <a:pPr algn="ctr"/>
+            <a:r>
+              <a:rPr lang="en-CA" sz="4000" dirty="0">
+                <a:solidFill>
+                  <a:schemeClr val="tx1"/>
+                </a:solidFill>
+              </a:rPr>
+              <a:t>RAM</a:t>
+            </a:r>
+          </a:p>
+        </p:txBody>
+      </p:sp>
+      <p:sp>
+        <p:nvSpPr>
+          <p:cNvPr id="8" name="Arrow: Left-Right 7">
+            <a:extLst>
+              <a:ext uri="{FF2B5EF4-FFF2-40B4-BE49-F238E27FC236}">
+                <a16:creationId xmlns:a16="http://schemas.microsoft.com/office/drawing/2014/main" id="{E44932D0-93AA-47DD-A4E2-9A594093E7A7}"/>
+              </a:ext>
+            </a:extLst>
+          </p:cNvPr>
+          <p:cNvSpPr/>
+          <p:nvPr/>
+        </p:nvSpPr>
+        <p:spPr>
+          <a:xfrm>
+            <a:off x="3444030" y="4271006"/>
+            <a:ext cx="3883632" cy="1520575"/>
           </a:xfrm>
           <a:prstGeom prst="leftRightArrow">
             <a:avLst/>
@@ -3922,18 +4069,22 @@
           <a:p>
             <a:pPr algn="ctr"/>
             <a:r>
-              <a:rPr lang="en-CA" dirty="0"/>
-              <a:t>???????</a:t>
-            </a:r>
-          </a:p>
-        </p:txBody>
-      </p:sp>
-      <p:sp>
-        <p:nvSpPr>
-          <p:cNvPr id="2" name="Rectangle: Rounded Corners 1">
-            <a:extLst>
-              <a:ext uri="{FF2B5EF4-FFF2-40B4-BE49-F238E27FC236}">
-                <a16:creationId xmlns:a16="http://schemas.microsoft.com/office/drawing/2014/main" id="{1A1F9167-BFE0-41DA-A431-B68E93A86A69}"/>
+              <a:rPr lang="en-CA" sz="3600" dirty="0">
+                <a:solidFill>
+                  <a:schemeClr val="tx1"/>
+                </a:solidFill>
+              </a:rPr>
+              <a:t>OpenGL</a:t>
+            </a:r>
+          </a:p>
+        </p:txBody>
+      </p:sp>
+      <p:sp>
+        <p:nvSpPr>
+          <p:cNvPr id="10" name="Rectangle: Rounded Corners 9">
+            <a:extLst>
+              <a:ext uri="{FF2B5EF4-FFF2-40B4-BE49-F238E27FC236}">
+                <a16:creationId xmlns:a16="http://schemas.microsoft.com/office/drawing/2014/main" id="{7292551B-E407-4527-8073-E5A637B132A5}"/>
               </a:ext>
             </a:extLst>
           </p:cNvPr>
@@ -3942,8 +4093,8 @@
         </p:nvSpPr>
         <p:spPr>
           <a:xfrm>
-            <a:off x="2928135" y="1232899"/>
-            <a:ext cx="2691829" cy="2013735"/>
+            <a:off x="3286167" y="810663"/>
+            <a:ext cx="1381767" cy="1593394"/>
           </a:xfrm>
           <a:prstGeom prst="roundRect">
             <a:avLst/>
@@ -3977,10 +4128,59 @@
           </a:p>
         </p:txBody>
       </p:sp>
+      <p:sp>
+        <p:nvSpPr>
+          <p:cNvPr id="11" name="Rectangle: Rounded Corners 10">
+            <a:extLst>
+              <a:ext uri="{FF2B5EF4-FFF2-40B4-BE49-F238E27FC236}">
+                <a16:creationId xmlns:a16="http://schemas.microsoft.com/office/drawing/2014/main" id="{BA201D68-537C-4E94-840A-A78E0BABFF37}"/>
+              </a:ext>
+            </a:extLst>
+          </p:cNvPr>
+          <p:cNvSpPr/>
+          <p:nvPr/>
+        </p:nvSpPr>
+        <p:spPr>
+          <a:xfrm>
+            <a:off x="9727735" y="1163548"/>
+            <a:ext cx="1381767" cy="1593394"/>
+          </a:xfrm>
+          <a:prstGeom prst="roundRect">
+            <a:avLst/>
+          </a:prstGeom>
+        </p:spPr>
+        <p:style>
+          <a:lnRef idx="2">
+            <a:schemeClr val="accent1">
+              <a:shade val="50000"/>
+            </a:schemeClr>
+          </a:lnRef>
+          <a:fillRef idx="1">
+            <a:schemeClr val="accent1"/>
+          </a:fillRef>
+          <a:effectRef idx="0">
+            <a:schemeClr val="accent1"/>
+          </a:effectRef>
+          <a:fontRef idx="minor">
+            <a:schemeClr val="lt1"/>
+          </a:fontRef>
+        </p:style>
+        <p:txBody>
+          <a:bodyPr rtlCol="0" anchor="ctr"/>
+          <a:lstStyle/>
+          <a:p>
+            <a:pPr algn="ctr"/>
+            <a:r>
+              <a:rPr lang="en-CA" dirty="0"/>
+              <a:t>Space Ship</a:t>
+            </a:r>
+          </a:p>
+        </p:txBody>
+      </p:sp>
     </p:spTree>
     <p:extLst>
       <p:ext uri="{BB962C8B-B14F-4D97-AF65-F5344CB8AC3E}">
-        <p14:creationId xmlns:p14="http://schemas.microsoft.com/office/powerpoint/2010/main" val="2578822424"/>
+        <p14:creationId xmlns:p14="http://schemas.microsoft.com/office/powerpoint/2010/main" val="1133609666"/>
       </p:ext>
     </p:extLst>
   </p:cSld>
@@ -4009,10 +4209,10 @@
       </p:grpSpPr>
       <p:sp>
         <p:nvSpPr>
-          <p:cNvPr id="4" name="Oval 3">
-            <a:extLst>
-              <a:ext uri="{FF2B5EF4-FFF2-40B4-BE49-F238E27FC236}">
-                <a16:creationId xmlns:a16="http://schemas.microsoft.com/office/drawing/2014/main" id="{08BC129B-D7B1-42C4-955A-BA79312F83A8}"/>
+          <p:cNvPr id="4" name="Rectangle: Rounded Corners 3">
+            <a:extLst>
+              <a:ext uri="{FF2B5EF4-FFF2-40B4-BE49-F238E27FC236}">
+                <a16:creationId xmlns:a16="http://schemas.microsoft.com/office/drawing/2014/main" id="{23300865-4CD3-4976-AFB6-501109152D3F}"/>
               </a:ext>
             </a:extLst>
           </p:cNvPr>
@@ -4021,7 +4221,283 @@
         </p:nvSpPr>
         <p:spPr>
           <a:xfrm>
-            <a:off x="2611393" y="405713"/>
+            <a:off x="513708" y="2527443"/>
+            <a:ext cx="2517169" cy="2835667"/>
+          </a:xfrm>
+          <a:prstGeom prst="roundRect">
+            <a:avLst/>
+          </a:prstGeom>
+        </p:spPr>
+        <p:style>
+          <a:lnRef idx="2">
+            <a:schemeClr val="accent1">
+              <a:shade val="50000"/>
+            </a:schemeClr>
+          </a:lnRef>
+          <a:fillRef idx="1">
+            <a:schemeClr val="accent1"/>
+          </a:fillRef>
+          <a:effectRef idx="0">
+            <a:schemeClr val="accent1"/>
+          </a:effectRef>
+          <a:fontRef idx="minor">
+            <a:schemeClr val="lt1"/>
+          </a:fontRef>
+        </p:style>
+        <p:txBody>
+          <a:bodyPr rtlCol="0" anchor="ctr"/>
+          <a:lstStyle/>
+          <a:p>
+            <a:pPr algn="ctr"/>
+            <a:r>
+              <a:rPr lang="en-CA" sz="3600" dirty="0"/>
+              <a:t>CPU</a:t>
+            </a:r>
+          </a:p>
+        </p:txBody>
+      </p:sp>
+      <p:sp>
+        <p:nvSpPr>
+          <p:cNvPr id="5" name="Rectangle: Rounded Corners 4">
+            <a:extLst>
+              <a:ext uri="{FF2B5EF4-FFF2-40B4-BE49-F238E27FC236}">
+                <a16:creationId xmlns:a16="http://schemas.microsoft.com/office/drawing/2014/main" id="{63D3163B-DAD7-4EE6-A5FF-8951E1DE9D73}"/>
+              </a:ext>
+            </a:extLst>
+          </p:cNvPr>
+          <p:cNvSpPr/>
+          <p:nvPr/>
+        </p:nvSpPr>
+        <p:spPr>
+          <a:xfrm>
+            <a:off x="2167848" y="652408"/>
+            <a:ext cx="8969340" cy="3184989"/>
+          </a:xfrm>
+          <a:prstGeom prst="roundRect">
+            <a:avLst/>
+          </a:prstGeom>
+          <a:ln/>
+        </p:spPr>
+        <p:style>
+          <a:lnRef idx="3">
+            <a:schemeClr val="lt1"/>
+          </a:lnRef>
+          <a:fillRef idx="1">
+            <a:schemeClr val="accent4"/>
+          </a:fillRef>
+          <a:effectRef idx="1">
+            <a:schemeClr val="accent4"/>
+          </a:effectRef>
+          <a:fontRef idx="minor">
+            <a:schemeClr val="lt1"/>
+          </a:fontRef>
+        </p:style>
+        <p:txBody>
+          <a:bodyPr rtlCol="0" anchor="ctr"/>
+          <a:lstStyle/>
+          <a:p>
+            <a:pPr algn="ctr"/>
+            <a:r>
+              <a:rPr lang="en-CA" sz="4000" dirty="0">
+                <a:solidFill>
+                  <a:schemeClr val="tx1"/>
+                </a:solidFill>
+              </a:rPr>
+              <a:t>RAM</a:t>
+            </a:r>
+          </a:p>
+        </p:txBody>
+      </p:sp>
+      <p:sp>
+        <p:nvSpPr>
+          <p:cNvPr id="6" name="Rectangle: Rounded Corners 5">
+            <a:extLst>
+              <a:ext uri="{FF2B5EF4-FFF2-40B4-BE49-F238E27FC236}">
+                <a16:creationId xmlns:a16="http://schemas.microsoft.com/office/drawing/2014/main" id="{ECB27BA8-7E67-405D-9946-D9EF0EFC1164}"/>
+              </a:ext>
+            </a:extLst>
+          </p:cNvPr>
+          <p:cNvSpPr/>
+          <p:nvPr/>
+        </p:nvSpPr>
+        <p:spPr>
+          <a:xfrm>
+            <a:off x="7397393" y="2609636"/>
+            <a:ext cx="2517169" cy="2835667"/>
+          </a:xfrm>
+          <a:prstGeom prst="roundRect">
+            <a:avLst/>
+          </a:prstGeom>
+        </p:spPr>
+        <p:style>
+          <a:lnRef idx="2">
+            <a:schemeClr val="accent1">
+              <a:shade val="50000"/>
+            </a:schemeClr>
+          </a:lnRef>
+          <a:fillRef idx="1">
+            <a:schemeClr val="accent1"/>
+          </a:fillRef>
+          <a:effectRef idx="0">
+            <a:schemeClr val="accent1"/>
+          </a:effectRef>
+          <a:fontRef idx="minor">
+            <a:schemeClr val="lt1"/>
+          </a:fontRef>
+        </p:style>
+        <p:txBody>
+          <a:bodyPr rtlCol="0" anchor="ctr"/>
+          <a:lstStyle/>
+          <a:p>
+            <a:pPr algn="ctr"/>
+            <a:r>
+              <a:rPr lang="en-CA" sz="3600" dirty="0"/>
+              <a:t>GPU</a:t>
+            </a:r>
+          </a:p>
+        </p:txBody>
+      </p:sp>
+      <p:sp>
+        <p:nvSpPr>
+          <p:cNvPr id="8" name="Arrow: Left-Right 7">
+            <a:extLst>
+              <a:ext uri="{FF2B5EF4-FFF2-40B4-BE49-F238E27FC236}">
+                <a16:creationId xmlns:a16="http://schemas.microsoft.com/office/drawing/2014/main" id="{E44932D0-93AA-47DD-A4E2-9A594093E7A7}"/>
+              </a:ext>
+            </a:extLst>
+          </p:cNvPr>
+          <p:cNvSpPr/>
+          <p:nvPr/>
+        </p:nvSpPr>
+        <p:spPr>
+          <a:xfrm>
+            <a:off x="3215811" y="4613097"/>
+            <a:ext cx="3883632" cy="1202076"/>
+          </a:xfrm>
+          <a:prstGeom prst="leftRightArrow">
+            <a:avLst/>
+          </a:prstGeom>
+        </p:spPr>
+        <p:style>
+          <a:lnRef idx="3">
+            <a:schemeClr val="lt1"/>
+          </a:lnRef>
+          <a:fillRef idx="1">
+            <a:schemeClr val="accent6"/>
+          </a:fillRef>
+          <a:effectRef idx="1">
+            <a:schemeClr val="accent6"/>
+          </a:effectRef>
+          <a:fontRef idx="minor">
+            <a:schemeClr val="lt1"/>
+          </a:fontRef>
+        </p:style>
+        <p:txBody>
+          <a:bodyPr rtlCol="0" anchor="ctr"/>
+          <a:lstStyle/>
+          <a:p>
+            <a:pPr algn="ctr"/>
+            <a:r>
+              <a:rPr lang="en-CA" dirty="0"/>
+              <a:t>???????</a:t>
+            </a:r>
+          </a:p>
+        </p:txBody>
+      </p:sp>
+      <p:sp>
+        <p:nvSpPr>
+          <p:cNvPr id="2" name="Rectangle: Rounded Corners 1">
+            <a:extLst>
+              <a:ext uri="{FF2B5EF4-FFF2-40B4-BE49-F238E27FC236}">
+                <a16:creationId xmlns:a16="http://schemas.microsoft.com/office/drawing/2014/main" id="{1A1F9167-BFE0-41DA-A431-B68E93A86A69}"/>
+              </a:ext>
+            </a:extLst>
+          </p:cNvPr>
+          <p:cNvSpPr/>
+          <p:nvPr/>
+        </p:nvSpPr>
+        <p:spPr>
+          <a:xfrm>
+            <a:off x="2928135" y="1232899"/>
+            <a:ext cx="2691829" cy="2013735"/>
+          </a:xfrm>
+          <a:prstGeom prst="roundRect">
+            <a:avLst/>
+          </a:prstGeom>
+        </p:spPr>
+        <p:style>
+          <a:lnRef idx="2">
+            <a:schemeClr val="accent1">
+              <a:shade val="50000"/>
+            </a:schemeClr>
+          </a:lnRef>
+          <a:fillRef idx="1">
+            <a:schemeClr val="accent1"/>
+          </a:fillRef>
+          <a:effectRef idx="0">
+            <a:schemeClr val="accent1"/>
+          </a:effectRef>
+          <a:fontRef idx="minor">
+            <a:schemeClr val="lt1"/>
+          </a:fontRef>
+        </p:style>
+        <p:txBody>
+          <a:bodyPr rtlCol="0" anchor="ctr"/>
+          <a:lstStyle/>
+          <a:p>
+            <a:pPr algn="ctr"/>
+            <a:r>
+              <a:rPr lang="en-CA" dirty="0"/>
+              <a:t>Space Ship</a:t>
+            </a:r>
+          </a:p>
+        </p:txBody>
+      </p:sp>
+    </p:spTree>
+    <p:extLst>
+      <p:ext uri="{BB962C8B-B14F-4D97-AF65-F5344CB8AC3E}">
+        <p14:creationId xmlns:p14="http://schemas.microsoft.com/office/powerpoint/2010/main" val="2578822424"/>
+      </p:ext>
+    </p:extLst>
+  </p:cSld>
+  <p:clrMapOvr>
+    <a:masterClrMapping/>
+  </p:clrMapOvr>
+</p:sld>
+</file>
+
+<file path=ppt/slides/slide4.xml><?xml version="1.0" encoding="utf-8"?>
+<p:sld xmlns:a="http://schemas.openxmlformats.org/drawingml/2006/main" xmlns:r="http://schemas.openxmlformats.org/officeDocument/2006/relationships" xmlns:p="http://schemas.openxmlformats.org/presentationml/2006/main">
+  <p:cSld>
+    <p:spTree>
+      <p:nvGrpSpPr>
+        <p:cNvPr id="1" name=""/>
+        <p:cNvGrpSpPr/>
+        <p:nvPr/>
+      </p:nvGrpSpPr>
+      <p:grpSpPr>
+        <a:xfrm>
+          <a:off x="0" y="0"/>
+          <a:ext cx="0" cy="0"/>
+          <a:chOff x="0" y="0"/>
+          <a:chExt cx="0" cy="0"/>
+        </a:xfrm>
+      </p:grpSpPr>
+      <p:sp>
+        <p:nvSpPr>
+          <p:cNvPr id="4" name="Oval 3">
+            <a:extLst>
+              <a:ext uri="{FF2B5EF4-FFF2-40B4-BE49-F238E27FC236}">
+                <a16:creationId xmlns:a16="http://schemas.microsoft.com/office/drawing/2014/main" id="{08BC129B-D7B1-42C4-955A-BA79312F83A8}"/>
+              </a:ext>
+            </a:extLst>
+          </p:cNvPr>
+          <p:cNvSpPr/>
+          <p:nvPr/>
+        </p:nvSpPr>
+        <p:spPr>
+          <a:xfrm>
+            <a:off x="2806126" y="160179"/>
             <a:ext cx="6186617" cy="6186617"/>
           </a:xfrm>
           <a:prstGeom prst="ellipse">
@@ -4067,7 +4543,7 @@
         </p:nvSpPr>
         <p:spPr>
           <a:xfrm>
-            <a:off x="5301229" y="3011490"/>
+            <a:off x="5470742" y="2818618"/>
             <a:ext cx="857383" cy="857383"/>
           </a:xfrm>
           <a:prstGeom prst="ellipse">
@@ -4120,8 +4596,8 @@
         </p:nvCxnSpPr>
         <p:spPr>
           <a:xfrm flipV="1">
-            <a:off x="6033051" y="1562108"/>
-            <a:ext cx="1650936" cy="1574943"/>
+            <a:off x="6202564" y="1890896"/>
+            <a:ext cx="456217" cy="1053283"/>
           </a:xfrm>
           <a:prstGeom prst="straightConnector1">
             <a:avLst/>
@@ -4159,8 +4635,8 @@
         </p:nvSpPr>
         <p:spPr>
           <a:xfrm>
-            <a:off x="5755136" y="2305410"/>
-            <a:ext cx="2773891" cy="1187434"/>
+            <a:off x="5949869" y="1976450"/>
+            <a:ext cx="2773891" cy="1270860"/>
           </a:xfrm>
           <a:prstGeom prst="triangle">
             <a:avLst>
@@ -4210,8 +4686,8 @@
         </p:nvSpPr>
         <p:spPr>
           <a:xfrm>
-            <a:off x="642551" y="4720281"/>
-            <a:ext cx="5346357" cy="369332"/>
+            <a:off x="408779" y="5047505"/>
+            <a:ext cx="5346357" cy="523220"/>
           </a:xfrm>
           <a:prstGeom prst="rect">
             <a:avLst/>
@@ -4225,7 +4701,7 @@
           <a:lstStyle/>
           <a:p>
             <a:r>
-              <a:rPr lang="en-CA" dirty="0"/>
+              <a:rPr lang="en-CA" sz="2800" dirty="0"/>
               <a:t>sqrt(X^2  + y^2)</a:t>
             </a:r>
           </a:p>
@@ -4245,7 +4721,7 @@
         </p:nvSpPr>
         <p:spPr>
           <a:xfrm>
-            <a:off x="7598433" y="1063462"/>
+            <a:off x="6573227" y="1392250"/>
             <a:ext cx="584200" cy="584200"/>
           </a:xfrm>
           <a:prstGeom prst="ellipse">
@@ -4293,7 +4769,7 @@
 </p:sld>
 </file>
 
-<file path=ppt/slides/slide4.xml><?xml version="1.0" encoding="utf-8"?>
+<file path=ppt/slides/slide5.xml><?xml version="1.0" encoding="utf-8"?>
 <p:sld xmlns:a="http://schemas.openxmlformats.org/drawingml/2006/main" xmlns:r="http://schemas.openxmlformats.org/officeDocument/2006/relationships" xmlns:p="http://schemas.openxmlformats.org/presentationml/2006/main">
   <p:cSld>
     <p:spTree>

</xml_diff>

<commit_message>
Fun fun fun with mathgit add .
</commit_message>
<xml_diff>
--- a/Day2Day/Day_01/S1_Note.pptx
+++ b/Day2Day/Day_01/S1_Note.pptx
@@ -265,7 +265,7 @@
           <a:p>
             <a:fld id="{41FBF7B5-8CD3-4D87-8075-6B63450ED684}" type="datetimeFigureOut">
               <a:rPr lang="en-CA" smtClean="0"/>
-              <a:t>2021-05-12</a:t>
+              <a:t>2021-05-13</a:t>
             </a:fld>
             <a:endParaRPr lang="en-CA"/>
           </a:p>
@@ -465,7 +465,7 @@
           <a:p>
             <a:fld id="{41FBF7B5-8CD3-4D87-8075-6B63450ED684}" type="datetimeFigureOut">
               <a:rPr lang="en-CA" smtClean="0"/>
-              <a:t>2021-05-12</a:t>
+              <a:t>2021-05-13</a:t>
             </a:fld>
             <a:endParaRPr lang="en-CA"/>
           </a:p>
@@ -675,7 +675,7 @@
           <a:p>
             <a:fld id="{41FBF7B5-8CD3-4D87-8075-6B63450ED684}" type="datetimeFigureOut">
               <a:rPr lang="en-CA" smtClean="0"/>
-              <a:t>2021-05-12</a:t>
+              <a:t>2021-05-13</a:t>
             </a:fld>
             <a:endParaRPr lang="en-CA"/>
           </a:p>
@@ -875,7 +875,7 @@
           <a:p>
             <a:fld id="{41FBF7B5-8CD3-4D87-8075-6B63450ED684}" type="datetimeFigureOut">
               <a:rPr lang="en-CA" smtClean="0"/>
-              <a:t>2021-05-12</a:t>
+              <a:t>2021-05-13</a:t>
             </a:fld>
             <a:endParaRPr lang="en-CA"/>
           </a:p>
@@ -1151,7 +1151,7 @@
           <a:p>
             <a:fld id="{41FBF7B5-8CD3-4D87-8075-6B63450ED684}" type="datetimeFigureOut">
               <a:rPr lang="en-CA" smtClean="0"/>
-              <a:t>2021-05-12</a:t>
+              <a:t>2021-05-13</a:t>
             </a:fld>
             <a:endParaRPr lang="en-CA"/>
           </a:p>
@@ -1419,7 +1419,7 @@
           <a:p>
             <a:fld id="{41FBF7B5-8CD3-4D87-8075-6B63450ED684}" type="datetimeFigureOut">
               <a:rPr lang="en-CA" smtClean="0"/>
-              <a:t>2021-05-12</a:t>
+              <a:t>2021-05-13</a:t>
             </a:fld>
             <a:endParaRPr lang="en-CA"/>
           </a:p>
@@ -1834,7 +1834,7 @@
           <a:p>
             <a:fld id="{41FBF7B5-8CD3-4D87-8075-6B63450ED684}" type="datetimeFigureOut">
               <a:rPr lang="en-CA" smtClean="0"/>
-              <a:t>2021-05-12</a:t>
+              <a:t>2021-05-13</a:t>
             </a:fld>
             <a:endParaRPr lang="en-CA"/>
           </a:p>
@@ -1976,7 +1976,7 @@
           <a:p>
             <a:fld id="{41FBF7B5-8CD3-4D87-8075-6B63450ED684}" type="datetimeFigureOut">
               <a:rPr lang="en-CA" smtClean="0"/>
-              <a:t>2021-05-12</a:t>
+              <a:t>2021-05-13</a:t>
             </a:fld>
             <a:endParaRPr lang="en-CA"/>
           </a:p>
@@ -2089,7 +2089,7 @@
           <a:p>
             <a:fld id="{41FBF7B5-8CD3-4D87-8075-6B63450ED684}" type="datetimeFigureOut">
               <a:rPr lang="en-CA" smtClean="0"/>
-              <a:t>2021-05-12</a:t>
+              <a:t>2021-05-13</a:t>
             </a:fld>
             <a:endParaRPr lang="en-CA"/>
           </a:p>
@@ -2402,7 +2402,7 @@
           <a:p>
             <a:fld id="{41FBF7B5-8CD3-4D87-8075-6B63450ED684}" type="datetimeFigureOut">
               <a:rPr lang="en-CA" smtClean="0"/>
-              <a:t>2021-05-12</a:t>
+              <a:t>2021-05-13</a:t>
             </a:fld>
             <a:endParaRPr lang="en-CA"/>
           </a:p>
@@ -2691,7 +2691,7 @@
           <a:p>
             <a:fld id="{41FBF7B5-8CD3-4D87-8075-6B63450ED684}" type="datetimeFigureOut">
               <a:rPr lang="en-CA" smtClean="0"/>
-              <a:t>2021-05-12</a:t>
+              <a:t>2021-05-13</a:t>
             </a:fld>
             <a:endParaRPr lang="en-CA"/>
           </a:p>
@@ -2934,7 +2934,7 @@
           <a:p>
             <a:fld id="{41FBF7B5-8CD3-4D87-8075-6B63450ED684}" type="datetimeFigureOut">
               <a:rPr lang="en-CA" smtClean="0"/>
-              <a:t>2021-05-12</a:t>
+              <a:t>2021-05-13</a:t>
             </a:fld>
             <a:endParaRPr lang="en-CA"/>
           </a:p>
@@ -3650,7 +3650,7 @@
         </p:nvSpPr>
         <p:spPr>
           <a:xfrm>
-            <a:off x="3153698" y="802197"/>
+            <a:off x="3094431" y="776797"/>
             <a:ext cx="1381767" cy="1593394"/>
           </a:xfrm>
           <a:prstGeom prst="roundRect">
@@ -3736,10 +3736,10 @@
       </p:sp>
       <p:pic>
         <p:nvPicPr>
-          <p:cNvPr id="3" name="Picture 2">
-            <a:extLst>
-              <a:ext uri="{FF2B5EF4-FFF2-40B4-BE49-F238E27FC236}">
-                <a16:creationId xmlns:a16="http://schemas.microsoft.com/office/drawing/2014/main" id="{C862BBB2-99A1-42C2-ADF7-D6A3FECC48AA}"/>
+          <p:cNvPr id="12" name="Picture 11">
+            <a:extLst>
+              <a:ext uri="{FF2B5EF4-FFF2-40B4-BE49-F238E27FC236}">
+                <a16:creationId xmlns:a16="http://schemas.microsoft.com/office/drawing/2014/main" id="{F31275B6-E239-4734-901C-23BFC60E1D8B}"/>
               </a:ext>
             </a:extLst>
           </p:cNvPr>
@@ -3756,8 +3756,98 @@
         </p:blipFill>
         <p:spPr>
           <a:xfrm>
-            <a:off x="9350181" y="1071880"/>
+            <a:off x="10150454" y="5195271"/>
             <a:ext cx="1664095" cy="1455562"/>
+          </a:xfrm>
+          <a:prstGeom prst="rect">
+            <a:avLst/>
+          </a:prstGeom>
+        </p:spPr>
+      </p:pic>
+      <p:pic>
+        <p:nvPicPr>
+          <p:cNvPr id="13" name="Picture 12">
+            <a:extLst>
+              <a:ext uri="{FF2B5EF4-FFF2-40B4-BE49-F238E27FC236}">
+                <a16:creationId xmlns:a16="http://schemas.microsoft.com/office/drawing/2014/main" id="{9873DA2B-BA3A-42E0-840E-5D0B29E664BD}"/>
+              </a:ext>
+            </a:extLst>
+          </p:cNvPr>
+          <p:cNvPicPr>
+            <a:picLocks noChangeAspect="1"/>
+          </p:cNvPicPr>
+          <p:nvPr/>
+        </p:nvPicPr>
+        <p:blipFill>
+          <a:blip r:embed="rId3"/>
+          <a:stretch>
+            <a:fillRect/>
+          </a:stretch>
+        </p:blipFill>
+        <p:spPr>
+          <a:xfrm>
+            <a:off x="10379056" y="1192563"/>
+            <a:ext cx="707097" cy="618205"/>
+          </a:xfrm>
+          <a:prstGeom prst="rect">
+            <a:avLst/>
+          </a:prstGeom>
+        </p:spPr>
+      </p:pic>
+      <p:pic>
+        <p:nvPicPr>
+          <p:cNvPr id="14" name="Picture 13">
+            <a:extLst>
+              <a:ext uri="{FF2B5EF4-FFF2-40B4-BE49-F238E27FC236}">
+                <a16:creationId xmlns:a16="http://schemas.microsoft.com/office/drawing/2014/main" id="{8B1E08B9-B3DF-46E5-8834-E5954B7BF916}"/>
+              </a:ext>
+            </a:extLst>
+          </p:cNvPr>
+          <p:cNvPicPr>
+            <a:picLocks noChangeAspect="1"/>
+          </p:cNvPicPr>
+          <p:nvPr/>
+        </p:nvPicPr>
+        <p:blipFill>
+          <a:blip r:embed="rId3"/>
+          <a:stretch>
+            <a:fillRect/>
+          </a:stretch>
+        </p:blipFill>
+        <p:spPr>
+          <a:xfrm>
+            <a:off x="10418618" y="1163548"/>
+            <a:ext cx="707097" cy="618205"/>
+          </a:xfrm>
+          <a:prstGeom prst="rect">
+            <a:avLst/>
+          </a:prstGeom>
+        </p:spPr>
+      </p:pic>
+      <p:pic>
+        <p:nvPicPr>
+          <p:cNvPr id="17" name="Picture 16">
+            <a:extLst>
+              <a:ext uri="{FF2B5EF4-FFF2-40B4-BE49-F238E27FC236}">
+                <a16:creationId xmlns:a16="http://schemas.microsoft.com/office/drawing/2014/main" id="{D6E743AB-07A5-44F3-B33B-5F73A74658E9}"/>
+              </a:ext>
+            </a:extLst>
+          </p:cNvPr>
+          <p:cNvPicPr>
+            <a:picLocks noChangeAspect="1"/>
+          </p:cNvPicPr>
+          <p:nvPr/>
+        </p:nvPicPr>
+        <p:blipFill>
+          <a:blip r:embed="rId3"/>
+          <a:stretch>
+            <a:fillRect/>
+          </a:stretch>
+        </p:blipFill>
+        <p:spPr>
+          <a:xfrm>
+            <a:off x="3276664" y="592137"/>
+            <a:ext cx="999004" cy="873415"/>
           </a:xfrm>
           <a:prstGeom prst="rect">
             <a:avLst/>
@@ -4596,8 +4686,8 @@
         </p:nvCxnSpPr>
         <p:spPr>
           <a:xfrm flipV="1">
-            <a:off x="6202564" y="1890896"/>
-            <a:ext cx="456217" cy="1053283"/>
+            <a:off x="6202564" y="2182996"/>
+            <a:ext cx="2354301" cy="761183"/>
           </a:xfrm>
           <a:prstGeom prst="straightConnector1">
             <a:avLst/>
@@ -4635,8 +4725,8 @@
         </p:nvSpPr>
         <p:spPr>
           <a:xfrm>
-            <a:off x="5949869" y="1976450"/>
-            <a:ext cx="2773891" cy="1270860"/>
+            <a:off x="5949868" y="1976450"/>
+            <a:ext cx="2775603" cy="1270860"/>
           </a:xfrm>
           <a:prstGeom prst="triangle">
             <a:avLst>
@@ -4687,7 +4777,7 @@
         <p:spPr>
           <a:xfrm>
             <a:off x="408779" y="5047505"/>
-            <a:ext cx="5346357" cy="523220"/>
+            <a:ext cx="5346357" cy="954107"/>
           </a:xfrm>
           <a:prstGeom prst="rect">
             <a:avLst/>
@@ -4705,6 +4795,12 @@
               <a:t>sqrt(X^2  + y^2)</a:t>
             </a:r>
           </a:p>
+          <a:p>
+            <a:r>
+              <a:rPr lang="en-CA" sz="2800" dirty="0"/>
+              <a:t>C^2 = A^2 + B^2</a:t>
+            </a:r>
+          </a:p>
         </p:txBody>
       </p:sp>
       <p:sp>
@@ -4721,7 +4817,7 @@
         </p:nvSpPr>
         <p:spPr>
           <a:xfrm>
-            <a:off x="6573227" y="1392250"/>
+            <a:off x="8471311" y="1684350"/>
             <a:ext cx="584200" cy="584200"/>
           </a:xfrm>
           <a:prstGeom prst="ellipse">
@@ -4753,6 +4849,62 @@
           <a:p>
             <a:pPr algn="ctr"/>
             <a:endParaRPr lang="en-CA"/>
+          </a:p>
+        </p:txBody>
+      </p:sp>
+      <p:sp>
+        <p:nvSpPr>
+          <p:cNvPr id="8" name="TextBox 7">
+            <a:extLst>
+              <a:ext uri="{FF2B5EF4-FFF2-40B4-BE49-F238E27FC236}">
+                <a16:creationId xmlns:a16="http://schemas.microsoft.com/office/drawing/2014/main" id="{19B8C8E7-3AE6-4FDF-9335-92DB85828AC9}"/>
+              </a:ext>
+            </a:extLst>
+          </p:cNvPr>
+          <p:cNvSpPr txBox="1"/>
+          <p:nvPr/>
+        </p:nvSpPr>
+        <p:spPr>
+          <a:xfrm>
+            <a:off x="8763411" y="3792721"/>
+            <a:ext cx="3685266" cy="2246769"/>
+          </a:xfrm>
+          <a:prstGeom prst="rect">
+            <a:avLst/>
+          </a:prstGeom>
+          <a:noFill/>
+        </p:spPr>
+        <p:txBody>
+          <a:bodyPr wrap="square" rtlCol="0">
+            <a:spAutoFit/>
+          </a:bodyPr>
+          <a:lstStyle/>
+          <a:p>
+            <a:r>
+              <a:rPr lang="en-CA" sz="2800" dirty="0"/>
+              <a:t>“X” = x2-x1</a:t>
+            </a:r>
+          </a:p>
+          <a:p>
+            <a:r>
+              <a:rPr lang="en-CA" sz="2800" dirty="0"/>
+              <a:t>“Y” = y2-y1</a:t>
+            </a:r>
+          </a:p>
+          <a:p>
+            <a:r>
+              <a:rPr lang="en-CA" sz="2800" dirty="0"/>
+              <a:t>“Z” = z2-Z1</a:t>
+            </a:r>
+          </a:p>
+          <a:p>
+            <a:endParaRPr lang="en-CA" sz="2800" dirty="0"/>
+          </a:p>
+          <a:p>
+            <a:r>
+              <a:rPr lang="en-CA" sz="2800" dirty="0"/>
+              <a:t>C^2 = X^2+Y^2+Z^2</a:t>
+            </a:r>
           </a:p>
         </p:txBody>
       </p:sp>

</xml_diff>

<commit_message>
Uncommented the matrix concatenation
</commit_message>
<xml_diff>
--- a/Day2Day/Day_01/S1_Note.pptx
+++ b/Day2Day/Day_01/S1_Note.pptx
@@ -10,6 +10,7 @@
     <p:sldId id="257" r:id="rId4"/>
     <p:sldId id="258" r:id="rId5"/>
     <p:sldId id="259" r:id="rId6"/>
+    <p:sldId id="261" r:id="rId7"/>
   </p:sldIdLst>
   <p:sldSz cx="12192000" cy="6858000"/>
   <p:notesSz cx="6858000" cy="9144000"/>
@@ -5152,6 +5153,77 @@
 </p:sld>
 </file>
 
+<file path=ppt/slides/slide6.xml><?xml version="1.0" encoding="utf-8"?>
+<p:sld xmlns:a="http://schemas.openxmlformats.org/drawingml/2006/main" xmlns:r="http://schemas.openxmlformats.org/officeDocument/2006/relationships" xmlns:p="http://schemas.openxmlformats.org/presentationml/2006/main">
+  <p:cSld>
+    <p:spTree>
+      <p:nvGrpSpPr>
+        <p:cNvPr id="1" name=""/>
+        <p:cNvGrpSpPr/>
+        <p:nvPr/>
+      </p:nvGrpSpPr>
+      <p:grpSpPr>
+        <a:xfrm>
+          <a:off x="0" y="0"/>
+          <a:ext cx="0" cy="0"/>
+          <a:chOff x="0" y="0"/>
+          <a:chExt cx="0" cy="0"/>
+        </a:xfrm>
+      </p:grpSpPr>
+      <p:cxnSp>
+        <p:nvCxnSpPr>
+          <p:cNvPr id="7" name="Straight Arrow Connector 6">
+            <a:extLst>
+              <a:ext uri="{FF2B5EF4-FFF2-40B4-BE49-F238E27FC236}">
+                <a16:creationId xmlns:a16="http://schemas.microsoft.com/office/drawing/2014/main" id="{851E35A8-477F-47AE-9386-4DE3436876AB}"/>
+              </a:ext>
+            </a:extLst>
+          </p:cNvPr>
+          <p:cNvCxnSpPr>
+            <a:cxnSpLocks/>
+          </p:cNvCxnSpPr>
+          <p:nvPr/>
+        </p:nvCxnSpPr>
+        <p:spPr>
+          <a:xfrm flipV="1">
+            <a:off x="6202565" y="1312333"/>
+            <a:ext cx="2628168" cy="2726267"/>
+          </a:xfrm>
+          <a:prstGeom prst="straightConnector1">
+            <a:avLst/>
+          </a:prstGeom>
+          <a:ln>
+            <a:tailEnd type="triangle"/>
+          </a:ln>
+        </p:spPr>
+        <p:style>
+          <a:lnRef idx="3">
+            <a:schemeClr val="dk1"/>
+          </a:lnRef>
+          <a:fillRef idx="0">
+            <a:schemeClr val="dk1"/>
+          </a:fillRef>
+          <a:effectRef idx="2">
+            <a:schemeClr val="dk1"/>
+          </a:effectRef>
+          <a:fontRef idx="minor">
+            <a:schemeClr val="tx1"/>
+          </a:fontRef>
+        </p:style>
+      </p:cxnSp>
+    </p:spTree>
+    <p:extLst>
+      <p:ext uri="{BB962C8B-B14F-4D97-AF65-F5344CB8AC3E}">
+        <p14:creationId xmlns:p14="http://schemas.microsoft.com/office/powerpoint/2010/main" val="2959768038"/>
+      </p:ext>
+    </p:extLst>
+  </p:cSld>
+  <p:clrMapOvr>
+    <a:masterClrMapping/>
+  </p:clrMapOvr>
+</p:sld>
+</file>
+
 <file path=ppt/theme/theme1.xml><?xml version="1.0" encoding="utf-8"?>
 <a:theme xmlns:a="http://schemas.openxmlformats.org/drawingml/2006/main" name="Office Theme">
   <a:themeElements>

</xml_diff>

<commit_message>
For start of May 18th class
</commit_message>
<xml_diff>
--- a/Day2Day/Day_01/S1_Note.pptx
+++ b/Day2Day/Day_01/S1_Note.pptx
@@ -266,7 +266,7 @@
           <a:p>
             <a:fld id="{41FBF7B5-8CD3-4D87-8075-6B63450ED684}" type="datetimeFigureOut">
               <a:rPr lang="en-CA" smtClean="0"/>
-              <a:t>2021-05-13</a:t>
+              <a:t>2021-05-14</a:t>
             </a:fld>
             <a:endParaRPr lang="en-CA"/>
           </a:p>
@@ -466,7 +466,7 @@
           <a:p>
             <a:fld id="{41FBF7B5-8CD3-4D87-8075-6B63450ED684}" type="datetimeFigureOut">
               <a:rPr lang="en-CA" smtClean="0"/>
-              <a:t>2021-05-13</a:t>
+              <a:t>2021-05-14</a:t>
             </a:fld>
             <a:endParaRPr lang="en-CA"/>
           </a:p>
@@ -676,7 +676,7 @@
           <a:p>
             <a:fld id="{41FBF7B5-8CD3-4D87-8075-6B63450ED684}" type="datetimeFigureOut">
               <a:rPr lang="en-CA" smtClean="0"/>
-              <a:t>2021-05-13</a:t>
+              <a:t>2021-05-14</a:t>
             </a:fld>
             <a:endParaRPr lang="en-CA"/>
           </a:p>
@@ -876,7 +876,7 @@
           <a:p>
             <a:fld id="{41FBF7B5-8CD3-4D87-8075-6B63450ED684}" type="datetimeFigureOut">
               <a:rPr lang="en-CA" smtClean="0"/>
-              <a:t>2021-05-13</a:t>
+              <a:t>2021-05-14</a:t>
             </a:fld>
             <a:endParaRPr lang="en-CA"/>
           </a:p>
@@ -1152,7 +1152,7 @@
           <a:p>
             <a:fld id="{41FBF7B5-8CD3-4D87-8075-6B63450ED684}" type="datetimeFigureOut">
               <a:rPr lang="en-CA" smtClean="0"/>
-              <a:t>2021-05-13</a:t>
+              <a:t>2021-05-14</a:t>
             </a:fld>
             <a:endParaRPr lang="en-CA"/>
           </a:p>
@@ -1420,7 +1420,7 @@
           <a:p>
             <a:fld id="{41FBF7B5-8CD3-4D87-8075-6B63450ED684}" type="datetimeFigureOut">
               <a:rPr lang="en-CA" smtClean="0"/>
-              <a:t>2021-05-13</a:t>
+              <a:t>2021-05-14</a:t>
             </a:fld>
             <a:endParaRPr lang="en-CA"/>
           </a:p>
@@ -1835,7 +1835,7 @@
           <a:p>
             <a:fld id="{41FBF7B5-8CD3-4D87-8075-6B63450ED684}" type="datetimeFigureOut">
               <a:rPr lang="en-CA" smtClean="0"/>
-              <a:t>2021-05-13</a:t>
+              <a:t>2021-05-14</a:t>
             </a:fld>
             <a:endParaRPr lang="en-CA"/>
           </a:p>
@@ -1977,7 +1977,7 @@
           <a:p>
             <a:fld id="{41FBF7B5-8CD3-4D87-8075-6B63450ED684}" type="datetimeFigureOut">
               <a:rPr lang="en-CA" smtClean="0"/>
-              <a:t>2021-05-13</a:t>
+              <a:t>2021-05-14</a:t>
             </a:fld>
             <a:endParaRPr lang="en-CA"/>
           </a:p>
@@ -2090,7 +2090,7 @@
           <a:p>
             <a:fld id="{41FBF7B5-8CD3-4D87-8075-6B63450ED684}" type="datetimeFigureOut">
               <a:rPr lang="en-CA" smtClean="0"/>
-              <a:t>2021-05-13</a:t>
+              <a:t>2021-05-14</a:t>
             </a:fld>
             <a:endParaRPr lang="en-CA"/>
           </a:p>
@@ -2403,7 +2403,7 @@
           <a:p>
             <a:fld id="{41FBF7B5-8CD3-4D87-8075-6B63450ED684}" type="datetimeFigureOut">
               <a:rPr lang="en-CA" smtClean="0"/>
-              <a:t>2021-05-13</a:t>
+              <a:t>2021-05-14</a:t>
             </a:fld>
             <a:endParaRPr lang="en-CA"/>
           </a:p>
@@ -2692,7 +2692,7 @@
           <a:p>
             <a:fld id="{41FBF7B5-8CD3-4D87-8075-6B63450ED684}" type="datetimeFigureOut">
               <a:rPr lang="en-CA" smtClean="0"/>
-              <a:t>2021-05-13</a:t>
+              <a:t>2021-05-14</a:t>
             </a:fld>
             <a:endParaRPr lang="en-CA"/>
           </a:p>
@@ -2935,7 +2935,7 @@
           <a:p>
             <a:fld id="{41FBF7B5-8CD3-4D87-8075-6B63450ED684}" type="datetimeFigureOut">
               <a:rPr lang="en-CA" smtClean="0"/>
-              <a:t>2021-05-13</a:t>
+              <a:t>2021-05-14</a:t>
             </a:fld>
             <a:endParaRPr lang="en-CA"/>
           </a:p>
@@ -3757,7 +3757,7 @@
         </p:blipFill>
         <p:spPr>
           <a:xfrm>
-            <a:off x="10150454" y="5195271"/>
+            <a:off x="10277454" y="5063800"/>
             <a:ext cx="1664095" cy="1455562"/>
           </a:xfrm>
           <a:prstGeom prst="rect">
@@ -3787,7 +3787,7 @@
         </p:blipFill>
         <p:spPr>
           <a:xfrm>
-            <a:off x="10379056" y="1192563"/>
+            <a:off x="10402404" y="1163547"/>
             <a:ext cx="707097" cy="618205"/>
           </a:xfrm>
           <a:prstGeom prst="rect">
@@ -3797,10 +3797,10 @@
       </p:pic>
       <p:pic>
         <p:nvPicPr>
-          <p:cNvPr id="14" name="Picture 13">
-            <a:extLst>
-              <a:ext uri="{FF2B5EF4-FFF2-40B4-BE49-F238E27FC236}">
-                <a16:creationId xmlns:a16="http://schemas.microsoft.com/office/drawing/2014/main" id="{8B1E08B9-B3DF-46E5-8834-E5954B7BF916}"/>
+          <p:cNvPr id="17" name="Picture 16">
+            <a:extLst>
+              <a:ext uri="{FF2B5EF4-FFF2-40B4-BE49-F238E27FC236}">
+                <a16:creationId xmlns:a16="http://schemas.microsoft.com/office/drawing/2014/main" id="{D6E743AB-07A5-44F3-B33B-5F73A74658E9}"/>
               </a:ext>
             </a:extLst>
           </p:cNvPr>
@@ -3817,8 +3817,8 @@
         </p:blipFill>
         <p:spPr>
           <a:xfrm>
-            <a:off x="10418618" y="1163548"/>
-            <a:ext cx="707097" cy="618205"/>
+            <a:off x="3724432" y="726840"/>
+            <a:ext cx="921469" cy="805627"/>
           </a:xfrm>
           <a:prstGeom prst="rect">
             <a:avLst/>
@@ -3827,10 +3827,10 @@
       </p:pic>
       <p:pic>
         <p:nvPicPr>
-          <p:cNvPr id="17" name="Picture 16">
-            <a:extLst>
-              <a:ext uri="{FF2B5EF4-FFF2-40B4-BE49-F238E27FC236}">
-                <a16:creationId xmlns:a16="http://schemas.microsoft.com/office/drawing/2014/main" id="{D6E743AB-07A5-44F3-B33B-5F73A74658E9}"/>
+          <p:cNvPr id="22" name="Picture 21">
+            <a:extLst>
+              <a:ext uri="{FF2B5EF4-FFF2-40B4-BE49-F238E27FC236}">
+                <a16:creationId xmlns:a16="http://schemas.microsoft.com/office/drawing/2014/main" id="{4F40684C-7E4A-4E25-9298-A7F4BD386BB3}"/>
               </a:ext>
             </a:extLst>
           </p:cNvPr>
@@ -3847,8 +3847,8 @@
         </p:blipFill>
         <p:spPr>
           <a:xfrm>
-            <a:off x="3276664" y="592137"/>
-            <a:ext cx="999004" cy="873415"/>
+            <a:off x="8873173" y="1223364"/>
+            <a:ext cx="707097" cy="618205"/>
           </a:xfrm>
           <a:prstGeom prst="rect">
             <a:avLst/>
@@ -5170,47 +5170,255 @@
           <a:chExt cx="0" cy="0"/>
         </a:xfrm>
       </p:grpSpPr>
-      <p:cxnSp>
-        <p:nvCxnSpPr>
-          <p:cNvPr id="7" name="Straight Arrow Connector 6">
-            <a:extLst>
-              <a:ext uri="{FF2B5EF4-FFF2-40B4-BE49-F238E27FC236}">
-                <a16:creationId xmlns:a16="http://schemas.microsoft.com/office/drawing/2014/main" id="{851E35A8-477F-47AE-9386-4DE3436876AB}"/>
-              </a:ext>
-            </a:extLst>
-          </p:cNvPr>
-          <p:cNvCxnSpPr>
-            <a:cxnSpLocks/>
-          </p:cNvCxnSpPr>
+      <p:sp>
+        <p:nvSpPr>
+          <p:cNvPr id="2" name="Rectangle: Rounded Corners 1">
+            <a:extLst>
+              <a:ext uri="{FF2B5EF4-FFF2-40B4-BE49-F238E27FC236}">
+                <a16:creationId xmlns:a16="http://schemas.microsoft.com/office/drawing/2014/main" id="{4A921185-E106-42E4-89C9-5F5C2F713B29}"/>
+              </a:ext>
+            </a:extLst>
+          </p:cNvPr>
+          <p:cNvSpPr/>
           <p:nvPr/>
-        </p:nvCxnSpPr>
-        <p:spPr>
-          <a:xfrm flipV="1">
-            <a:off x="6202565" y="1312333"/>
-            <a:ext cx="2628168" cy="2726267"/>
-          </a:xfrm>
-          <a:prstGeom prst="straightConnector1">
+        </p:nvSpPr>
+        <p:spPr>
+          <a:xfrm>
+            <a:off x="7217837" y="2158999"/>
+            <a:ext cx="2954867" cy="1871134"/>
+          </a:xfrm>
+          <a:prstGeom prst="roundRect">
             <a:avLst/>
           </a:prstGeom>
-          <a:ln>
-            <a:tailEnd type="triangle"/>
-          </a:ln>
         </p:spPr>
         <p:style>
-          <a:lnRef idx="3">
-            <a:schemeClr val="dk1"/>
+          <a:lnRef idx="2">
+            <a:schemeClr val="accent1">
+              <a:shade val="50000"/>
+            </a:schemeClr>
           </a:lnRef>
-          <a:fillRef idx="0">
-            <a:schemeClr val="dk1"/>
+          <a:fillRef idx="1">
+            <a:schemeClr val="accent1"/>
           </a:fillRef>
-          <a:effectRef idx="2">
-            <a:schemeClr val="dk1"/>
+          <a:effectRef idx="0">
+            <a:schemeClr val="accent1"/>
           </a:effectRef>
           <a:fontRef idx="minor">
-            <a:schemeClr val="tx1"/>
+            <a:schemeClr val="lt1"/>
           </a:fontRef>
         </p:style>
-      </p:cxnSp>
+        <p:txBody>
+          <a:bodyPr rtlCol="0" anchor="ctr"/>
+          <a:lstStyle/>
+          <a:p>
+            <a:pPr algn="ctr"/>
+            <a:r>
+              <a:rPr lang="en-CA" dirty="0" err="1"/>
+              <a:t>Backbuffer</a:t>
+            </a:r>
+            <a:endParaRPr lang="en-CA" dirty="0"/>
+          </a:p>
+        </p:txBody>
+      </p:sp>
+      <p:sp>
+        <p:nvSpPr>
+          <p:cNvPr id="4" name="Rectangle: Rounded Corners 3">
+            <a:extLst>
+              <a:ext uri="{FF2B5EF4-FFF2-40B4-BE49-F238E27FC236}">
+                <a16:creationId xmlns:a16="http://schemas.microsoft.com/office/drawing/2014/main" id="{026A6FBF-F298-48BD-9390-C0167BC7BC0D}"/>
+              </a:ext>
+            </a:extLst>
+          </p:cNvPr>
+          <p:cNvSpPr/>
+          <p:nvPr/>
+        </p:nvSpPr>
+        <p:spPr>
+          <a:xfrm>
+            <a:off x="10481740" y="2158999"/>
+            <a:ext cx="2954867" cy="1871134"/>
+          </a:xfrm>
+          <a:prstGeom prst="roundRect">
+            <a:avLst/>
+          </a:prstGeom>
+        </p:spPr>
+        <p:style>
+          <a:lnRef idx="2">
+            <a:schemeClr val="accent1">
+              <a:shade val="50000"/>
+            </a:schemeClr>
+          </a:lnRef>
+          <a:fillRef idx="1">
+            <a:schemeClr val="accent1"/>
+          </a:fillRef>
+          <a:effectRef idx="0">
+            <a:schemeClr val="accent1"/>
+          </a:effectRef>
+          <a:fontRef idx="minor">
+            <a:schemeClr val="lt1"/>
+          </a:fontRef>
+        </p:style>
+        <p:txBody>
+          <a:bodyPr rtlCol="0" anchor="ctr"/>
+          <a:lstStyle/>
+          <a:p>
+            <a:pPr algn="ctr"/>
+            <a:r>
+              <a:rPr lang="en-CA" dirty="0" err="1"/>
+              <a:t>FrontBuffer</a:t>
+            </a:r>
+            <a:endParaRPr lang="en-CA" dirty="0"/>
+          </a:p>
+        </p:txBody>
+      </p:sp>
+      <p:sp>
+        <p:nvSpPr>
+          <p:cNvPr id="5" name="Rectangle: Rounded Corners 4">
+            <a:extLst>
+              <a:ext uri="{FF2B5EF4-FFF2-40B4-BE49-F238E27FC236}">
+                <a16:creationId xmlns:a16="http://schemas.microsoft.com/office/drawing/2014/main" id="{FED68487-665C-4133-BEE5-0BE8C01F4C4D}"/>
+              </a:ext>
+            </a:extLst>
+          </p:cNvPr>
+          <p:cNvSpPr/>
+          <p:nvPr/>
+        </p:nvSpPr>
+        <p:spPr>
+          <a:xfrm>
+            <a:off x="3953934" y="2158999"/>
+            <a:ext cx="2954867" cy="1871134"/>
+          </a:xfrm>
+          <a:prstGeom prst="roundRect">
+            <a:avLst/>
+          </a:prstGeom>
+        </p:spPr>
+        <p:style>
+          <a:lnRef idx="2">
+            <a:schemeClr val="accent1">
+              <a:shade val="50000"/>
+            </a:schemeClr>
+          </a:lnRef>
+          <a:fillRef idx="1">
+            <a:schemeClr val="accent1"/>
+          </a:fillRef>
+          <a:effectRef idx="0">
+            <a:schemeClr val="accent1"/>
+          </a:effectRef>
+          <a:fontRef idx="minor">
+            <a:schemeClr val="lt1"/>
+          </a:fontRef>
+        </p:style>
+        <p:txBody>
+          <a:bodyPr rtlCol="0" anchor="ctr"/>
+          <a:lstStyle/>
+          <a:p>
+            <a:pPr algn="ctr"/>
+            <a:r>
+              <a:rPr lang="en-CA" dirty="0"/>
+              <a:t>2</a:t>
+            </a:r>
+            <a:r>
+              <a:rPr lang="en-CA" baseline="30000" dirty="0"/>
+              <a:t>nd</a:t>
+            </a:r>
+            <a:r>
+              <a:rPr lang="en-CA" dirty="0"/>
+              <a:t> buffer</a:t>
+            </a:r>
+          </a:p>
+        </p:txBody>
+      </p:sp>
+      <p:sp>
+        <p:nvSpPr>
+          <p:cNvPr id="3" name="Arrow: Up 2">
+            <a:extLst>
+              <a:ext uri="{FF2B5EF4-FFF2-40B4-BE49-F238E27FC236}">
+                <a16:creationId xmlns:a16="http://schemas.microsoft.com/office/drawing/2014/main" id="{3222125F-ADA3-45C2-BBB3-2D7DC44F63B3}"/>
+              </a:ext>
+            </a:extLst>
+          </p:cNvPr>
+          <p:cNvSpPr/>
+          <p:nvPr/>
+        </p:nvSpPr>
+        <p:spPr>
+          <a:xfrm>
+            <a:off x="10879548" y="4117703"/>
+            <a:ext cx="1413933" cy="1828800"/>
+          </a:xfrm>
+          <a:prstGeom prst="upArrow">
+            <a:avLst/>
+          </a:prstGeom>
+        </p:spPr>
+        <p:style>
+          <a:lnRef idx="2">
+            <a:schemeClr val="accent1">
+              <a:shade val="50000"/>
+            </a:schemeClr>
+          </a:lnRef>
+          <a:fillRef idx="1">
+            <a:schemeClr val="accent1"/>
+          </a:fillRef>
+          <a:effectRef idx="0">
+            <a:schemeClr val="accent1"/>
+          </a:effectRef>
+          <a:fontRef idx="minor">
+            <a:schemeClr val="lt1"/>
+          </a:fontRef>
+        </p:style>
+        <p:txBody>
+          <a:bodyPr rtlCol="0" anchor="ctr"/>
+          <a:lstStyle/>
+          <a:p>
+            <a:pPr algn="ctr"/>
+            <a:endParaRPr lang="en-CA"/>
+          </a:p>
+        </p:txBody>
+      </p:sp>
+      <p:sp>
+        <p:nvSpPr>
+          <p:cNvPr id="8" name="Arrow: Up 7">
+            <a:extLst>
+              <a:ext uri="{FF2B5EF4-FFF2-40B4-BE49-F238E27FC236}">
+                <a16:creationId xmlns:a16="http://schemas.microsoft.com/office/drawing/2014/main" id="{877E314E-2D3F-4A1F-A031-7F28BE2D3315}"/>
+              </a:ext>
+            </a:extLst>
+          </p:cNvPr>
+          <p:cNvSpPr/>
+          <p:nvPr/>
+        </p:nvSpPr>
+        <p:spPr>
+          <a:xfrm>
+            <a:off x="4800599" y="4318000"/>
+            <a:ext cx="1413933" cy="1828800"/>
+          </a:xfrm>
+          <a:prstGeom prst="upArrow">
+            <a:avLst/>
+          </a:prstGeom>
+        </p:spPr>
+        <p:style>
+          <a:lnRef idx="2">
+            <a:schemeClr val="accent1">
+              <a:shade val="50000"/>
+            </a:schemeClr>
+          </a:lnRef>
+          <a:fillRef idx="1">
+            <a:schemeClr val="accent1"/>
+          </a:fillRef>
+          <a:effectRef idx="0">
+            <a:schemeClr val="accent1"/>
+          </a:effectRef>
+          <a:fontRef idx="minor">
+            <a:schemeClr val="lt1"/>
+          </a:fontRef>
+        </p:style>
+        <p:txBody>
+          <a:bodyPr rtlCol="0" anchor="ctr"/>
+          <a:lstStyle/>
+          <a:p>
+            <a:pPr algn="ctr"/>
+            <a:endParaRPr lang="en-CA"/>
+          </a:p>
+        </p:txBody>
+      </p:sp>
     </p:spTree>
     <p:extLst>
       <p:ext uri="{BB962C8B-B14F-4D97-AF65-F5344CB8AC3E}">

</xml_diff>

<commit_message>
Scalling (almost - code incomplete) models to same size
</commit_message>
<xml_diff>
--- a/Day2Day/Day_01/S1_Note.pptx
+++ b/Day2Day/Day_01/S1_Note.pptx
@@ -11,6 +11,7 @@
     <p:sldId id="258" r:id="rId5"/>
     <p:sldId id="259" r:id="rId6"/>
     <p:sldId id="261" r:id="rId7"/>
+    <p:sldId id="262" r:id="rId8"/>
   </p:sldIdLst>
   <p:sldSz cx="12192000" cy="6858000"/>
   <p:notesSz cx="6858000" cy="9144000"/>
@@ -266,7 +267,7 @@
           <a:p>
             <a:fld id="{41FBF7B5-8CD3-4D87-8075-6B63450ED684}" type="datetimeFigureOut">
               <a:rPr lang="en-CA" smtClean="0"/>
-              <a:t>2021-05-14</a:t>
+              <a:t>2021-05-18</a:t>
             </a:fld>
             <a:endParaRPr lang="en-CA"/>
           </a:p>
@@ -466,7 +467,7 @@
           <a:p>
             <a:fld id="{41FBF7B5-8CD3-4D87-8075-6B63450ED684}" type="datetimeFigureOut">
               <a:rPr lang="en-CA" smtClean="0"/>
-              <a:t>2021-05-14</a:t>
+              <a:t>2021-05-18</a:t>
             </a:fld>
             <a:endParaRPr lang="en-CA"/>
           </a:p>
@@ -676,7 +677,7 @@
           <a:p>
             <a:fld id="{41FBF7B5-8CD3-4D87-8075-6B63450ED684}" type="datetimeFigureOut">
               <a:rPr lang="en-CA" smtClean="0"/>
-              <a:t>2021-05-14</a:t>
+              <a:t>2021-05-18</a:t>
             </a:fld>
             <a:endParaRPr lang="en-CA"/>
           </a:p>
@@ -876,7 +877,7 @@
           <a:p>
             <a:fld id="{41FBF7B5-8CD3-4D87-8075-6B63450ED684}" type="datetimeFigureOut">
               <a:rPr lang="en-CA" smtClean="0"/>
-              <a:t>2021-05-14</a:t>
+              <a:t>2021-05-18</a:t>
             </a:fld>
             <a:endParaRPr lang="en-CA"/>
           </a:p>
@@ -1152,7 +1153,7 @@
           <a:p>
             <a:fld id="{41FBF7B5-8CD3-4D87-8075-6B63450ED684}" type="datetimeFigureOut">
               <a:rPr lang="en-CA" smtClean="0"/>
-              <a:t>2021-05-14</a:t>
+              <a:t>2021-05-18</a:t>
             </a:fld>
             <a:endParaRPr lang="en-CA"/>
           </a:p>
@@ -1420,7 +1421,7 @@
           <a:p>
             <a:fld id="{41FBF7B5-8CD3-4D87-8075-6B63450ED684}" type="datetimeFigureOut">
               <a:rPr lang="en-CA" smtClean="0"/>
-              <a:t>2021-05-14</a:t>
+              <a:t>2021-05-18</a:t>
             </a:fld>
             <a:endParaRPr lang="en-CA"/>
           </a:p>
@@ -1835,7 +1836,7 @@
           <a:p>
             <a:fld id="{41FBF7B5-8CD3-4D87-8075-6B63450ED684}" type="datetimeFigureOut">
               <a:rPr lang="en-CA" smtClean="0"/>
-              <a:t>2021-05-14</a:t>
+              <a:t>2021-05-18</a:t>
             </a:fld>
             <a:endParaRPr lang="en-CA"/>
           </a:p>
@@ -1977,7 +1978,7 @@
           <a:p>
             <a:fld id="{41FBF7B5-8CD3-4D87-8075-6B63450ED684}" type="datetimeFigureOut">
               <a:rPr lang="en-CA" smtClean="0"/>
-              <a:t>2021-05-14</a:t>
+              <a:t>2021-05-18</a:t>
             </a:fld>
             <a:endParaRPr lang="en-CA"/>
           </a:p>
@@ -2090,7 +2091,7 @@
           <a:p>
             <a:fld id="{41FBF7B5-8CD3-4D87-8075-6B63450ED684}" type="datetimeFigureOut">
               <a:rPr lang="en-CA" smtClean="0"/>
-              <a:t>2021-05-14</a:t>
+              <a:t>2021-05-18</a:t>
             </a:fld>
             <a:endParaRPr lang="en-CA"/>
           </a:p>
@@ -2403,7 +2404,7 @@
           <a:p>
             <a:fld id="{41FBF7B5-8CD3-4D87-8075-6B63450ED684}" type="datetimeFigureOut">
               <a:rPr lang="en-CA" smtClean="0"/>
-              <a:t>2021-05-14</a:t>
+              <a:t>2021-05-18</a:t>
             </a:fld>
             <a:endParaRPr lang="en-CA"/>
           </a:p>
@@ -2692,7 +2693,7 @@
           <a:p>
             <a:fld id="{41FBF7B5-8CD3-4D87-8075-6B63450ED684}" type="datetimeFigureOut">
               <a:rPr lang="en-CA" smtClean="0"/>
-              <a:t>2021-05-14</a:t>
+              <a:t>2021-05-18</a:t>
             </a:fld>
             <a:endParaRPr lang="en-CA"/>
           </a:p>
@@ -2935,7 +2936,7 @@
           <a:p>
             <a:fld id="{41FBF7B5-8CD3-4D87-8075-6B63450ED684}" type="datetimeFigureOut">
               <a:rPr lang="en-CA" smtClean="0"/>
-              <a:t>2021-05-14</a:t>
+              <a:t>2021-05-18</a:t>
             </a:fld>
             <a:endParaRPr lang="en-CA"/>
           </a:p>
@@ -3817,7 +3818,7 @@
         </p:blipFill>
         <p:spPr>
           <a:xfrm>
-            <a:off x="3724432" y="726840"/>
+            <a:off x="3621416" y="820550"/>
             <a:ext cx="921469" cy="805627"/>
           </a:xfrm>
           <a:prstGeom prst="rect">
@@ -5423,6 +5424,1009 @@
     <p:extLst>
       <p:ext uri="{BB962C8B-B14F-4D97-AF65-F5344CB8AC3E}">
         <p14:creationId xmlns:p14="http://schemas.microsoft.com/office/powerpoint/2010/main" val="2959768038"/>
+      </p:ext>
+    </p:extLst>
+  </p:cSld>
+  <p:clrMapOvr>
+    <a:masterClrMapping/>
+  </p:clrMapOvr>
+</p:sld>
+</file>
+
+<file path=ppt/slides/slide7.xml><?xml version="1.0" encoding="utf-8"?>
+<p:sld xmlns:a="http://schemas.openxmlformats.org/drawingml/2006/main" xmlns:r="http://schemas.openxmlformats.org/officeDocument/2006/relationships" xmlns:p="http://schemas.openxmlformats.org/presentationml/2006/main">
+  <p:cSld>
+    <p:spTree>
+      <p:nvGrpSpPr>
+        <p:cNvPr id="1" name=""/>
+        <p:cNvGrpSpPr/>
+        <p:nvPr/>
+      </p:nvGrpSpPr>
+      <p:grpSpPr>
+        <a:xfrm>
+          <a:off x="0" y="0"/>
+          <a:ext cx="0" cy="0"/>
+          <a:chOff x="0" y="0"/>
+          <a:chExt cx="0" cy="0"/>
+        </a:xfrm>
+      </p:grpSpPr>
+      <p:sp>
+        <p:nvSpPr>
+          <p:cNvPr id="15" name="Rectangle: Rounded Corners 14">
+            <a:extLst>
+              <a:ext uri="{FF2B5EF4-FFF2-40B4-BE49-F238E27FC236}">
+                <a16:creationId xmlns:a16="http://schemas.microsoft.com/office/drawing/2014/main" id="{30115774-1F96-4364-B7D7-A1BDCB421378}"/>
+              </a:ext>
+            </a:extLst>
+          </p:cNvPr>
+          <p:cNvSpPr/>
+          <p:nvPr/>
+        </p:nvSpPr>
+        <p:spPr>
+          <a:xfrm>
+            <a:off x="15153" y="1744721"/>
+            <a:ext cx="1510301" cy="1684279"/>
+          </a:xfrm>
+          <a:prstGeom prst="roundRect">
+            <a:avLst/>
+          </a:prstGeom>
+        </p:spPr>
+        <p:style>
+          <a:lnRef idx="2">
+            <a:schemeClr val="accent1">
+              <a:shade val="50000"/>
+            </a:schemeClr>
+          </a:lnRef>
+          <a:fillRef idx="1">
+            <a:schemeClr val="accent1"/>
+          </a:fillRef>
+          <a:effectRef idx="0">
+            <a:schemeClr val="accent1"/>
+          </a:effectRef>
+          <a:fontRef idx="minor">
+            <a:schemeClr val="lt1"/>
+          </a:fontRef>
+        </p:style>
+        <p:txBody>
+          <a:bodyPr rtlCol="0" anchor="ctr"/>
+          <a:lstStyle/>
+          <a:p>
+            <a:pPr algn="ctr"/>
+            <a:r>
+              <a:rPr lang="en-CA" dirty="0"/>
+              <a:t>Some file</a:t>
+            </a:r>
+          </a:p>
+          <a:p>
+            <a:pPr algn="ctr"/>
+            <a:endParaRPr lang="en-CA" dirty="0"/>
+          </a:p>
+          <a:p>
+            <a:pPr algn="ctr"/>
+            <a:endParaRPr lang="en-CA" dirty="0"/>
+          </a:p>
+          <a:p>
+            <a:pPr algn="ctr"/>
+            <a:endParaRPr lang="en-CA" dirty="0"/>
+          </a:p>
+          <a:p>
+            <a:pPr algn="ctr"/>
+            <a:endParaRPr lang="en-CA" dirty="0"/>
+          </a:p>
+          <a:p>
+            <a:pPr algn="ctr"/>
+            <a:endParaRPr lang="en-CA" dirty="0"/>
+          </a:p>
+        </p:txBody>
+      </p:sp>
+      <p:sp>
+        <p:nvSpPr>
+          <p:cNvPr id="4" name="Rectangle: Rounded Corners 3">
+            <a:extLst>
+              <a:ext uri="{FF2B5EF4-FFF2-40B4-BE49-F238E27FC236}">
+                <a16:creationId xmlns:a16="http://schemas.microsoft.com/office/drawing/2014/main" id="{23300865-4CD3-4976-AFB6-501109152D3F}"/>
+              </a:ext>
+            </a:extLst>
+          </p:cNvPr>
+          <p:cNvSpPr/>
+          <p:nvPr/>
+        </p:nvSpPr>
+        <p:spPr>
+          <a:xfrm>
+            <a:off x="2463630" y="3188613"/>
+            <a:ext cx="2517169" cy="3410545"/>
+          </a:xfrm>
+          <a:prstGeom prst="roundRect">
+            <a:avLst/>
+          </a:prstGeom>
+        </p:spPr>
+        <p:style>
+          <a:lnRef idx="2">
+            <a:schemeClr val="accent1">
+              <a:shade val="50000"/>
+            </a:schemeClr>
+          </a:lnRef>
+          <a:fillRef idx="1">
+            <a:schemeClr val="accent1"/>
+          </a:fillRef>
+          <a:effectRef idx="0">
+            <a:schemeClr val="accent1"/>
+          </a:effectRef>
+          <a:fontRef idx="minor">
+            <a:schemeClr val="lt1"/>
+          </a:fontRef>
+        </p:style>
+        <p:txBody>
+          <a:bodyPr rtlCol="0" anchor="ctr"/>
+          <a:lstStyle/>
+          <a:p>
+            <a:pPr algn="ctr"/>
+            <a:r>
+              <a:rPr lang="en-CA" sz="3600" dirty="0"/>
+              <a:t>CPU</a:t>
+            </a:r>
+          </a:p>
+          <a:p>
+            <a:pPr algn="ctr"/>
+            <a:r>
+              <a:rPr lang="en-CA" sz="3600" dirty="0"/>
+              <a:t>C/C++</a:t>
+            </a:r>
+            <a:br>
+              <a:rPr lang="en-CA" sz="3600" dirty="0"/>
+            </a:br>
+            <a:r>
+              <a:rPr lang="en-CA" sz="3600" dirty="0"/>
+              <a:t>App.</a:t>
+            </a:r>
+          </a:p>
+        </p:txBody>
+      </p:sp>
+      <p:sp>
+        <p:nvSpPr>
+          <p:cNvPr id="5" name="Rectangle: Rounded Corners 4">
+            <a:extLst>
+              <a:ext uri="{FF2B5EF4-FFF2-40B4-BE49-F238E27FC236}">
+                <a16:creationId xmlns:a16="http://schemas.microsoft.com/office/drawing/2014/main" id="{63D3163B-DAD7-4EE6-A5FF-8951E1DE9D73}"/>
+              </a:ext>
+            </a:extLst>
+          </p:cNvPr>
+          <p:cNvSpPr/>
+          <p:nvPr/>
+        </p:nvSpPr>
+        <p:spPr>
+          <a:xfrm>
+            <a:off x="2811118" y="572879"/>
+            <a:ext cx="1976825" cy="3184989"/>
+          </a:xfrm>
+          <a:prstGeom prst="roundRect">
+            <a:avLst/>
+          </a:prstGeom>
+          <a:ln/>
+        </p:spPr>
+        <p:style>
+          <a:lnRef idx="3">
+            <a:schemeClr val="lt1"/>
+          </a:lnRef>
+          <a:fillRef idx="1">
+            <a:schemeClr val="accent4"/>
+          </a:fillRef>
+          <a:effectRef idx="1">
+            <a:schemeClr val="accent4"/>
+          </a:effectRef>
+          <a:fontRef idx="minor">
+            <a:schemeClr val="lt1"/>
+          </a:fontRef>
+        </p:style>
+        <p:txBody>
+          <a:bodyPr rtlCol="0" anchor="ctr"/>
+          <a:lstStyle/>
+          <a:p>
+            <a:pPr algn="ctr"/>
+            <a:endParaRPr lang="en-CA" sz="4000" dirty="0">
+              <a:solidFill>
+                <a:schemeClr val="tx1"/>
+              </a:solidFill>
+            </a:endParaRPr>
+          </a:p>
+          <a:p>
+            <a:pPr algn="ctr"/>
+            <a:endParaRPr lang="en-CA" sz="4000" dirty="0">
+              <a:solidFill>
+                <a:schemeClr val="tx1"/>
+              </a:solidFill>
+            </a:endParaRPr>
+          </a:p>
+          <a:p>
+            <a:pPr algn="ctr"/>
+            <a:r>
+              <a:rPr lang="en-CA" sz="4000" dirty="0">
+                <a:solidFill>
+                  <a:schemeClr val="tx1"/>
+                </a:solidFill>
+              </a:rPr>
+              <a:t>RAM</a:t>
+            </a:r>
+          </a:p>
+        </p:txBody>
+      </p:sp>
+      <p:sp>
+        <p:nvSpPr>
+          <p:cNvPr id="6" name="Rectangle: Rounded Corners 5">
+            <a:extLst>
+              <a:ext uri="{FF2B5EF4-FFF2-40B4-BE49-F238E27FC236}">
+                <a16:creationId xmlns:a16="http://schemas.microsoft.com/office/drawing/2014/main" id="{ECB27BA8-7E67-405D-9946-D9EF0EFC1164}"/>
+              </a:ext>
+            </a:extLst>
+          </p:cNvPr>
+          <p:cNvSpPr/>
+          <p:nvPr/>
+        </p:nvSpPr>
+        <p:spPr>
+          <a:xfrm>
+            <a:off x="6690525" y="3572475"/>
+            <a:ext cx="2517169" cy="2835667"/>
+          </a:xfrm>
+          <a:prstGeom prst="roundRect">
+            <a:avLst/>
+          </a:prstGeom>
+        </p:spPr>
+        <p:style>
+          <a:lnRef idx="2">
+            <a:schemeClr val="accent1">
+              <a:shade val="50000"/>
+            </a:schemeClr>
+          </a:lnRef>
+          <a:fillRef idx="1">
+            <a:schemeClr val="accent1"/>
+          </a:fillRef>
+          <a:effectRef idx="0">
+            <a:schemeClr val="accent1"/>
+          </a:effectRef>
+          <a:fontRef idx="minor">
+            <a:schemeClr val="lt1"/>
+          </a:fontRef>
+        </p:style>
+        <p:txBody>
+          <a:bodyPr rtlCol="0" anchor="ctr"/>
+          <a:lstStyle/>
+          <a:p>
+            <a:pPr algn="ctr"/>
+            <a:r>
+              <a:rPr lang="en-CA" sz="3600" dirty="0"/>
+              <a:t>GPU</a:t>
+            </a:r>
+          </a:p>
+          <a:p>
+            <a:pPr algn="ctr"/>
+            <a:r>
+              <a:rPr lang="en-CA" sz="3600" dirty="0"/>
+              <a:t>GLSL</a:t>
+            </a:r>
+          </a:p>
+          <a:p>
+            <a:pPr algn="ctr"/>
+            <a:r>
+              <a:rPr lang="en-CA" sz="3600" dirty="0"/>
+              <a:t>(Shaders)</a:t>
+            </a:r>
+          </a:p>
+        </p:txBody>
+      </p:sp>
+      <p:sp>
+        <p:nvSpPr>
+          <p:cNvPr id="7" name="Rectangle: Rounded Corners 6">
+            <a:extLst>
+              <a:ext uri="{FF2B5EF4-FFF2-40B4-BE49-F238E27FC236}">
+                <a16:creationId xmlns:a16="http://schemas.microsoft.com/office/drawing/2014/main" id="{E2FB0622-CCE2-4F9E-B49E-7C3B6E2841AA}"/>
+              </a:ext>
+            </a:extLst>
+          </p:cNvPr>
+          <p:cNvSpPr/>
+          <p:nvPr/>
+        </p:nvSpPr>
+        <p:spPr>
+          <a:xfrm>
+            <a:off x="6986596" y="315930"/>
+            <a:ext cx="1976825" cy="3629346"/>
+          </a:xfrm>
+          <a:prstGeom prst="roundRect">
+            <a:avLst/>
+          </a:prstGeom>
+          <a:ln/>
+        </p:spPr>
+        <p:style>
+          <a:lnRef idx="3">
+            <a:schemeClr val="lt1"/>
+          </a:lnRef>
+          <a:fillRef idx="1">
+            <a:schemeClr val="accent4"/>
+          </a:fillRef>
+          <a:effectRef idx="1">
+            <a:schemeClr val="accent4"/>
+          </a:effectRef>
+          <a:fontRef idx="minor">
+            <a:schemeClr val="lt1"/>
+          </a:fontRef>
+        </p:style>
+        <p:txBody>
+          <a:bodyPr rtlCol="0" anchor="ctr"/>
+          <a:lstStyle/>
+          <a:p>
+            <a:pPr algn="ctr"/>
+            <a:endParaRPr lang="en-CA" sz="4000" dirty="0">
+              <a:solidFill>
+                <a:schemeClr val="tx1"/>
+              </a:solidFill>
+            </a:endParaRPr>
+          </a:p>
+          <a:p>
+            <a:pPr algn="ctr"/>
+            <a:endParaRPr lang="en-CA" sz="4000" dirty="0">
+              <a:solidFill>
+                <a:schemeClr val="tx1"/>
+              </a:solidFill>
+            </a:endParaRPr>
+          </a:p>
+          <a:p>
+            <a:pPr algn="ctr"/>
+            <a:r>
+              <a:rPr lang="en-CA" sz="4000" dirty="0">
+                <a:solidFill>
+                  <a:schemeClr val="tx1"/>
+                </a:solidFill>
+              </a:rPr>
+              <a:t>VRAM</a:t>
+            </a:r>
+          </a:p>
+        </p:txBody>
+      </p:sp>
+      <p:sp>
+        <p:nvSpPr>
+          <p:cNvPr id="8" name="Arrow: Left-Right 7">
+            <a:extLst>
+              <a:ext uri="{FF2B5EF4-FFF2-40B4-BE49-F238E27FC236}">
+                <a16:creationId xmlns:a16="http://schemas.microsoft.com/office/drawing/2014/main" id="{E44932D0-93AA-47DD-A4E2-9A594093E7A7}"/>
+              </a:ext>
+            </a:extLst>
+          </p:cNvPr>
+          <p:cNvSpPr/>
+          <p:nvPr/>
+        </p:nvSpPr>
+        <p:spPr>
+          <a:xfrm>
+            <a:off x="4775701" y="1908425"/>
+            <a:ext cx="2133994" cy="1520575"/>
+          </a:xfrm>
+          <a:prstGeom prst="leftRightArrow">
+            <a:avLst/>
+          </a:prstGeom>
+        </p:spPr>
+        <p:style>
+          <a:lnRef idx="3">
+            <a:schemeClr val="lt1"/>
+          </a:lnRef>
+          <a:fillRef idx="1">
+            <a:schemeClr val="accent6"/>
+          </a:fillRef>
+          <a:effectRef idx="1">
+            <a:schemeClr val="accent6"/>
+          </a:effectRef>
+          <a:fontRef idx="minor">
+            <a:schemeClr val="lt1"/>
+          </a:fontRef>
+        </p:style>
+        <p:txBody>
+          <a:bodyPr rtlCol="0" anchor="ctr"/>
+          <a:lstStyle/>
+          <a:p>
+            <a:pPr algn="ctr"/>
+            <a:r>
+              <a:rPr lang="en-CA" sz="2400" dirty="0">
+                <a:solidFill>
+                  <a:schemeClr val="tx1"/>
+                </a:solidFill>
+              </a:rPr>
+              <a:t>OpenGL</a:t>
+            </a:r>
+          </a:p>
+        </p:txBody>
+      </p:sp>
+      <p:sp>
+        <p:nvSpPr>
+          <p:cNvPr id="10" name="Rectangle: Rounded Corners 9">
+            <a:extLst>
+              <a:ext uri="{FF2B5EF4-FFF2-40B4-BE49-F238E27FC236}">
+                <a16:creationId xmlns:a16="http://schemas.microsoft.com/office/drawing/2014/main" id="{7292551B-E407-4527-8073-E5A637B132A5}"/>
+              </a:ext>
+            </a:extLst>
+          </p:cNvPr>
+          <p:cNvSpPr/>
+          <p:nvPr/>
+        </p:nvSpPr>
+        <p:spPr>
+          <a:xfrm>
+            <a:off x="3286352" y="725996"/>
+            <a:ext cx="1381767" cy="1018725"/>
+          </a:xfrm>
+          <a:prstGeom prst="roundRect">
+            <a:avLst/>
+          </a:prstGeom>
+        </p:spPr>
+        <p:style>
+          <a:lnRef idx="2">
+            <a:schemeClr val="accent1">
+              <a:shade val="50000"/>
+            </a:schemeClr>
+          </a:lnRef>
+          <a:fillRef idx="1">
+            <a:schemeClr val="accent1"/>
+          </a:fillRef>
+          <a:effectRef idx="0">
+            <a:schemeClr val="accent1"/>
+          </a:effectRef>
+          <a:fontRef idx="minor">
+            <a:schemeClr val="lt1"/>
+          </a:fontRef>
+        </p:style>
+        <p:txBody>
+          <a:bodyPr rtlCol="0" anchor="ctr"/>
+          <a:lstStyle/>
+          <a:p>
+            <a:pPr algn="ctr"/>
+            <a:r>
+              <a:rPr lang="en-CA" dirty="0"/>
+              <a:t>Space Ship</a:t>
+            </a:r>
+          </a:p>
+        </p:txBody>
+      </p:sp>
+      <p:sp>
+        <p:nvSpPr>
+          <p:cNvPr id="11" name="Rectangle: Rounded Corners 10">
+            <a:extLst>
+              <a:ext uri="{FF2B5EF4-FFF2-40B4-BE49-F238E27FC236}">
+                <a16:creationId xmlns:a16="http://schemas.microsoft.com/office/drawing/2014/main" id="{BA201D68-537C-4E94-840A-A78E0BABFF37}"/>
+              </a:ext>
+            </a:extLst>
+          </p:cNvPr>
+          <p:cNvSpPr/>
+          <p:nvPr/>
+        </p:nvSpPr>
+        <p:spPr>
+          <a:xfrm>
+            <a:off x="7582328" y="424104"/>
+            <a:ext cx="1381093" cy="2709514"/>
+          </a:xfrm>
+          <a:prstGeom prst="roundRect">
+            <a:avLst/>
+          </a:prstGeom>
+        </p:spPr>
+        <p:style>
+          <a:lnRef idx="2">
+            <a:schemeClr val="accent1">
+              <a:shade val="50000"/>
+            </a:schemeClr>
+          </a:lnRef>
+          <a:fillRef idx="1">
+            <a:schemeClr val="accent1"/>
+          </a:fillRef>
+          <a:effectRef idx="0">
+            <a:schemeClr val="accent1"/>
+          </a:effectRef>
+          <a:fontRef idx="minor">
+            <a:schemeClr val="lt1"/>
+          </a:fontRef>
+        </p:style>
+        <p:txBody>
+          <a:bodyPr rtlCol="0" anchor="ctr"/>
+          <a:lstStyle/>
+          <a:p>
+            <a:pPr algn="ctr"/>
+            <a:r>
+              <a:rPr lang="en-CA" dirty="0"/>
+              <a:t>Space Ship</a:t>
+            </a:r>
+          </a:p>
+        </p:txBody>
+      </p:sp>
+      <p:pic>
+        <p:nvPicPr>
+          <p:cNvPr id="12" name="Picture 11">
+            <a:extLst>
+              <a:ext uri="{FF2B5EF4-FFF2-40B4-BE49-F238E27FC236}">
+                <a16:creationId xmlns:a16="http://schemas.microsoft.com/office/drawing/2014/main" id="{EB12CAF2-B127-473A-A7E7-F4C0C514DB78}"/>
+              </a:ext>
+            </a:extLst>
+          </p:cNvPr>
+          <p:cNvPicPr>
+            <a:picLocks noChangeAspect="1"/>
+          </p:cNvPicPr>
+          <p:nvPr/>
+        </p:nvPicPr>
+        <p:blipFill>
+          <a:blip r:embed="rId2"/>
+          <a:stretch>
+            <a:fillRect/>
+          </a:stretch>
+        </p:blipFill>
+        <p:spPr>
+          <a:xfrm>
+            <a:off x="3621601" y="735883"/>
+            <a:ext cx="921469" cy="805627"/>
+          </a:xfrm>
+          <a:prstGeom prst="rect">
+            <a:avLst/>
+          </a:prstGeom>
+        </p:spPr>
+      </p:pic>
+      <p:sp>
+        <p:nvSpPr>
+          <p:cNvPr id="2" name="Rectangle: Rounded Corners 1">
+            <a:extLst>
+              <a:ext uri="{FF2B5EF4-FFF2-40B4-BE49-F238E27FC236}">
+                <a16:creationId xmlns:a16="http://schemas.microsoft.com/office/drawing/2014/main" id="{1A83AD1B-ECA9-46A0-A61F-076EAAFA5D3E}"/>
+              </a:ext>
+            </a:extLst>
+          </p:cNvPr>
+          <p:cNvSpPr/>
+          <p:nvPr/>
+        </p:nvSpPr>
+        <p:spPr>
+          <a:xfrm>
+            <a:off x="10277454" y="2213183"/>
+            <a:ext cx="1821413" cy="2197950"/>
+          </a:xfrm>
+          <a:prstGeom prst="roundRect">
+            <a:avLst/>
+          </a:prstGeom>
+        </p:spPr>
+        <p:style>
+          <a:lnRef idx="2">
+            <a:schemeClr val="accent1">
+              <a:shade val="50000"/>
+            </a:schemeClr>
+          </a:lnRef>
+          <a:fillRef idx="1">
+            <a:schemeClr val="accent1"/>
+          </a:fillRef>
+          <a:effectRef idx="0">
+            <a:schemeClr val="accent1"/>
+          </a:effectRef>
+          <a:fontRef idx="minor">
+            <a:schemeClr val="lt1"/>
+          </a:fontRef>
+        </p:style>
+        <p:txBody>
+          <a:bodyPr rtlCol="0" anchor="ctr"/>
+          <a:lstStyle/>
+          <a:p>
+            <a:pPr algn="ctr"/>
+            <a:r>
+              <a:rPr lang="en-CA" dirty="0"/>
+              <a:t>“Back buffer”</a:t>
+            </a:r>
+          </a:p>
+          <a:p>
+            <a:pPr algn="ctr"/>
+            <a:endParaRPr lang="en-CA" dirty="0"/>
+          </a:p>
+          <a:p>
+            <a:pPr algn="ctr"/>
+            <a:endParaRPr lang="en-CA" dirty="0"/>
+          </a:p>
+          <a:p>
+            <a:pPr algn="ctr"/>
+            <a:endParaRPr lang="en-CA" dirty="0"/>
+          </a:p>
+          <a:p>
+            <a:pPr algn="ctr"/>
+            <a:endParaRPr lang="en-CA" dirty="0"/>
+          </a:p>
+          <a:p>
+            <a:pPr algn="ctr"/>
+            <a:endParaRPr lang="en-CA" dirty="0"/>
+          </a:p>
+        </p:txBody>
+      </p:sp>
+      <p:pic>
+        <p:nvPicPr>
+          <p:cNvPr id="9" name="Picture 8">
+            <a:extLst>
+              <a:ext uri="{FF2B5EF4-FFF2-40B4-BE49-F238E27FC236}">
+                <a16:creationId xmlns:a16="http://schemas.microsoft.com/office/drawing/2014/main" id="{D49148BA-FE05-4427-88ED-439AE8B58E02}"/>
+              </a:ext>
+            </a:extLst>
+          </p:cNvPr>
+          <p:cNvPicPr>
+            <a:picLocks noChangeAspect="1"/>
+          </p:cNvPicPr>
+          <p:nvPr/>
+        </p:nvPicPr>
+        <p:blipFill>
+          <a:blip r:embed="rId3"/>
+          <a:stretch>
+            <a:fillRect/>
+          </a:stretch>
+        </p:blipFill>
+        <p:spPr>
+          <a:xfrm>
+            <a:off x="10528335" y="3052556"/>
+            <a:ext cx="1417482" cy="1239853"/>
+          </a:xfrm>
+          <a:prstGeom prst="rect">
+            <a:avLst/>
+          </a:prstGeom>
+        </p:spPr>
+      </p:pic>
+      <p:pic>
+        <p:nvPicPr>
+          <p:cNvPr id="13" name="Picture 12">
+            <a:extLst>
+              <a:ext uri="{FF2B5EF4-FFF2-40B4-BE49-F238E27FC236}">
+                <a16:creationId xmlns:a16="http://schemas.microsoft.com/office/drawing/2014/main" id="{2D90FB95-9AC4-4C8A-BEB1-89B477A8501A}"/>
+              </a:ext>
+            </a:extLst>
+          </p:cNvPr>
+          <p:cNvPicPr>
+            <a:picLocks noChangeAspect="1"/>
+          </p:cNvPicPr>
+          <p:nvPr/>
+        </p:nvPicPr>
+        <p:blipFill>
+          <a:blip r:embed="rId2"/>
+          <a:stretch>
+            <a:fillRect/>
+          </a:stretch>
+        </p:blipFill>
+        <p:spPr>
+          <a:xfrm>
+            <a:off x="8041952" y="686694"/>
+            <a:ext cx="921469" cy="805627"/>
+          </a:xfrm>
+          <a:prstGeom prst="rect">
+            <a:avLst/>
+          </a:prstGeom>
+        </p:spPr>
+      </p:pic>
+      <p:sp>
+        <p:nvSpPr>
+          <p:cNvPr id="3" name="Arrow: Right 2">
+            <a:extLst>
+              <a:ext uri="{FF2B5EF4-FFF2-40B4-BE49-F238E27FC236}">
+                <a16:creationId xmlns:a16="http://schemas.microsoft.com/office/drawing/2014/main" id="{AE4EC69F-B0AF-4C8E-BD06-054127984C45}"/>
+              </a:ext>
+            </a:extLst>
+          </p:cNvPr>
+          <p:cNvSpPr/>
+          <p:nvPr/>
+        </p:nvSpPr>
+        <p:spPr>
+          <a:xfrm>
+            <a:off x="8963421" y="2668712"/>
+            <a:ext cx="1233398" cy="940381"/>
+          </a:xfrm>
+          <a:prstGeom prst="rightArrow">
+            <a:avLst/>
+          </a:prstGeom>
+        </p:spPr>
+        <p:style>
+          <a:lnRef idx="3">
+            <a:schemeClr val="lt1"/>
+          </a:lnRef>
+          <a:fillRef idx="1">
+            <a:schemeClr val="accent6"/>
+          </a:fillRef>
+          <a:effectRef idx="1">
+            <a:schemeClr val="accent6"/>
+          </a:effectRef>
+          <a:fontRef idx="minor">
+            <a:schemeClr val="lt1"/>
+          </a:fontRef>
+        </p:style>
+        <p:txBody>
+          <a:bodyPr rtlCol="0" anchor="ctr"/>
+          <a:lstStyle/>
+          <a:p>
+            <a:pPr algn="ctr"/>
+            <a:endParaRPr lang="en-CA" sz="2400">
+              <a:solidFill>
+                <a:schemeClr val="tx1"/>
+              </a:solidFill>
+            </a:endParaRPr>
+          </a:p>
+        </p:txBody>
+      </p:sp>
+      <p:pic>
+        <p:nvPicPr>
+          <p:cNvPr id="14" name="Picture 13">
+            <a:extLst>
+              <a:ext uri="{FF2B5EF4-FFF2-40B4-BE49-F238E27FC236}">
+                <a16:creationId xmlns:a16="http://schemas.microsoft.com/office/drawing/2014/main" id="{85493239-BA0F-4FAD-807B-E804938620B7}"/>
+              </a:ext>
+            </a:extLst>
+          </p:cNvPr>
+          <p:cNvPicPr>
+            <a:picLocks noChangeAspect="1"/>
+          </p:cNvPicPr>
+          <p:nvPr/>
+        </p:nvPicPr>
+        <p:blipFill>
+          <a:blip r:embed="rId2"/>
+          <a:stretch>
+            <a:fillRect/>
+          </a:stretch>
+        </p:blipFill>
+        <p:spPr>
+          <a:xfrm>
+            <a:off x="351150" y="2213183"/>
+            <a:ext cx="921469" cy="805627"/>
+          </a:xfrm>
+          <a:prstGeom prst="rect">
+            <a:avLst/>
+          </a:prstGeom>
+        </p:spPr>
+      </p:pic>
+      <p:sp>
+        <p:nvSpPr>
+          <p:cNvPr id="16" name="Arrow: Right 15">
+            <a:extLst>
+              <a:ext uri="{FF2B5EF4-FFF2-40B4-BE49-F238E27FC236}">
+                <a16:creationId xmlns:a16="http://schemas.microsoft.com/office/drawing/2014/main" id="{A3BB2F04-54FC-473B-8ACD-5CB1D22DAD37}"/>
+              </a:ext>
+            </a:extLst>
+          </p:cNvPr>
+          <p:cNvSpPr/>
+          <p:nvPr/>
+        </p:nvSpPr>
+        <p:spPr>
+          <a:xfrm>
+            <a:off x="1497085" y="1934195"/>
+            <a:ext cx="1400236" cy="940381"/>
+          </a:xfrm>
+          <a:prstGeom prst="rightArrow">
+            <a:avLst/>
+          </a:prstGeom>
+        </p:spPr>
+        <p:style>
+          <a:lnRef idx="3">
+            <a:schemeClr val="lt1"/>
+          </a:lnRef>
+          <a:fillRef idx="1">
+            <a:schemeClr val="accent6"/>
+          </a:fillRef>
+          <a:effectRef idx="1">
+            <a:schemeClr val="accent6"/>
+          </a:effectRef>
+          <a:fontRef idx="minor">
+            <a:schemeClr val="lt1"/>
+          </a:fontRef>
+        </p:style>
+        <p:txBody>
+          <a:bodyPr rtlCol="0" anchor="ctr"/>
+          <a:lstStyle/>
+          <a:p>
+            <a:pPr algn="ctr"/>
+            <a:endParaRPr lang="en-CA" sz="2400">
+              <a:solidFill>
+                <a:schemeClr val="tx1"/>
+              </a:solidFill>
+            </a:endParaRPr>
+          </a:p>
+        </p:txBody>
+      </p:sp>
+      <p:sp>
+        <p:nvSpPr>
+          <p:cNvPr id="24" name="Rectangle: Rounded Corners 23">
+            <a:extLst>
+              <a:ext uri="{FF2B5EF4-FFF2-40B4-BE49-F238E27FC236}">
+                <a16:creationId xmlns:a16="http://schemas.microsoft.com/office/drawing/2014/main" id="{06A6B7AD-9677-41B1-A0EA-F8B4EF68260C}"/>
+              </a:ext>
+            </a:extLst>
+          </p:cNvPr>
+          <p:cNvSpPr/>
+          <p:nvPr/>
+        </p:nvSpPr>
+        <p:spPr>
+          <a:xfrm>
+            <a:off x="-28706" y="3765574"/>
+            <a:ext cx="1510301" cy="1684279"/>
+          </a:xfrm>
+          <a:prstGeom prst="roundRect">
+            <a:avLst/>
+          </a:prstGeom>
+        </p:spPr>
+        <p:style>
+          <a:lnRef idx="2">
+            <a:schemeClr val="accent1">
+              <a:shade val="50000"/>
+            </a:schemeClr>
+          </a:lnRef>
+          <a:fillRef idx="1">
+            <a:schemeClr val="accent1"/>
+          </a:fillRef>
+          <a:effectRef idx="0">
+            <a:schemeClr val="accent1"/>
+          </a:effectRef>
+          <a:fontRef idx="minor">
+            <a:schemeClr val="lt1"/>
+          </a:fontRef>
+        </p:style>
+        <p:txBody>
+          <a:bodyPr rtlCol="0" anchor="ctr"/>
+          <a:lstStyle/>
+          <a:p>
+            <a:pPr algn="ctr"/>
+            <a:r>
+              <a:rPr lang="en-CA" dirty="0"/>
+              <a:t>Some file</a:t>
+            </a:r>
+          </a:p>
+          <a:p>
+            <a:pPr algn="ctr"/>
+            <a:endParaRPr lang="en-CA" dirty="0"/>
+          </a:p>
+          <a:p>
+            <a:pPr algn="ctr"/>
+            <a:endParaRPr lang="en-CA" dirty="0"/>
+          </a:p>
+          <a:p>
+            <a:pPr algn="ctr"/>
+            <a:endParaRPr lang="en-CA" dirty="0"/>
+          </a:p>
+          <a:p>
+            <a:pPr algn="ctr"/>
+            <a:endParaRPr lang="en-CA" dirty="0"/>
+          </a:p>
+          <a:p>
+            <a:pPr algn="ctr"/>
+            <a:endParaRPr lang="en-CA" dirty="0"/>
+          </a:p>
+        </p:txBody>
+      </p:sp>
+      <p:pic>
+        <p:nvPicPr>
+          <p:cNvPr id="27" name="Picture 26">
+            <a:extLst>
+              <a:ext uri="{FF2B5EF4-FFF2-40B4-BE49-F238E27FC236}">
+                <a16:creationId xmlns:a16="http://schemas.microsoft.com/office/drawing/2014/main" id="{F9887602-B08F-4BCB-BC5C-ADF2ADE64531}"/>
+              </a:ext>
+            </a:extLst>
+          </p:cNvPr>
+          <p:cNvPicPr>
+            <a:picLocks noChangeAspect="1"/>
+          </p:cNvPicPr>
+          <p:nvPr/>
+        </p:nvPicPr>
+        <p:blipFill>
+          <a:blip r:embed="rId4"/>
+          <a:stretch>
+            <a:fillRect/>
+          </a:stretch>
+        </p:blipFill>
+        <p:spPr>
+          <a:xfrm>
+            <a:off x="-28706" y="4292409"/>
+            <a:ext cx="1487238" cy="881247"/>
+          </a:xfrm>
+          <a:prstGeom prst="rect">
+            <a:avLst/>
+          </a:prstGeom>
+        </p:spPr>
+      </p:pic>
+      <p:sp>
+        <p:nvSpPr>
+          <p:cNvPr id="29" name="Rectangle: Rounded Corners 28">
+            <a:extLst>
+              <a:ext uri="{FF2B5EF4-FFF2-40B4-BE49-F238E27FC236}">
+                <a16:creationId xmlns:a16="http://schemas.microsoft.com/office/drawing/2014/main" id="{C2977E31-FD61-473A-BEA4-1A01DC5D73D9}"/>
+              </a:ext>
+            </a:extLst>
+          </p:cNvPr>
+          <p:cNvSpPr/>
+          <p:nvPr/>
+        </p:nvSpPr>
+        <p:spPr>
+          <a:xfrm>
+            <a:off x="3007386" y="1934195"/>
+            <a:ext cx="1717054" cy="1343261"/>
+          </a:xfrm>
+          <a:prstGeom prst="roundRect">
+            <a:avLst/>
+          </a:prstGeom>
+        </p:spPr>
+        <p:style>
+          <a:lnRef idx="2">
+            <a:schemeClr val="accent1">
+              <a:shade val="50000"/>
+            </a:schemeClr>
+          </a:lnRef>
+          <a:fillRef idx="1">
+            <a:schemeClr val="accent1"/>
+          </a:fillRef>
+          <a:effectRef idx="0">
+            <a:schemeClr val="accent1"/>
+          </a:effectRef>
+          <a:fontRef idx="minor">
+            <a:schemeClr val="lt1"/>
+          </a:fontRef>
+        </p:style>
+        <p:txBody>
+          <a:bodyPr rtlCol="0" anchor="ctr"/>
+          <a:lstStyle/>
+          <a:p>
+            <a:pPr algn="ctr"/>
+            <a:r>
+              <a:rPr lang="en-CA" dirty="0"/>
+              <a:t>Space Ship</a:t>
+            </a:r>
+          </a:p>
+        </p:txBody>
+      </p:sp>
+      <p:pic>
+        <p:nvPicPr>
+          <p:cNvPr id="28" name="Picture 27">
+            <a:extLst>
+              <a:ext uri="{FF2B5EF4-FFF2-40B4-BE49-F238E27FC236}">
+                <a16:creationId xmlns:a16="http://schemas.microsoft.com/office/drawing/2014/main" id="{9659D843-E78E-48B4-A902-FC659B1ABD9E}"/>
+              </a:ext>
+            </a:extLst>
+          </p:cNvPr>
+          <p:cNvPicPr>
+            <a:picLocks noChangeAspect="1"/>
+          </p:cNvPicPr>
+          <p:nvPr/>
+        </p:nvPicPr>
+        <p:blipFill>
+          <a:blip r:embed="rId4"/>
+          <a:stretch>
+            <a:fillRect/>
+          </a:stretch>
+        </p:blipFill>
+        <p:spPr>
+          <a:xfrm>
+            <a:off x="3237202" y="2220888"/>
+            <a:ext cx="1487238" cy="881247"/>
+          </a:xfrm>
+          <a:prstGeom prst="rect">
+            <a:avLst/>
+          </a:prstGeom>
+        </p:spPr>
+      </p:pic>
+      <p:pic>
+        <p:nvPicPr>
+          <p:cNvPr id="30" name="Picture 29">
+            <a:extLst>
+              <a:ext uri="{FF2B5EF4-FFF2-40B4-BE49-F238E27FC236}">
+                <a16:creationId xmlns:a16="http://schemas.microsoft.com/office/drawing/2014/main" id="{A776622B-BC64-4A76-B54F-98E9E4E4F4A9}"/>
+              </a:ext>
+            </a:extLst>
+          </p:cNvPr>
+          <p:cNvPicPr>
+            <a:picLocks noChangeAspect="1"/>
+          </p:cNvPicPr>
+          <p:nvPr/>
+        </p:nvPicPr>
+        <p:blipFill>
+          <a:blip r:embed="rId4"/>
+          <a:stretch>
+            <a:fillRect/>
+          </a:stretch>
+        </p:blipFill>
+        <p:spPr>
+          <a:xfrm>
+            <a:off x="7835685" y="1665130"/>
+            <a:ext cx="1608628" cy="953175"/>
+          </a:xfrm>
+          <a:prstGeom prst="rect">
+            <a:avLst/>
+          </a:prstGeom>
+        </p:spPr>
+      </p:pic>
+    </p:spTree>
+    <p:extLst>
+      <p:ext uri="{BB962C8B-B14F-4D97-AF65-F5344CB8AC3E}">
+        <p14:creationId xmlns:p14="http://schemas.microsoft.com/office/powerpoint/2010/main" val="3055170005"/>
       </p:ext>
     </p:extLst>
   </p:cSld>

</xml_diff>

<commit_message>
Not sure if I saved the latest fragment shader...
</commit_message>
<xml_diff>
--- a/Day2Day/Day_01/S1_Note.pptx
+++ b/Day2Day/Day_01/S1_Note.pptx
@@ -11,7 +11,8 @@
     <p:sldId id="258" r:id="rId5"/>
     <p:sldId id="259" r:id="rId6"/>
     <p:sldId id="261" r:id="rId7"/>
-    <p:sldId id="262" r:id="rId8"/>
+    <p:sldId id="263" r:id="rId8"/>
+    <p:sldId id="262" r:id="rId9"/>
   </p:sldIdLst>
   <p:sldSz cx="12192000" cy="6858000"/>
   <p:notesSz cx="6858000" cy="9144000"/>
@@ -267,7 +268,7 @@
           <a:p>
             <a:fld id="{41FBF7B5-8CD3-4D87-8075-6B63450ED684}" type="datetimeFigureOut">
               <a:rPr lang="en-CA" smtClean="0"/>
-              <a:t>2021-05-18</a:t>
+              <a:t>2021-05-19</a:t>
             </a:fld>
             <a:endParaRPr lang="en-CA"/>
           </a:p>
@@ -467,7 +468,7 @@
           <a:p>
             <a:fld id="{41FBF7B5-8CD3-4D87-8075-6B63450ED684}" type="datetimeFigureOut">
               <a:rPr lang="en-CA" smtClean="0"/>
-              <a:t>2021-05-18</a:t>
+              <a:t>2021-05-19</a:t>
             </a:fld>
             <a:endParaRPr lang="en-CA"/>
           </a:p>
@@ -677,7 +678,7 @@
           <a:p>
             <a:fld id="{41FBF7B5-8CD3-4D87-8075-6B63450ED684}" type="datetimeFigureOut">
               <a:rPr lang="en-CA" smtClean="0"/>
-              <a:t>2021-05-18</a:t>
+              <a:t>2021-05-19</a:t>
             </a:fld>
             <a:endParaRPr lang="en-CA"/>
           </a:p>
@@ -877,7 +878,7 @@
           <a:p>
             <a:fld id="{41FBF7B5-8CD3-4D87-8075-6B63450ED684}" type="datetimeFigureOut">
               <a:rPr lang="en-CA" smtClean="0"/>
-              <a:t>2021-05-18</a:t>
+              <a:t>2021-05-19</a:t>
             </a:fld>
             <a:endParaRPr lang="en-CA"/>
           </a:p>
@@ -1153,7 +1154,7 @@
           <a:p>
             <a:fld id="{41FBF7B5-8CD3-4D87-8075-6B63450ED684}" type="datetimeFigureOut">
               <a:rPr lang="en-CA" smtClean="0"/>
-              <a:t>2021-05-18</a:t>
+              <a:t>2021-05-19</a:t>
             </a:fld>
             <a:endParaRPr lang="en-CA"/>
           </a:p>
@@ -1421,7 +1422,7 @@
           <a:p>
             <a:fld id="{41FBF7B5-8CD3-4D87-8075-6B63450ED684}" type="datetimeFigureOut">
               <a:rPr lang="en-CA" smtClean="0"/>
-              <a:t>2021-05-18</a:t>
+              <a:t>2021-05-19</a:t>
             </a:fld>
             <a:endParaRPr lang="en-CA"/>
           </a:p>
@@ -1836,7 +1837,7 @@
           <a:p>
             <a:fld id="{41FBF7B5-8CD3-4D87-8075-6B63450ED684}" type="datetimeFigureOut">
               <a:rPr lang="en-CA" smtClean="0"/>
-              <a:t>2021-05-18</a:t>
+              <a:t>2021-05-19</a:t>
             </a:fld>
             <a:endParaRPr lang="en-CA"/>
           </a:p>
@@ -1978,7 +1979,7 @@
           <a:p>
             <a:fld id="{41FBF7B5-8CD3-4D87-8075-6B63450ED684}" type="datetimeFigureOut">
               <a:rPr lang="en-CA" smtClean="0"/>
-              <a:t>2021-05-18</a:t>
+              <a:t>2021-05-19</a:t>
             </a:fld>
             <a:endParaRPr lang="en-CA"/>
           </a:p>
@@ -2091,7 +2092,7 @@
           <a:p>
             <a:fld id="{41FBF7B5-8CD3-4D87-8075-6B63450ED684}" type="datetimeFigureOut">
               <a:rPr lang="en-CA" smtClean="0"/>
-              <a:t>2021-05-18</a:t>
+              <a:t>2021-05-19</a:t>
             </a:fld>
             <a:endParaRPr lang="en-CA"/>
           </a:p>
@@ -2404,7 +2405,7 @@
           <a:p>
             <a:fld id="{41FBF7B5-8CD3-4D87-8075-6B63450ED684}" type="datetimeFigureOut">
               <a:rPr lang="en-CA" smtClean="0"/>
-              <a:t>2021-05-18</a:t>
+              <a:t>2021-05-19</a:t>
             </a:fld>
             <a:endParaRPr lang="en-CA"/>
           </a:p>
@@ -2693,7 +2694,7 @@
           <a:p>
             <a:fld id="{41FBF7B5-8CD3-4D87-8075-6B63450ED684}" type="datetimeFigureOut">
               <a:rPr lang="en-CA" smtClean="0"/>
-              <a:t>2021-05-18</a:t>
+              <a:t>2021-05-19</a:t>
             </a:fld>
             <a:endParaRPr lang="en-CA"/>
           </a:p>
@@ -2936,7 +2937,7 @@
           <a:p>
             <a:fld id="{41FBF7B5-8CD3-4D87-8075-6B63450ED684}" type="datetimeFigureOut">
               <a:rPr lang="en-CA" smtClean="0"/>
-              <a:t>2021-05-18</a:t>
+              <a:t>2021-05-19</a:t>
             </a:fld>
             <a:endParaRPr lang="en-CA"/>
           </a:p>
@@ -3367,7 +3368,7 @@
         </p:nvSpPr>
         <p:spPr>
           <a:xfrm>
-            <a:off x="513708" y="2527443"/>
+            <a:off x="710550" y="2752476"/>
             <a:ext cx="2517169" cy="2835667"/>
           </a:xfrm>
           <a:prstGeom prst="roundRect">
@@ -3484,7 +3485,7 @@
         </p:nvSpPr>
         <p:spPr>
           <a:xfrm>
-            <a:off x="7397393" y="2609636"/>
+            <a:off x="7404244" y="2752476"/>
             <a:ext cx="2517169" cy="2835667"/>
           </a:xfrm>
           <a:prstGeom prst="roundRect">
@@ -3534,7 +3535,7 @@
         <p:spPr>
           <a:xfrm>
             <a:off x="8725708" y="934948"/>
-            <a:ext cx="2517169" cy="3184989"/>
+            <a:ext cx="2517169" cy="2661007"/>
           </a:xfrm>
           <a:prstGeom prst="roundRect">
             <a:avLst/>
@@ -3701,7 +3702,7 @@
         </p:nvSpPr>
         <p:spPr>
           <a:xfrm>
-            <a:off x="9727735" y="1163548"/>
+            <a:off x="9727734" y="1094297"/>
             <a:ext cx="1381767" cy="1593394"/>
           </a:xfrm>
           <a:prstGeom prst="roundRect">
@@ -3788,8 +3789,8 @@
         </p:blipFill>
         <p:spPr>
           <a:xfrm>
-            <a:off x="10402404" y="1163547"/>
-            <a:ext cx="707097" cy="618205"/>
+            <a:off x="10277454" y="1163547"/>
+            <a:ext cx="832047" cy="727447"/>
           </a:xfrm>
           <a:prstGeom prst="rect">
             <a:avLst/>
@@ -3820,36 +3821,6 @@
           <a:xfrm>
             <a:off x="3621416" y="820550"/>
             <a:ext cx="921469" cy="805627"/>
-          </a:xfrm>
-          <a:prstGeom prst="rect">
-            <a:avLst/>
-          </a:prstGeom>
-        </p:spPr>
-      </p:pic>
-      <p:pic>
-        <p:nvPicPr>
-          <p:cNvPr id="22" name="Picture 21">
-            <a:extLst>
-              <a:ext uri="{FF2B5EF4-FFF2-40B4-BE49-F238E27FC236}">
-                <a16:creationId xmlns:a16="http://schemas.microsoft.com/office/drawing/2014/main" id="{4F40684C-7E4A-4E25-9298-A7F4BD386BB3}"/>
-              </a:ext>
-            </a:extLst>
-          </p:cNvPr>
-          <p:cNvPicPr>
-            <a:picLocks noChangeAspect="1"/>
-          </p:cNvPicPr>
-          <p:nvPr/>
-        </p:nvPicPr>
-        <p:blipFill>
-          <a:blip r:embed="rId3"/>
-          <a:stretch>
-            <a:fillRect/>
-          </a:stretch>
-        </p:blipFill>
-        <p:spPr>
-          <a:xfrm>
-            <a:off x="8873173" y="1223364"/>
-            <a:ext cx="707097" cy="618205"/>
           </a:xfrm>
           <a:prstGeom prst="rect">
             <a:avLst/>
@@ -6207,20 +6178,53 @@
           <a:lstStyle/>
           <a:p>
             <a:pPr algn="ctr"/>
-            <a:endParaRPr lang="en-CA" sz="2400">
-              <a:solidFill>
-                <a:schemeClr val="tx1"/>
-              </a:solidFill>
-            </a:endParaRPr>
-          </a:p>
-        </p:txBody>
-      </p:sp>
-      <p:sp>
-        <p:nvSpPr>
-          <p:cNvPr id="24" name="Rectangle: Rounded Corners 23">
-            <a:extLst>
-              <a:ext uri="{FF2B5EF4-FFF2-40B4-BE49-F238E27FC236}">
-                <a16:creationId xmlns:a16="http://schemas.microsoft.com/office/drawing/2014/main" id="{06A6B7AD-9677-41B1-A0EA-F8B4EF68260C}"/>
+            <a:r>
+              <a:rPr lang="en-CA" sz="2400" dirty="0">
+                <a:solidFill>
+                  <a:schemeClr val="tx1"/>
+                </a:solidFill>
+              </a:rPr>
+              <a:t>code</a:t>
+            </a:r>
+          </a:p>
+        </p:txBody>
+      </p:sp>
+    </p:spTree>
+    <p:extLst>
+      <p:ext uri="{BB962C8B-B14F-4D97-AF65-F5344CB8AC3E}">
+        <p14:creationId xmlns:p14="http://schemas.microsoft.com/office/powerpoint/2010/main" val="1753120960"/>
+      </p:ext>
+    </p:extLst>
+  </p:cSld>
+  <p:clrMapOvr>
+    <a:masterClrMapping/>
+  </p:clrMapOvr>
+</p:sld>
+</file>
+
+<file path=ppt/slides/slide8.xml><?xml version="1.0" encoding="utf-8"?>
+<p:sld xmlns:a="http://schemas.openxmlformats.org/drawingml/2006/main" xmlns:r="http://schemas.openxmlformats.org/officeDocument/2006/relationships" xmlns:p="http://schemas.openxmlformats.org/presentationml/2006/main">
+  <p:cSld>
+    <p:spTree>
+      <p:nvGrpSpPr>
+        <p:cNvPr id="1" name=""/>
+        <p:cNvGrpSpPr/>
+        <p:nvPr/>
+      </p:nvGrpSpPr>
+      <p:grpSpPr>
+        <a:xfrm>
+          <a:off x="0" y="0"/>
+          <a:ext cx="0" cy="0"/>
+          <a:chOff x="0" y="0"/>
+          <a:chExt cx="0" cy="0"/>
+        </a:xfrm>
+      </p:grpSpPr>
+      <p:sp>
+        <p:nvSpPr>
+          <p:cNvPr id="15" name="Rectangle: Rounded Corners 14">
+            <a:extLst>
+              <a:ext uri="{FF2B5EF4-FFF2-40B4-BE49-F238E27FC236}">
+                <a16:creationId xmlns:a16="http://schemas.microsoft.com/office/drawing/2014/main" id="{30115774-1F96-4364-B7D7-A1BDCB421378}"/>
               </a:ext>
             </a:extLst>
           </p:cNvPr>
@@ -6229,7 +6233,7 @@
         </p:nvSpPr>
         <p:spPr>
           <a:xfrm>
-            <a:off x="-28706" y="3765574"/>
+            <a:off x="15153" y="1744721"/>
             <a:ext cx="1510301" cy="1684279"/>
           </a:xfrm>
           <a:prstGeom prst="roundRect">
@@ -6284,42 +6288,12 @@
           </a:p>
         </p:txBody>
       </p:sp>
-      <p:pic>
-        <p:nvPicPr>
-          <p:cNvPr id="27" name="Picture 26">
-            <a:extLst>
-              <a:ext uri="{FF2B5EF4-FFF2-40B4-BE49-F238E27FC236}">
-                <a16:creationId xmlns:a16="http://schemas.microsoft.com/office/drawing/2014/main" id="{F9887602-B08F-4BCB-BC5C-ADF2ADE64531}"/>
-              </a:ext>
-            </a:extLst>
-          </p:cNvPr>
-          <p:cNvPicPr>
-            <a:picLocks noChangeAspect="1"/>
-          </p:cNvPicPr>
-          <p:nvPr/>
-        </p:nvPicPr>
-        <p:blipFill>
-          <a:blip r:embed="rId4"/>
-          <a:stretch>
-            <a:fillRect/>
-          </a:stretch>
-        </p:blipFill>
-        <p:spPr>
-          <a:xfrm>
-            <a:off x="-28706" y="4292409"/>
-            <a:ext cx="1487238" cy="881247"/>
-          </a:xfrm>
-          <a:prstGeom prst="rect">
-            <a:avLst/>
-          </a:prstGeom>
-        </p:spPr>
-      </p:pic>
-      <p:sp>
-        <p:nvSpPr>
-          <p:cNvPr id="29" name="Rectangle: Rounded Corners 28">
-            <a:extLst>
-              <a:ext uri="{FF2B5EF4-FFF2-40B4-BE49-F238E27FC236}">
-                <a16:creationId xmlns:a16="http://schemas.microsoft.com/office/drawing/2014/main" id="{C2977E31-FD61-473A-BEA4-1A01DC5D73D9}"/>
+      <p:sp>
+        <p:nvSpPr>
+          <p:cNvPr id="4" name="Rectangle: Rounded Corners 3">
+            <a:extLst>
+              <a:ext uri="{FF2B5EF4-FFF2-40B4-BE49-F238E27FC236}">
+                <a16:creationId xmlns:a16="http://schemas.microsoft.com/office/drawing/2014/main" id="{23300865-4CD3-4976-AFB6-501109152D3F}"/>
               </a:ext>
             </a:extLst>
           </p:cNvPr>
@@ -6328,8 +6302,8 @@
         </p:nvSpPr>
         <p:spPr>
           <a:xfrm>
-            <a:off x="3007386" y="1934195"/>
-            <a:ext cx="1717054" cy="1343261"/>
+            <a:off x="2463630" y="3188613"/>
+            <a:ext cx="2517169" cy="3410545"/>
           </a:xfrm>
           <a:prstGeom prst="roundRect">
             <a:avLst/>
@@ -6357,18 +6331,737 @@
           <a:p>
             <a:pPr algn="ctr"/>
             <a:r>
+              <a:rPr lang="en-CA" sz="3600" dirty="0"/>
+              <a:t>CPU</a:t>
+            </a:r>
+          </a:p>
+          <a:p>
+            <a:pPr algn="ctr"/>
+            <a:r>
+              <a:rPr lang="en-CA" sz="3600" dirty="0"/>
+              <a:t>C/C++</a:t>
+            </a:r>
+            <a:br>
+              <a:rPr lang="en-CA" sz="3600" dirty="0"/>
+            </a:br>
+            <a:r>
+              <a:rPr lang="en-CA" sz="3600" dirty="0"/>
+              <a:t>App.</a:t>
+            </a:r>
+          </a:p>
+        </p:txBody>
+      </p:sp>
+      <p:sp>
+        <p:nvSpPr>
+          <p:cNvPr id="5" name="Rectangle: Rounded Corners 4">
+            <a:extLst>
+              <a:ext uri="{FF2B5EF4-FFF2-40B4-BE49-F238E27FC236}">
+                <a16:creationId xmlns:a16="http://schemas.microsoft.com/office/drawing/2014/main" id="{63D3163B-DAD7-4EE6-A5FF-8951E1DE9D73}"/>
+              </a:ext>
+            </a:extLst>
+          </p:cNvPr>
+          <p:cNvSpPr/>
+          <p:nvPr/>
+        </p:nvSpPr>
+        <p:spPr>
+          <a:xfrm>
+            <a:off x="2811118" y="572879"/>
+            <a:ext cx="1976825" cy="3184989"/>
+          </a:xfrm>
+          <a:prstGeom prst="roundRect">
+            <a:avLst/>
+          </a:prstGeom>
+          <a:ln/>
+        </p:spPr>
+        <p:style>
+          <a:lnRef idx="3">
+            <a:schemeClr val="lt1"/>
+          </a:lnRef>
+          <a:fillRef idx="1">
+            <a:schemeClr val="accent4"/>
+          </a:fillRef>
+          <a:effectRef idx="1">
+            <a:schemeClr val="accent4"/>
+          </a:effectRef>
+          <a:fontRef idx="minor">
+            <a:schemeClr val="lt1"/>
+          </a:fontRef>
+        </p:style>
+        <p:txBody>
+          <a:bodyPr rtlCol="0" anchor="ctr"/>
+          <a:lstStyle/>
+          <a:p>
+            <a:pPr algn="ctr"/>
+            <a:endParaRPr lang="en-CA" sz="4000" dirty="0">
+              <a:solidFill>
+                <a:schemeClr val="tx1"/>
+              </a:solidFill>
+            </a:endParaRPr>
+          </a:p>
+          <a:p>
+            <a:pPr algn="ctr"/>
+            <a:endParaRPr lang="en-CA" sz="4000" dirty="0">
+              <a:solidFill>
+                <a:schemeClr val="tx1"/>
+              </a:solidFill>
+            </a:endParaRPr>
+          </a:p>
+          <a:p>
+            <a:pPr algn="ctr"/>
+            <a:r>
+              <a:rPr lang="en-CA" sz="4000" dirty="0">
+                <a:solidFill>
+                  <a:schemeClr val="tx1"/>
+                </a:solidFill>
+              </a:rPr>
+              <a:t>RAM</a:t>
+            </a:r>
+          </a:p>
+        </p:txBody>
+      </p:sp>
+      <p:sp>
+        <p:nvSpPr>
+          <p:cNvPr id="6" name="Rectangle: Rounded Corners 5">
+            <a:extLst>
+              <a:ext uri="{FF2B5EF4-FFF2-40B4-BE49-F238E27FC236}">
+                <a16:creationId xmlns:a16="http://schemas.microsoft.com/office/drawing/2014/main" id="{ECB27BA8-7E67-405D-9946-D9EF0EFC1164}"/>
+              </a:ext>
+            </a:extLst>
+          </p:cNvPr>
+          <p:cNvSpPr/>
+          <p:nvPr/>
+        </p:nvSpPr>
+        <p:spPr>
+          <a:xfrm>
+            <a:off x="6690525" y="3572475"/>
+            <a:ext cx="2517169" cy="2835667"/>
+          </a:xfrm>
+          <a:prstGeom prst="roundRect">
+            <a:avLst/>
+          </a:prstGeom>
+        </p:spPr>
+        <p:style>
+          <a:lnRef idx="2">
+            <a:schemeClr val="accent1">
+              <a:shade val="50000"/>
+            </a:schemeClr>
+          </a:lnRef>
+          <a:fillRef idx="1">
+            <a:schemeClr val="accent1"/>
+          </a:fillRef>
+          <a:effectRef idx="0">
+            <a:schemeClr val="accent1"/>
+          </a:effectRef>
+          <a:fontRef idx="minor">
+            <a:schemeClr val="lt1"/>
+          </a:fontRef>
+        </p:style>
+        <p:txBody>
+          <a:bodyPr rtlCol="0" anchor="ctr"/>
+          <a:lstStyle/>
+          <a:p>
+            <a:pPr algn="ctr"/>
+            <a:r>
+              <a:rPr lang="en-CA" sz="3600" dirty="0"/>
+              <a:t>GPU</a:t>
+            </a:r>
+          </a:p>
+          <a:p>
+            <a:pPr algn="ctr"/>
+            <a:r>
+              <a:rPr lang="en-CA" sz="3600" dirty="0"/>
+              <a:t>GLSL</a:t>
+            </a:r>
+          </a:p>
+          <a:p>
+            <a:pPr algn="ctr"/>
+            <a:r>
+              <a:rPr lang="en-CA" sz="3600" dirty="0"/>
+              <a:t>(Shaders)</a:t>
+            </a:r>
+          </a:p>
+        </p:txBody>
+      </p:sp>
+      <p:sp>
+        <p:nvSpPr>
+          <p:cNvPr id="7" name="Rectangle: Rounded Corners 6">
+            <a:extLst>
+              <a:ext uri="{FF2B5EF4-FFF2-40B4-BE49-F238E27FC236}">
+                <a16:creationId xmlns:a16="http://schemas.microsoft.com/office/drawing/2014/main" id="{E2FB0622-CCE2-4F9E-B49E-7C3B6E2841AA}"/>
+              </a:ext>
+            </a:extLst>
+          </p:cNvPr>
+          <p:cNvSpPr/>
+          <p:nvPr/>
+        </p:nvSpPr>
+        <p:spPr>
+          <a:xfrm>
+            <a:off x="6986596" y="315930"/>
+            <a:ext cx="1976825" cy="3629346"/>
+          </a:xfrm>
+          <a:prstGeom prst="roundRect">
+            <a:avLst/>
+          </a:prstGeom>
+          <a:ln/>
+        </p:spPr>
+        <p:style>
+          <a:lnRef idx="3">
+            <a:schemeClr val="lt1"/>
+          </a:lnRef>
+          <a:fillRef idx="1">
+            <a:schemeClr val="accent4"/>
+          </a:fillRef>
+          <a:effectRef idx="1">
+            <a:schemeClr val="accent4"/>
+          </a:effectRef>
+          <a:fontRef idx="minor">
+            <a:schemeClr val="lt1"/>
+          </a:fontRef>
+        </p:style>
+        <p:txBody>
+          <a:bodyPr rtlCol="0" anchor="ctr"/>
+          <a:lstStyle/>
+          <a:p>
+            <a:pPr algn="ctr"/>
+            <a:endParaRPr lang="en-CA" sz="4000" dirty="0">
+              <a:solidFill>
+                <a:schemeClr val="tx1"/>
+              </a:solidFill>
+            </a:endParaRPr>
+          </a:p>
+          <a:p>
+            <a:pPr algn="ctr"/>
+            <a:endParaRPr lang="en-CA" sz="4000" dirty="0">
+              <a:solidFill>
+                <a:schemeClr val="tx1"/>
+              </a:solidFill>
+            </a:endParaRPr>
+          </a:p>
+          <a:p>
+            <a:pPr algn="ctr"/>
+            <a:r>
+              <a:rPr lang="en-CA" sz="4000" dirty="0">
+                <a:solidFill>
+                  <a:schemeClr val="tx1"/>
+                </a:solidFill>
+              </a:rPr>
+              <a:t>VRAM</a:t>
+            </a:r>
+          </a:p>
+        </p:txBody>
+      </p:sp>
+      <p:sp>
+        <p:nvSpPr>
+          <p:cNvPr id="8" name="Arrow: Left-Right 7">
+            <a:extLst>
+              <a:ext uri="{FF2B5EF4-FFF2-40B4-BE49-F238E27FC236}">
+                <a16:creationId xmlns:a16="http://schemas.microsoft.com/office/drawing/2014/main" id="{E44932D0-93AA-47DD-A4E2-9A594093E7A7}"/>
+              </a:ext>
+            </a:extLst>
+          </p:cNvPr>
+          <p:cNvSpPr/>
+          <p:nvPr/>
+        </p:nvSpPr>
+        <p:spPr>
+          <a:xfrm>
+            <a:off x="4775701" y="1908425"/>
+            <a:ext cx="2133994" cy="1520575"/>
+          </a:xfrm>
+          <a:prstGeom prst="leftRightArrow">
+            <a:avLst/>
+          </a:prstGeom>
+        </p:spPr>
+        <p:style>
+          <a:lnRef idx="3">
+            <a:schemeClr val="lt1"/>
+          </a:lnRef>
+          <a:fillRef idx="1">
+            <a:schemeClr val="accent6"/>
+          </a:fillRef>
+          <a:effectRef idx="1">
+            <a:schemeClr val="accent6"/>
+          </a:effectRef>
+          <a:fontRef idx="minor">
+            <a:schemeClr val="lt1"/>
+          </a:fontRef>
+        </p:style>
+        <p:txBody>
+          <a:bodyPr rtlCol="0" anchor="ctr"/>
+          <a:lstStyle/>
+          <a:p>
+            <a:pPr algn="ctr"/>
+            <a:r>
+              <a:rPr lang="en-CA" sz="2400" dirty="0">
+                <a:solidFill>
+                  <a:schemeClr val="tx1"/>
+                </a:solidFill>
+              </a:rPr>
+              <a:t>OpenGL</a:t>
+            </a:r>
+          </a:p>
+        </p:txBody>
+      </p:sp>
+      <p:sp>
+        <p:nvSpPr>
+          <p:cNvPr id="10" name="Rectangle: Rounded Corners 9">
+            <a:extLst>
+              <a:ext uri="{FF2B5EF4-FFF2-40B4-BE49-F238E27FC236}">
+                <a16:creationId xmlns:a16="http://schemas.microsoft.com/office/drawing/2014/main" id="{7292551B-E407-4527-8073-E5A637B132A5}"/>
+              </a:ext>
+            </a:extLst>
+          </p:cNvPr>
+          <p:cNvSpPr/>
+          <p:nvPr/>
+        </p:nvSpPr>
+        <p:spPr>
+          <a:xfrm>
+            <a:off x="3286352" y="725996"/>
+            <a:ext cx="1381767" cy="1018725"/>
+          </a:xfrm>
+          <a:prstGeom prst="roundRect">
+            <a:avLst/>
+          </a:prstGeom>
+        </p:spPr>
+        <p:style>
+          <a:lnRef idx="2">
+            <a:schemeClr val="accent1">
+              <a:shade val="50000"/>
+            </a:schemeClr>
+          </a:lnRef>
+          <a:fillRef idx="1">
+            <a:schemeClr val="accent1"/>
+          </a:fillRef>
+          <a:effectRef idx="0">
+            <a:schemeClr val="accent1"/>
+          </a:effectRef>
+          <a:fontRef idx="minor">
+            <a:schemeClr val="lt1"/>
+          </a:fontRef>
+        </p:style>
+        <p:txBody>
+          <a:bodyPr rtlCol="0" anchor="ctr"/>
+          <a:lstStyle/>
+          <a:p>
+            <a:pPr algn="ctr"/>
+            <a:r>
               <a:rPr lang="en-CA" dirty="0"/>
               <a:t>Space Ship</a:t>
             </a:r>
           </a:p>
         </p:txBody>
       </p:sp>
+      <p:sp>
+        <p:nvSpPr>
+          <p:cNvPr id="11" name="Rectangle: Rounded Corners 10">
+            <a:extLst>
+              <a:ext uri="{FF2B5EF4-FFF2-40B4-BE49-F238E27FC236}">
+                <a16:creationId xmlns:a16="http://schemas.microsoft.com/office/drawing/2014/main" id="{BA201D68-537C-4E94-840A-A78E0BABFF37}"/>
+              </a:ext>
+            </a:extLst>
+          </p:cNvPr>
+          <p:cNvSpPr/>
+          <p:nvPr/>
+        </p:nvSpPr>
+        <p:spPr>
+          <a:xfrm>
+            <a:off x="7582328" y="424104"/>
+            <a:ext cx="1381093" cy="1241026"/>
+          </a:xfrm>
+          <a:prstGeom prst="roundRect">
+            <a:avLst/>
+          </a:prstGeom>
+        </p:spPr>
+        <p:style>
+          <a:lnRef idx="2">
+            <a:schemeClr val="accent1">
+              <a:shade val="50000"/>
+            </a:schemeClr>
+          </a:lnRef>
+          <a:fillRef idx="1">
+            <a:schemeClr val="accent1"/>
+          </a:fillRef>
+          <a:effectRef idx="0">
+            <a:schemeClr val="accent1"/>
+          </a:effectRef>
+          <a:fontRef idx="minor">
+            <a:schemeClr val="lt1"/>
+          </a:fontRef>
+        </p:style>
+        <p:txBody>
+          <a:bodyPr rtlCol="0" anchor="ctr"/>
+          <a:lstStyle/>
+          <a:p>
+            <a:pPr algn="ctr"/>
+            <a:r>
+              <a:rPr lang="en-CA" dirty="0"/>
+              <a:t>Space Ship</a:t>
+            </a:r>
+          </a:p>
+        </p:txBody>
+      </p:sp>
       <p:pic>
         <p:nvPicPr>
-          <p:cNvPr id="28" name="Picture 27">
-            <a:extLst>
-              <a:ext uri="{FF2B5EF4-FFF2-40B4-BE49-F238E27FC236}">
-                <a16:creationId xmlns:a16="http://schemas.microsoft.com/office/drawing/2014/main" id="{9659D843-E78E-48B4-A902-FC659B1ABD9E}"/>
+          <p:cNvPr id="12" name="Picture 11">
+            <a:extLst>
+              <a:ext uri="{FF2B5EF4-FFF2-40B4-BE49-F238E27FC236}">
+                <a16:creationId xmlns:a16="http://schemas.microsoft.com/office/drawing/2014/main" id="{EB12CAF2-B127-473A-A7E7-F4C0C514DB78}"/>
+              </a:ext>
+            </a:extLst>
+          </p:cNvPr>
+          <p:cNvPicPr>
+            <a:picLocks noChangeAspect="1"/>
+          </p:cNvPicPr>
+          <p:nvPr/>
+        </p:nvPicPr>
+        <p:blipFill>
+          <a:blip r:embed="rId2"/>
+          <a:stretch>
+            <a:fillRect/>
+          </a:stretch>
+        </p:blipFill>
+        <p:spPr>
+          <a:xfrm>
+            <a:off x="3621601" y="735883"/>
+            <a:ext cx="921469" cy="805627"/>
+          </a:xfrm>
+          <a:prstGeom prst="rect">
+            <a:avLst/>
+          </a:prstGeom>
+        </p:spPr>
+      </p:pic>
+      <p:sp>
+        <p:nvSpPr>
+          <p:cNvPr id="2" name="Rectangle: Rounded Corners 1">
+            <a:extLst>
+              <a:ext uri="{FF2B5EF4-FFF2-40B4-BE49-F238E27FC236}">
+                <a16:creationId xmlns:a16="http://schemas.microsoft.com/office/drawing/2014/main" id="{1A83AD1B-ECA9-46A0-A61F-076EAAFA5D3E}"/>
+              </a:ext>
+            </a:extLst>
+          </p:cNvPr>
+          <p:cNvSpPr/>
+          <p:nvPr/>
+        </p:nvSpPr>
+        <p:spPr>
+          <a:xfrm>
+            <a:off x="10277454" y="2213183"/>
+            <a:ext cx="1821413" cy="2197950"/>
+          </a:xfrm>
+          <a:prstGeom prst="roundRect">
+            <a:avLst/>
+          </a:prstGeom>
+        </p:spPr>
+        <p:style>
+          <a:lnRef idx="2">
+            <a:schemeClr val="accent1">
+              <a:shade val="50000"/>
+            </a:schemeClr>
+          </a:lnRef>
+          <a:fillRef idx="1">
+            <a:schemeClr val="accent1"/>
+          </a:fillRef>
+          <a:effectRef idx="0">
+            <a:schemeClr val="accent1"/>
+          </a:effectRef>
+          <a:fontRef idx="minor">
+            <a:schemeClr val="lt1"/>
+          </a:fontRef>
+        </p:style>
+        <p:txBody>
+          <a:bodyPr rtlCol="0" anchor="ctr"/>
+          <a:lstStyle/>
+          <a:p>
+            <a:pPr algn="ctr"/>
+            <a:r>
+              <a:rPr lang="en-CA" dirty="0"/>
+              <a:t>“Back buffer”</a:t>
+            </a:r>
+          </a:p>
+          <a:p>
+            <a:pPr algn="ctr"/>
+            <a:endParaRPr lang="en-CA" dirty="0"/>
+          </a:p>
+          <a:p>
+            <a:pPr algn="ctr"/>
+            <a:endParaRPr lang="en-CA" dirty="0"/>
+          </a:p>
+          <a:p>
+            <a:pPr algn="ctr"/>
+            <a:endParaRPr lang="en-CA" dirty="0"/>
+          </a:p>
+          <a:p>
+            <a:pPr algn="ctr"/>
+            <a:endParaRPr lang="en-CA" dirty="0"/>
+          </a:p>
+          <a:p>
+            <a:pPr algn="ctr"/>
+            <a:endParaRPr lang="en-CA" dirty="0"/>
+          </a:p>
+        </p:txBody>
+      </p:sp>
+      <p:pic>
+        <p:nvPicPr>
+          <p:cNvPr id="9" name="Picture 8">
+            <a:extLst>
+              <a:ext uri="{FF2B5EF4-FFF2-40B4-BE49-F238E27FC236}">
+                <a16:creationId xmlns:a16="http://schemas.microsoft.com/office/drawing/2014/main" id="{D49148BA-FE05-4427-88ED-439AE8B58E02}"/>
+              </a:ext>
+            </a:extLst>
+          </p:cNvPr>
+          <p:cNvPicPr>
+            <a:picLocks noChangeAspect="1"/>
+          </p:cNvPicPr>
+          <p:nvPr/>
+        </p:nvPicPr>
+        <p:blipFill>
+          <a:blip r:embed="rId3"/>
+          <a:stretch>
+            <a:fillRect/>
+          </a:stretch>
+        </p:blipFill>
+        <p:spPr>
+          <a:xfrm>
+            <a:off x="10528335" y="3052556"/>
+            <a:ext cx="1417482" cy="1239853"/>
+          </a:xfrm>
+          <a:prstGeom prst="rect">
+            <a:avLst/>
+          </a:prstGeom>
+        </p:spPr>
+      </p:pic>
+      <p:pic>
+        <p:nvPicPr>
+          <p:cNvPr id="13" name="Picture 12">
+            <a:extLst>
+              <a:ext uri="{FF2B5EF4-FFF2-40B4-BE49-F238E27FC236}">
+                <a16:creationId xmlns:a16="http://schemas.microsoft.com/office/drawing/2014/main" id="{2D90FB95-9AC4-4C8A-BEB1-89B477A8501A}"/>
+              </a:ext>
+            </a:extLst>
+          </p:cNvPr>
+          <p:cNvPicPr>
+            <a:picLocks noChangeAspect="1"/>
+          </p:cNvPicPr>
+          <p:nvPr/>
+        </p:nvPicPr>
+        <p:blipFill>
+          <a:blip r:embed="rId2"/>
+          <a:stretch>
+            <a:fillRect/>
+          </a:stretch>
+        </p:blipFill>
+        <p:spPr>
+          <a:xfrm>
+            <a:off x="8041952" y="686694"/>
+            <a:ext cx="921469" cy="805627"/>
+          </a:xfrm>
+          <a:prstGeom prst="rect">
+            <a:avLst/>
+          </a:prstGeom>
+        </p:spPr>
+      </p:pic>
+      <p:sp>
+        <p:nvSpPr>
+          <p:cNvPr id="3" name="Arrow: Right 2">
+            <a:extLst>
+              <a:ext uri="{FF2B5EF4-FFF2-40B4-BE49-F238E27FC236}">
+                <a16:creationId xmlns:a16="http://schemas.microsoft.com/office/drawing/2014/main" id="{AE4EC69F-B0AF-4C8E-BD06-054127984C45}"/>
+              </a:ext>
+            </a:extLst>
+          </p:cNvPr>
+          <p:cNvSpPr/>
+          <p:nvPr/>
+        </p:nvSpPr>
+        <p:spPr>
+          <a:xfrm>
+            <a:off x="8963421" y="2668712"/>
+            <a:ext cx="1233398" cy="940381"/>
+          </a:xfrm>
+          <a:prstGeom prst="rightArrow">
+            <a:avLst/>
+          </a:prstGeom>
+        </p:spPr>
+        <p:style>
+          <a:lnRef idx="3">
+            <a:schemeClr val="lt1"/>
+          </a:lnRef>
+          <a:fillRef idx="1">
+            <a:schemeClr val="accent6"/>
+          </a:fillRef>
+          <a:effectRef idx="1">
+            <a:schemeClr val="accent6"/>
+          </a:effectRef>
+          <a:fontRef idx="minor">
+            <a:schemeClr val="lt1"/>
+          </a:fontRef>
+        </p:style>
+        <p:txBody>
+          <a:bodyPr rtlCol="0" anchor="ctr"/>
+          <a:lstStyle/>
+          <a:p>
+            <a:pPr algn="ctr"/>
+            <a:endParaRPr lang="en-CA" sz="2400">
+              <a:solidFill>
+                <a:schemeClr val="tx1"/>
+              </a:solidFill>
+            </a:endParaRPr>
+          </a:p>
+        </p:txBody>
+      </p:sp>
+      <p:pic>
+        <p:nvPicPr>
+          <p:cNvPr id="14" name="Picture 13">
+            <a:extLst>
+              <a:ext uri="{FF2B5EF4-FFF2-40B4-BE49-F238E27FC236}">
+                <a16:creationId xmlns:a16="http://schemas.microsoft.com/office/drawing/2014/main" id="{85493239-BA0F-4FAD-807B-E804938620B7}"/>
+              </a:ext>
+            </a:extLst>
+          </p:cNvPr>
+          <p:cNvPicPr>
+            <a:picLocks noChangeAspect="1"/>
+          </p:cNvPicPr>
+          <p:nvPr/>
+        </p:nvPicPr>
+        <p:blipFill>
+          <a:blip r:embed="rId2"/>
+          <a:stretch>
+            <a:fillRect/>
+          </a:stretch>
+        </p:blipFill>
+        <p:spPr>
+          <a:xfrm>
+            <a:off x="351150" y="2213183"/>
+            <a:ext cx="921469" cy="805627"/>
+          </a:xfrm>
+          <a:prstGeom prst="rect">
+            <a:avLst/>
+          </a:prstGeom>
+        </p:spPr>
+      </p:pic>
+      <p:sp>
+        <p:nvSpPr>
+          <p:cNvPr id="16" name="Arrow: Right 15">
+            <a:extLst>
+              <a:ext uri="{FF2B5EF4-FFF2-40B4-BE49-F238E27FC236}">
+                <a16:creationId xmlns:a16="http://schemas.microsoft.com/office/drawing/2014/main" id="{A3BB2F04-54FC-473B-8ACD-5CB1D22DAD37}"/>
+              </a:ext>
+            </a:extLst>
+          </p:cNvPr>
+          <p:cNvSpPr/>
+          <p:nvPr/>
+        </p:nvSpPr>
+        <p:spPr>
+          <a:xfrm>
+            <a:off x="1497085" y="1934195"/>
+            <a:ext cx="1400236" cy="940381"/>
+          </a:xfrm>
+          <a:prstGeom prst="rightArrow">
+            <a:avLst/>
+          </a:prstGeom>
+        </p:spPr>
+        <p:style>
+          <a:lnRef idx="3">
+            <a:schemeClr val="lt1"/>
+          </a:lnRef>
+          <a:fillRef idx="1">
+            <a:schemeClr val="accent6"/>
+          </a:fillRef>
+          <a:effectRef idx="1">
+            <a:schemeClr val="accent6"/>
+          </a:effectRef>
+          <a:fontRef idx="minor">
+            <a:schemeClr val="lt1"/>
+          </a:fontRef>
+        </p:style>
+        <p:txBody>
+          <a:bodyPr rtlCol="0" anchor="ctr"/>
+          <a:lstStyle/>
+          <a:p>
+            <a:pPr algn="ctr"/>
+            <a:r>
+              <a:rPr lang="en-CA" sz="2400" dirty="0">
+                <a:solidFill>
+                  <a:schemeClr val="tx1"/>
+                </a:solidFill>
+              </a:rPr>
+              <a:t>code</a:t>
+            </a:r>
+          </a:p>
+        </p:txBody>
+      </p:sp>
+      <p:sp>
+        <p:nvSpPr>
+          <p:cNvPr id="24" name="Rectangle: Rounded Corners 23">
+            <a:extLst>
+              <a:ext uri="{FF2B5EF4-FFF2-40B4-BE49-F238E27FC236}">
+                <a16:creationId xmlns:a16="http://schemas.microsoft.com/office/drawing/2014/main" id="{06A6B7AD-9677-41B1-A0EA-F8B4EF68260C}"/>
+              </a:ext>
+            </a:extLst>
+          </p:cNvPr>
+          <p:cNvSpPr/>
+          <p:nvPr/>
+        </p:nvSpPr>
+        <p:spPr>
+          <a:xfrm>
+            <a:off x="-28706" y="3765574"/>
+            <a:ext cx="1510301" cy="1684279"/>
+          </a:xfrm>
+          <a:prstGeom prst="roundRect">
+            <a:avLst/>
+          </a:prstGeom>
+        </p:spPr>
+        <p:style>
+          <a:lnRef idx="2">
+            <a:schemeClr val="accent1">
+              <a:shade val="50000"/>
+            </a:schemeClr>
+          </a:lnRef>
+          <a:fillRef idx="1">
+            <a:schemeClr val="accent1"/>
+          </a:fillRef>
+          <a:effectRef idx="0">
+            <a:schemeClr val="accent1"/>
+          </a:effectRef>
+          <a:fontRef idx="minor">
+            <a:schemeClr val="lt1"/>
+          </a:fontRef>
+        </p:style>
+        <p:txBody>
+          <a:bodyPr rtlCol="0" anchor="ctr"/>
+          <a:lstStyle/>
+          <a:p>
+            <a:pPr algn="ctr"/>
+            <a:r>
+              <a:rPr lang="en-CA" dirty="0"/>
+              <a:t>Some file</a:t>
+            </a:r>
+          </a:p>
+          <a:p>
+            <a:pPr algn="ctr"/>
+            <a:endParaRPr lang="en-CA" dirty="0"/>
+          </a:p>
+          <a:p>
+            <a:pPr algn="ctr"/>
+            <a:endParaRPr lang="en-CA" dirty="0"/>
+          </a:p>
+          <a:p>
+            <a:pPr algn="ctr"/>
+            <a:endParaRPr lang="en-CA" dirty="0"/>
+          </a:p>
+          <a:p>
+            <a:pPr algn="ctr"/>
+            <a:endParaRPr lang="en-CA" dirty="0"/>
+          </a:p>
+          <a:p>
+            <a:pPr algn="ctr"/>
+            <a:endParaRPr lang="en-CA" dirty="0"/>
+          </a:p>
+        </p:txBody>
+      </p:sp>
+      <p:pic>
+        <p:nvPicPr>
+          <p:cNvPr id="27" name="Picture 26">
+            <a:extLst>
+              <a:ext uri="{FF2B5EF4-FFF2-40B4-BE49-F238E27FC236}">
+                <a16:creationId xmlns:a16="http://schemas.microsoft.com/office/drawing/2014/main" id="{F9887602-B08F-4BCB-BC5C-ADF2ADE64531}"/>
               </a:ext>
             </a:extLst>
           </p:cNvPr>
@@ -6385,7 +7078,7 @@
         </p:blipFill>
         <p:spPr>
           <a:xfrm>
-            <a:off x="3237202" y="2220888"/>
+            <a:off x="-28706" y="4292409"/>
             <a:ext cx="1487238" cy="881247"/>
           </a:xfrm>
           <a:prstGeom prst="rect">
@@ -6393,12 +7086,61 @@
           </a:prstGeom>
         </p:spPr>
       </p:pic>
+      <p:sp>
+        <p:nvSpPr>
+          <p:cNvPr id="29" name="Rectangle: Rounded Corners 28">
+            <a:extLst>
+              <a:ext uri="{FF2B5EF4-FFF2-40B4-BE49-F238E27FC236}">
+                <a16:creationId xmlns:a16="http://schemas.microsoft.com/office/drawing/2014/main" id="{C2977E31-FD61-473A-BEA4-1A01DC5D73D9}"/>
+              </a:ext>
+            </a:extLst>
+          </p:cNvPr>
+          <p:cNvSpPr/>
+          <p:nvPr/>
+        </p:nvSpPr>
+        <p:spPr>
+          <a:xfrm>
+            <a:off x="3007386" y="1934195"/>
+            <a:ext cx="1717054" cy="1343261"/>
+          </a:xfrm>
+          <a:prstGeom prst="roundRect">
+            <a:avLst/>
+          </a:prstGeom>
+        </p:spPr>
+        <p:style>
+          <a:lnRef idx="2">
+            <a:schemeClr val="accent1">
+              <a:shade val="50000"/>
+            </a:schemeClr>
+          </a:lnRef>
+          <a:fillRef idx="1">
+            <a:schemeClr val="accent1"/>
+          </a:fillRef>
+          <a:effectRef idx="0">
+            <a:schemeClr val="accent1"/>
+          </a:effectRef>
+          <a:fontRef idx="minor">
+            <a:schemeClr val="lt1"/>
+          </a:fontRef>
+        </p:style>
+        <p:txBody>
+          <a:bodyPr rtlCol="0" anchor="ctr"/>
+          <a:lstStyle/>
+          <a:p>
+            <a:pPr algn="ctr"/>
+            <a:r>
+              <a:rPr lang="en-CA" dirty="0"/>
+              <a:t>Space Ship</a:t>
+            </a:r>
+          </a:p>
+        </p:txBody>
+      </p:sp>
       <p:pic>
         <p:nvPicPr>
-          <p:cNvPr id="30" name="Picture 29">
-            <a:extLst>
-              <a:ext uri="{FF2B5EF4-FFF2-40B4-BE49-F238E27FC236}">
-                <a16:creationId xmlns:a16="http://schemas.microsoft.com/office/drawing/2014/main" id="{A776622B-BC64-4A76-B54F-98E9E4E4F4A9}"/>
+          <p:cNvPr id="28" name="Picture 27">
+            <a:extLst>
+              <a:ext uri="{FF2B5EF4-FFF2-40B4-BE49-F238E27FC236}">
+                <a16:creationId xmlns:a16="http://schemas.microsoft.com/office/drawing/2014/main" id="{9659D843-E78E-48B4-A902-FC659B1ABD9E}"/>
               </a:ext>
             </a:extLst>
           </p:cNvPr>
@@ -6415,7 +7157,86 @@
         </p:blipFill>
         <p:spPr>
           <a:xfrm>
-            <a:off x="7835685" y="1665130"/>
+            <a:off x="3237202" y="2220888"/>
+            <a:ext cx="1487238" cy="881247"/>
+          </a:xfrm>
+          <a:prstGeom prst="rect">
+            <a:avLst/>
+          </a:prstGeom>
+        </p:spPr>
+      </p:pic>
+      <p:sp>
+        <p:nvSpPr>
+          <p:cNvPr id="22" name="Rectangle: Rounded Corners 21">
+            <a:extLst>
+              <a:ext uri="{FF2B5EF4-FFF2-40B4-BE49-F238E27FC236}">
+                <a16:creationId xmlns:a16="http://schemas.microsoft.com/office/drawing/2014/main" id="{BA9B9035-D084-4598-ABB2-F8AF7365179D}"/>
+              </a:ext>
+            </a:extLst>
+          </p:cNvPr>
+          <p:cNvSpPr/>
+          <p:nvPr/>
+        </p:nvSpPr>
+        <p:spPr>
+          <a:xfrm>
+            <a:off x="7582328" y="1835605"/>
+            <a:ext cx="1381093" cy="1241026"/>
+          </a:xfrm>
+          <a:prstGeom prst="roundRect">
+            <a:avLst/>
+          </a:prstGeom>
+        </p:spPr>
+        <p:style>
+          <a:lnRef idx="2">
+            <a:schemeClr val="accent1">
+              <a:shade val="50000"/>
+            </a:schemeClr>
+          </a:lnRef>
+          <a:fillRef idx="1">
+            <a:schemeClr val="accent1"/>
+          </a:fillRef>
+          <a:effectRef idx="0">
+            <a:schemeClr val="accent1"/>
+          </a:effectRef>
+          <a:fontRef idx="minor">
+            <a:schemeClr val="lt1"/>
+          </a:fontRef>
+        </p:style>
+        <p:txBody>
+          <a:bodyPr rtlCol="0" anchor="ctr"/>
+          <a:lstStyle/>
+          <a:p>
+            <a:pPr algn="ctr"/>
+            <a:r>
+              <a:rPr lang="en-CA" dirty="0"/>
+              <a:t>Space Ship</a:t>
+            </a:r>
+          </a:p>
+        </p:txBody>
+      </p:sp>
+      <p:pic>
+        <p:nvPicPr>
+          <p:cNvPr id="30" name="Picture 29">
+            <a:extLst>
+              <a:ext uri="{FF2B5EF4-FFF2-40B4-BE49-F238E27FC236}">
+                <a16:creationId xmlns:a16="http://schemas.microsoft.com/office/drawing/2014/main" id="{A776622B-BC64-4A76-B54F-98E9E4E4F4A9}"/>
+              </a:ext>
+            </a:extLst>
+          </p:cNvPr>
+          <p:cNvPicPr>
+            <a:picLocks noChangeAspect="1"/>
+          </p:cNvPicPr>
+          <p:nvPr/>
+        </p:nvPicPr>
+        <p:blipFill>
+          <a:blip r:embed="rId4"/>
+          <a:stretch>
+            <a:fillRect/>
+          </a:stretch>
+        </p:blipFill>
+        <p:spPr>
+          <a:xfrm>
+            <a:off x="7772254" y="1979531"/>
             <a:ext cx="1608628" cy="953175"/>
           </a:xfrm>
           <a:prstGeom prst="rect">

</xml_diff>

<commit_message>
Code for start of Tuesday class
</commit_message>
<xml_diff>
--- a/Day2Day/Day_01/S1_Note.pptx
+++ b/Day2Day/Day_01/S1_Note.pptx
@@ -268,7 +268,7 @@
           <a:p>
             <a:fld id="{41FBF7B5-8CD3-4D87-8075-6B63450ED684}" type="datetimeFigureOut">
               <a:rPr lang="en-CA" smtClean="0"/>
-              <a:t>2021-05-19</a:t>
+              <a:t>2021-05-21</a:t>
             </a:fld>
             <a:endParaRPr lang="en-CA"/>
           </a:p>
@@ -468,7 +468,7 @@
           <a:p>
             <a:fld id="{41FBF7B5-8CD3-4D87-8075-6B63450ED684}" type="datetimeFigureOut">
               <a:rPr lang="en-CA" smtClean="0"/>
-              <a:t>2021-05-19</a:t>
+              <a:t>2021-05-21</a:t>
             </a:fld>
             <a:endParaRPr lang="en-CA"/>
           </a:p>
@@ -678,7 +678,7 @@
           <a:p>
             <a:fld id="{41FBF7B5-8CD3-4D87-8075-6B63450ED684}" type="datetimeFigureOut">
               <a:rPr lang="en-CA" smtClean="0"/>
-              <a:t>2021-05-19</a:t>
+              <a:t>2021-05-21</a:t>
             </a:fld>
             <a:endParaRPr lang="en-CA"/>
           </a:p>
@@ -878,7 +878,7 @@
           <a:p>
             <a:fld id="{41FBF7B5-8CD3-4D87-8075-6B63450ED684}" type="datetimeFigureOut">
               <a:rPr lang="en-CA" smtClean="0"/>
-              <a:t>2021-05-19</a:t>
+              <a:t>2021-05-21</a:t>
             </a:fld>
             <a:endParaRPr lang="en-CA"/>
           </a:p>
@@ -1154,7 +1154,7 @@
           <a:p>
             <a:fld id="{41FBF7B5-8CD3-4D87-8075-6B63450ED684}" type="datetimeFigureOut">
               <a:rPr lang="en-CA" smtClean="0"/>
-              <a:t>2021-05-19</a:t>
+              <a:t>2021-05-21</a:t>
             </a:fld>
             <a:endParaRPr lang="en-CA"/>
           </a:p>
@@ -1422,7 +1422,7 @@
           <a:p>
             <a:fld id="{41FBF7B5-8CD3-4D87-8075-6B63450ED684}" type="datetimeFigureOut">
               <a:rPr lang="en-CA" smtClean="0"/>
-              <a:t>2021-05-19</a:t>
+              <a:t>2021-05-21</a:t>
             </a:fld>
             <a:endParaRPr lang="en-CA"/>
           </a:p>
@@ -1837,7 +1837,7 @@
           <a:p>
             <a:fld id="{41FBF7B5-8CD3-4D87-8075-6B63450ED684}" type="datetimeFigureOut">
               <a:rPr lang="en-CA" smtClean="0"/>
-              <a:t>2021-05-19</a:t>
+              <a:t>2021-05-21</a:t>
             </a:fld>
             <a:endParaRPr lang="en-CA"/>
           </a:p>
@@ -1979,7 +1979,7 @@
           <a:p>
             <a:fld id="{41FBF7B5-8CD3-4D87-8075-6B63450ED684}" type="datetimeFigureOut">
               <a:rPr lang="en-CA" smtClean="0"/>
-              <a:t>2021-05-19</a:t>
+              <a:t>2021-05-21</a:t>
             </a:fld>
             <a:endParaRPr lang="en-CA"/>
           </a:p>
@@ -2092,7 +2092,7 @@
           <a:p>
             <a:fld id="{41FBF7B5-8CD3-4D87-8075-6B63450ED684}" type="datetimeFigureOut">
               <a:rPr lang="en-CA" smtClean="0"/>
-              <a:t>2021-05-19</a:t>
+              <a:t>2021-05-21</a:t>
             </a:fld>
             <a:endParaRPr lang="en-CA"/>
           </a:p>
@@ -2405,7 +2405,7 @@
           <a:p>
             <a:fld id="{41FBF7B5-8CD3-4D87-8075-6B63450ED684}" type="datetimeFigureOut">
               <a:rPr lang="en-CA" smtClean="0"/>
-              <a:t>2021-05-19</a:t>
+              <a:t>2021-05-21</a:t>
             </a:fld>
             <a:endParaRPr lang="en-CA"/>
           </a:p>
@@ -2694,7 +2694,7 @@
           <a:p>
             <a:fld id="{41FBF7B5-8CD3-4D87-8075-6B63450ED684}" type="datetimeFigureOut">
               <a:rPr lang="en-CA" smtClean="0"/>
-              <a:t>2021-05-19</a:t>
+              <a:t>2021-05-21</a:t>
             </a:fld>
             <a:endParaRPr lang="en-CA"/>
           </a:p>
@@ -2937,7 +2937,7 @@
           <a:p>
             <a:fld id="{41FBF7B5-8CD3-4D87-8075-6B63450ED684}" type="datetimeFigureOut">
               <a:rPr lang="en-CA" smtClean="0"/>
-              <a:t>2021-05-19</a:t>
+              <a:t>2021-05-21</a:t>
             </a:fld>
             <a:endParaRPr lang="en-CA"/>
           </a:p>
@@ -6022,7 +6022,7 @@
         </p:blipFill>
         <p:spPr>
           <a:xfrm>
-            <a:off x="10528335" y="3052556"/>
+            <a:off x="10378689" y="3018810"/>
             <a:ext cx="1417482" cy="1239853"/>
           </a:xfrm>
           <a:prstGeom prst="rect">
@@ -6052,7 +6052,7 @@
         </p:blipFill>
         <p:spPr>
           <a:xfrm>
-            <a:off x="8041952" y="686694"/>
+            <a:off x="8041952" y="449858"/>
             <a:ext cx="921469" cy="805627"/>
           </a:xfrm>
           <a:prstGeom prst="rect">
@@ -6189,6 +6189,66 @@
           </a:p>
         </p:txBody>
       </p:sp>
+      <p:pic>
+        <p:nvPicPr>
+          <p:cNvPr id="17" name="Picture 16">
+            <a:extLst>
+              <a:ext uri="{FF2B5EF4-FFF2-40B4-BE49-F238E27FC236}">
+                <a16:creationId xmlns:a16="http://schemas.microsoft.com/office/drawing/2014/main" id="{B2960E74-7197-42A6-AA5D-DD1698AC6719}"/>
+              </a:ext>
+            </a:extLst>
+          </p:cNvPr>
+          <p:cNvPicPr>
+            <a:picLocks noChangeAspect="1"/>
+          </p:cNvPicPr>
+          <p:nvPr/>
+        </p:nvPicPr>
+        <p:blipFill>
+          <a:blip r:embed="rId3"/>
+          <a:stretch>
+            <a:fillRect/>
+          </a:stretch>
+        </p:blipFill>
+        <p:spPr>
+          <a:xfrm>
+            <a:off x="9528396" y="3791206"/>
+            <a:ext cx="1417482" cy="1239853"/>
+          </a:xfrm>
+          <a:prstGeom prst="rect">
+            <a:avLst/>
+          </a:prstGeom>
+        </p:spPr>
+      </p:pic>
+      <p:pic>
+        <p:nvPicPr>
+          <p:cNvPr id="18" name="Picture 17">
+            <a:extLst>
+              <a:ext uri="{FF2B5EF4-FFF2-40B4-BE49-F238E27FC236}">
+                <a16:creationId xmlns:a16="http://schemas.microsoft.com/office/drawing/2014/main" id="{90FDE44D-7FEA-4E89-856A-77525FEEA28F}"/>
+              </a:ext>
+            </a:extLst>
+          </p:cNvPr>
+          <p:cNvPicPr>
+            <a:picLocks noChangeAspect="1"/>
+          </p:cNvPicPr>
+          <p:nvPr/>
+        </p:nvPicPr>
+        <p:blipFill>
+          <a:blip r:embed="rId3"/>
+          <a:stretch>
+            <a:fillRect/>
+          </a:stretch>
+        </p:blipFill>
+        <p:spPr>
+          <a:xfrm>
+            <a:off x="10681385" y="4511855"/>
+            <a:ext cx="1417482" cy="1239853"/>
+          </a:xfrm>
+          <a:prstGeom prst="rect">
+            <a:avLst/>
+          </a:prstGeom>
+        </p:spPr>
+      </p:pic>
     </p:spTree>
     <p:extLst>
       <p:ext uri="{BB962C8B-B14F-4D97-AF65-F5344CB8AC3E}">

</xml_diff>